<commit_message>
ppt ver.05 and code modify
</commit_message>
<xml_diff>
--- a/finalppt/final ppt_ver.3.pptx
+++ b/finalppt/final ppt_ver.3.pptx
@@ -9,17 +9,16 @@
     <p:sldId id="261" r:id="rId3"/>
     <p:sldId id="262" r:id="rId4"/>
     <p:sldId id="260" r:id="rId5"/>
-    <p:sldId id="257" r:id="rId6"/>
-    <p:sldId id="265" r:id="rId7"/>
-    <p:sldId id="259" r:id="rId8"/>
-    <p:sldId id="258" r:id="rId9"/>
-    <p:sldId id="264" r:id="rId10"/>
-    <p:sldId id="270" r:id="rId11"/>
-    <p:sldId id="266" r:id="rId12"/>
-    <p:sldId id="269" r:id="rId13"/>
-    <p:sldId id="271" r:id="rId14"/>
-    <p:sldId id="263" r:id="rId15"/>
-    <p:sldId id="268" r:id="rId16"/>
+    <p:sldId id="265" r:id="rId6"/>
+    <p:sldId id="259" r:id="rId7"/>
+    <p:sldId id="258" r:id="rId8"/>
+    <p:sldId id="264" r:id="rId9"/>
+    <p:sldId id="270" r:id="rId10"/>
+    <p:sldId id="266" r:id="rId11"/>
+    <p:sldId id="269" r:id="rId12"/>
+    <p:sldId id="271" r:id="rId13"/>
+    <p:sldId id="263" r:id="rId14"/>
+    <p:sldId id="268" r:id="rId15"/>
   </p:sldIdLst>
   <p:sldSz cx="12192000" cy="6858000"/>
   <p:notesSz cx="6858000" cy="9144000"/>
@@ -120,7 +119,7 @@
   </p:defaultTextStyle>
   <p:extLst>
     <p:ext uri="{EFAFB233-063F-42B5-8137-9DF3F51BA10A}">
-      <p15:sldGuideLst xmlns:p15="http://schemas.microsoft.com/office/powerpoint/2012/main" xmlns=""/>
+      <p15:sldGuideLst xmlns="" xmlns:p15="http://schemas.microsoft.com/office/powerpoint/2012/main"/>
     </p:ext>
   </p:extLst>
 </p:presentation>
@@ -310,7 +309,7 @@
     </p:spTree>
     <p:extLst>
       <p:ext uri="{BB962C8B-B14F-4D97-AF65-F5344CB8AC3E}">
-        <p14:creationId xmlns:p14="http://schemas.microsoft.com/office/powerpoint/2010/main" xmlns="" val="4216040907"/>
+        <p14:creationId xmlns="" xmlns:p14="http://schemas.microsoft.com/office/powerpoint/2010/main" val="4216040907"/>
       </p:ext>
     </p:extLst>
   </p:cSld>
@@ -482,7 +481,7 @@
     </p:spTree>
     <p:extLst>
       <p:ext uri="{BB962C8B-B14F-4D97-AF65-F5344CB8AC3E}">
-        <p14:creationId xmlns:p14="http://schemas.microsoft.com/office/powerpoint/2010/main" xmlns="" val="2593718687"/>
+        <p14:creationId xmlns="" xmlns:p14="http://schemas.microsoft.com/office/powerpoint/2010/main" val="2593718687"/>
       </p:ext>
     </p:extLst>
   </p:cSld>
@@ -664,7 +663,7 @@
     </p:spTree>
     <p:extLst>
       <p:ext uri="{BB962C8B-B14F-4D97-AF65-F5344CB8AC3E}">
-        <p14:creationId xmlns:p14="http://schemas.microsoft.com/office/powerpoint/2010/main" xmlns="" val="4167222770"/>
+        <p14:creationId xmlns="" xmlns:p14="http://schemas.microsoft.com/office/powerpoint/2010/main" val="4167222770"/>
       </p:ext>
     </p:extLst>
   </p:cSld>
@@ -836,7 +835,7 @@
     </p:spTree>
     <p:extLst>
       <p:ext uri="{BB962C8B-B14F-4D97-AF65-F5344CB8AC3E}">
-        <p14:creationId xmlns:p14="http://schemas.microsoft.com/office/powerpoint/2010/main" xmlns="" val="1447321100"/>
+        <p14:creationId xmlns="" xmlns:p14="http://schemas.microsoft.com/office/powerpoint/2010/main" val="1447321100"/>
       </p:ext>
     </p:extLst>
   </p:cSld>
@@ -1084,7 +1083,7 @@
     </p:spTree>
     <p:extLst>
       <p:ext uri="{BB962C8B-B14F-4D97-AF65-F5344CB8AC3E}">
-        <p14:creationId xmlns:p14="http://schemas.microsoft.com/office/powerpoint/2010/main" xmlns="" val="1185871682"/>
+        <p14:creationId xmlns="" xmlns:p14="http://schemas.microsoft.com/office/powerpoint/2010/main" val="1185871682"/>
       </p:ext>
     </p:extLst>
   </p:cSld>
@@ -1318,7 +1317,7 @@
     </p:spTree>
     <p:extLst>
       <p:ext uri="{BB962C8B-B14F-4D97-AF65-F5344CB8AC3E}">
-        <p14:creationId xmlns:p14="http://schemas.microsoft.com/office/powerpoint/2010/main" xmlns="" val="3508763883"/>
+        <p14:creationId xmlns="" xmlns:p14="http://schemas.microsoft.com/office/powerpoint/2010/main" val="3508763883"/>
       </p:ext>
     </p:extLst>
   </p:cSld>
@@ -1687,7 +1686,7 @@
     </p:spTree>
     <p:extLst>
       <p:ext uri="{BB962C8B-B14F-4D97-AF65-F5344CB8AC3E}">
-        <p14:creationId xmlns:p14="http://schemas.microsoft.com/office/powerpoint/2010/main" xmlns="" val="1198278955"/>
+        <p14:creationId xmlns="" xmlns:p14="http://schemas.microsoft.com/office/powerpoint/2010/main" val="1198278955"/>
       </p:ext>
     </p:extLst>
   </p:cSld>
@@ -1807,7 +1806,7 @@
     </p:spTree>
     <p:extLst>
       <p:ext uri="{BB962C8B-B14F-4D97-AF65-F5344CB8AC3E}">
-        <p14:creationId xmlns:p14="http://schemas.microsoft.com/office/powerpoint/2010/main" xmlns="" val="3631936833"/>
+        <p14:creationId xmlns="" xmlns:p14="http://schemas.microsoft.com/office/powerpoint/2010/main" val="3631936833"/>
       </p:ext>
     </p:extLst>
   </p:cSld>
@@ -1904,7 +1903,7 @@
     </p:spTree>
     <p:extLst>
       <p:ext uri="{BB962C8B-B14F-4D97-AF65-F5344CB8AC3E}">
-        <p14:creationId xmlns:p14="http://schemas.microsoft.com/office/powerpoint/2010/main" xmlns="" val="3316076131"/>
+        <p14:creationId xmlns="" xmlns:p14="http://schemas.microsoft.com/office/powerpoint/2010/main" val="3316076131"/>
       </p:ext>
     </p:extLst>
   </p:cSld>
@@ -2183,7 +2182,7 @@
     </p:spTree>
     <p:extLst>
       <p:ext uri="{BB962C8B-B14F-4D97-AF65-F5344CB8AC3E}">
-        <p14:creationId xmlns:p14="http://schemas.microsoft.com/office/powerpoint/2010/main" xmlns="" val="3238998512"/>
+        <p14:creationId xmlns="" xmlns:p14="http://schemas.microsoft.com/office/powerpoint/2010/main" val="3238998512"/>
       </p:ext>
     </p:extLst>
   </p:cSld>
@@ -2438,7 +2437,7 @@
     </p:spTree>
     <p:extLst>
       <p:ext uri="{BB962C8B-B14F-4D97-AF65-F5344CB8AC3E}">
-        <p14:creationId xmlns:p14="http://schemas.microsoft.com/office/powerpoint/2010/main" xmlns="" val="1542187398"/>
+        <p14:creationId xmlns="" xmlns:p14="http://schemas.microsoft.com/office/powerpoint/2010/main" val="1542187398"/>
       </p:ext>
     </p:extLst>
   </p:cSld>
@@ -2689,7 +2688,7 @@
     </p:spTree>
     <p:extLst>
       <p:ext uri="{BB962C8B-B14F-4D97-AF65-F5344CB8AC3E}">
-        <p14:creationId xmlns:p14="http://schemas.microsoft.com/office/powerpoint/2010/main" xmlns="" val="2057627264"/>
+        <p14:creationId xmlns="" xmlns:p14="http://schemas.microsoft.com/office/powerpoint/2010/main" val="2057627264"/>
       </p:ext>
     </p:extLst>
   </p:cSld>
@@ -3019,7 +3018,7 @@
           <a:blip r:embed="rId2" cstate="print">
             <a:extLst>
               <a:ext uri="{28A0092B-C50C-407E-A947-70E740481C1C}">
-                <a14:useLocalDpi xmlns:a14="http://schemas.microsoft.com/office/drawing/2010/main" xmlns="" val="0"/>
+                <a14:useLocalDpi xmlns="" xmlns:a14="http://schemas.microsoft.com/office/drawing/2010/main" val="0"/>
               </a:ext>
             </a:extLst>
           </a:blip>
@@ -3273,7 +3272,7 @@
           <a:blip r:embed="rId3" cstate="print">
             <a:extLst>
               <a:ext uri="{28A0092B-C50C-407E-A947-70E740481C1C}">
-                <a14:useLocalDpi xmlns:a14="http://schemas.microsoft.com/office/drawing/2010/main" xmlns="" val="0"/>
+                <a14:useLocalDpi xmlns="" xmlns:a14="http://schemas.microsoft.com/office/drawing/2010/main" val="0"/>
               </a:ext>
             </a:extLst>
           </a:blip>
@@ -3294,7 +3293,7 @@
     </p:spTree>
     <p:extLst>
       <p:ext uri="{BB962C8B-B14F-4D97-AF65-F5344CB8AC3E}">
-        <p14:creationId xmlns:p14="http://schemas.microsoft.com/office/powerpoint/2010/main" xmlns="" val="27628053"/>
+        <p14:creationId xmlns="" xmlns:p14="http://schemas.microsoft.com/office/powerpoint/2010/main" val="27628053"/>
       </p:ext>
     </p:extLst>
   </p:cSld>
@@ -3847,7 +3846,7 @@
           <a:blip r:embed="rId2" cstate="print">
             <a:extLst>
               <a:ext uri="{28A0092B-C50C-407E-A947-70E740481C1C}">
-                <a14:useLocalDpi xmlns:a14="http://schemas.microsoft.com/office/drawing/2010/main" xmlns="" val="0"/>
+                <a14:useLocalDpi xmlns="" xmlns:a14="http://schemas.microsoft.com/office/drawing/2010/main" val="0"/>
               </a:ext>
             </a:extLst>
           </a:blip>
@@ -3877,7 +3876,7 @@
           <a:blip r:embed="rId3" cstate="print">
             <a:extLst>
               <a:ext uri="{28A0092B-C50C-407E-A947-70E740481C1C}">
-                <a14:useLocalDpi xmlns:a14="http://schemas.microsoft.com/office/drawing/2010/main" xmlns="" val="0"/>
+                <a14:useLocalDpi xmlns="" xmlns:a14="http://schemas.microsoft.com/office/drawing/2010/main" val="0"/>
               </a:ext>
             </a:extLst>
           </a:blip>
@@ -3922,7 +3921,7 @@
                 <a:latin typeface="나눔고딕 ExtraBold" panose="020D0904000000000000" pitchFamily="50" charset="-127"/>
                 <a:ea typeface="나눔고딕 ExtraBold" panose="020D0904000000000000" pitchFamily="50" charset="-127"/>
               </a:rPr>
-              <a:t>Problem</a:t>
+              <a:t>Result!</a:t>
             </a:r>
             <a:endParaRPr lang="ko-KR" altLang="en-US" sz="5400" dirty="0">
               <a:latin typeface="나눔고딕 ExtraBold" panose="020D0904000000000000" pitchFamily="50" charset="-127"/>
@@ -3931,40 +3930,40 @@
           </a:p>
         </p:txBody>
       </p:sp>
-      <p:sp>
-        <p:nvSpPr>
-          <p:cNvPr id="9" name="TextBox 8"/>
-          <p:cNvSpPr txBox="1"/>
+      <p:pic>
+        <p:nvPicPr>
+          <p:cNvPr id="2" name="그림 1"/>
+          <p:cNvPicPr>
+            <a:picLocks noChangeAspect="1"/>
+          </p:cNvPicPr>
           <p:nvPr/>
-        </p:nvSpPr>
+        </p:nvPicPr>
+        <p:blipFill>
+          <a:blip r:embed="rId4" cstate="print">
+            <a:extLst>
+              <a:ext uri="{28A0092B-C50C-407E-A947-70E740481C1C}">
+                <a14:useLocalDpi xmlns="" xmlns:a14="http://schemas.microsoft.com/office/drawing/2010/main" val="0"/>
+              </a:ext>
+            </a:extLst>
+          </a:blip>
+          <a:stretch>
+            <a:fillRect/>
+          </a:stretch>
+        </p:blipFill>
         <p:spPr>
           <a:xfrm>
-            <a:off x="1253765" y="2432115"/>
-            <a:ext cx="4430598" cy="584775"/>
+            <a:off x="2639105" y="2197720"/>
+            <a:ext cx="2814638" cy="3187308"/>
           </a:xfrm>
           <a:prstGeom prst="rect">
             <a:avLst/>
           </a:prstGeom>
-          <a:noFill/>
         </p:spPr>
-        <p:txBody>
-          <a:bodyPr wrap="square" rtlCol="0">
-            <a:spAutoFit/>
-          </a:bodyPr>
-          <a:lstStyle/>
-          <a:p>
-            <a:r>
-              <a:rPr lang="en-US" altLang="ko-KR" sz="3200" dirty="0" smtClean="0"/>
-              <a:t>- Error Modify</a:t>
-            </a:r>
-            <a:endParaRPr lang="ko-KR" altLang="en-US" sz="3200" dirty="0"/>
-          </a:p>
-        </p:txBody>
-      </p:sp>
+      </p:pic>
     </p:spTree>
     <p:extLst>
       <p:ext uri="{BB962C8B-B14F-4D97-AF65-F5344CB8AC3E}">
-        <p14:creationId xmlns:p14="http://schemas.microsoft.com/office/powerpoint/2010/main" xmlns="" val="544492876"/>
+        <p14:creationId xmlns="" xmlns:p14="http://schemas.microsoft.com/office/powerpoint/2010/main" val="697871090"/>
       </p:ext>
     </p:extLst>
   </p:cSld>
@@ -4172,7 +4171,7 @@
                             </p:stCondLst>
                             <p:childTnLst>
                               <p:par>
-                                <p:cTn id="17" presetID="10" presetClass="entr" presetSubtype="0" fill="hold" grpId="0" nodeType="clickEffect">
+                                <p:cTn id="17" presetID="16" presetClass="entr" presetSubtype="21" fill="hold" nodeType="clickEffect">
                                   <p:stCondLst>
                                     <p:cond delay="0"/>
                                   </p:stCondLst>
@@ -4185,7 +4184,7 @@
                                           </p:stCondLst>
                                         </p:cTn>
                                         <p:tgtEl>
-                                          <p:spTgt spid="9"/>
+                                          <p:spTgt spid="2"/>
                                         </p:tgtEl>
                                         <p:attrNameLst>
                                           <p:attrName>style.visibility</p:attrName>
@@ -4195,14 +4194,58 @@
                                         <p:strVal val="visible"/>
                                       </p:to>
                                     </p:set>
-                                    <p:animEffect transition="in" filter="fade">
+                                    <p:animEffect transition="in" filter="barn(inVertical)">
                                       <p:cBhvr>
                                         <p:cTn id="19" dur="500"/>
                                         <p:tgtEl>
-                                          <p:spTgt spid="9"/>
+                                          <p:spTgt spid="2"/>
                                         </p:tgtEl>
                                       </p:cBhvr>
                                     </p:animEffect>
+                                  </p:childTnLst>
+                                </p:cTn>
+                              </p:par>
+                            </p:childTnLst>
+                          </p:cTn>
+                        </p:par>
+                      </p:childTnLst>
+                    </p:cTn>
+                  </p:par>
+                  <p:par>
+                    <p:cTn id="20" fill="hold">
+                      <p:stCondLst>
+                        <p:cond delay="indefinite"/>
+                      </p:stCondLst>
+                      <p:childTnLst>
+                        <p:par>
+                          <p:cTn id="21" fill="hold">
+                            <p:stCondLst>
+                              <p:cond delay="0"/>
+                            </p:stCondLst>
+                            <p:childTnLst>
+                              <p:par>
+                                <p:cTn id="22" presetID="26" presetClass="emph" presetSubtype="0" fill="hold" nodeType="clickEffect">
+                                  <p:stCondLst>
+                                    <p:cond delay="0"/>
+                                  </p:stCondLst>
+                                  <p:childTnLst>
+                                    <p:animEffect transition="out" filter="fade">
+                                      <p:cBhvr>
+                                        <p:cTn id="23" dur="500" tmFilter="0, 0; .2, .5; .8, .5; 1, 0"/>
+                                        <p:tgtEl>
+                                          <p:spTgt spid="2"/>
+                                        </p:tgtEl>
+                                      </p:cBhvr>
+                                    </p:animEffect>
+                                    <p:animScale>
+                                      <p:cBhvr>
+                                        <p:cTn id="24" dur="250" autoRev="1" fill="hold"/>
+                                        <p:tgtEl>
+                                          <p:spTgt spid="2"/>
+                                        </p:tgtEl>
+                                      </p:cBhvr>
+                                      <p:by x="105000" y="105000"/>
+                                    </p:animScale>
                                   </p:childTnLst>
                                 </p:cTn>
                               </p:par>
@@ -4235,7 +4278,6 @@
     </p:tnLst>
     <p:bldLst>
       <p:bldP spid="5" grpId="0"/>
-      <p:bldP spid="9" grpId="0"/>
     </p:bldLst>
   </p:timing>
 </p:sld>
@@ -4270,7 +4312,7 @@
           <a:blip r:embed="rId2" cstate="print">
             <a:extLst>
               <a:ext uri="{28A0092B-C50C-407E-A947-70E740481C1C}">
-                <a14:useLocalDpi xmlns:a14="http://schemas.microsoft.com/office/drawing/2010/main" xmlns="" val="0"/>
+                <a14:useLocalDpi xmlns="" xmlns:a14="http://schemas.microsoft.com/office/drawing/2010/main" val="0"/>
               </a:ext>
             </a:extLst>
           </a:blip>
@@ -4300,7 +4342,7 @@
           <a:blip r:embed="rId3" cstate="print">
             <a:extLst>
               <a:ext uri="{28A0092B-C50C-407E-A947-70E740481C1C}">
-                <a14:useLocalDpi xmlns:a14="http://schemas.microsoft.com/office/drawing/2010/main" xmlns="" val="0"/>
+                <a14:useLocalDpi xmlns="" xmlns:a14="http://schemas.microsoft.com/office/drawing/2010/main" val="0"/>
               </a:ext>
             </a:extLst>
           </a:blip>
@@ -4345,7 +4387,7 @@
                 <a:latin typeface="나눔고딕 ExtraBold" panose="020D0904000000000000" pitchFamily="50" charset="-127"/>
                 <a:ea typeface="나눔고딕 ExtraBold" panose="020D0904000000000000" pitchFamily="50" charset="-127"/>
               </a:rPr>
-              <a:t>Result!</a:t>
+              <a:t>Mid-Result!</a:t>
             </a:r>
             <a:endParaRPr lang="ko-KR" altLang="en-US" sz="5400" dirty="0">
               <a:latin typeface="나눔고딕 ExtraBold" panose="020D0904000000000000" pitchFamily="50" charset="-127"/>
@@ -4356,7 +4398,7 @@
       </p:sp>
       <p:pic>
         <p:nvPicPr>
-          <p:cNvPr id="2" name="그림 1"/>
+          <p:cNvPr id="6" name="그림 5"/>
           <p:cNvPicPr>
             <a:picLocks noChangeAspect="1"/>
           </p:cNvPicPr>
@@ -4366,7 +4408,7 @@
           <a:blip r:embed="rId4" cstate="print">
             <a:extLst>
               <a:ext uri="{28A0092B-C50C-407E-A947-70E740481C1C}">
-                <a14:useLocalDpi xmlns:a14="http://schemas.microsoft.com/office/drawing/2010/main" xmlns="" val="0"/>
+                <a14:useLocalDpi xmlns="" xmlns:a14="http://schemas.microsoft.com/office/drawing/2010/main" val="0"/>
               </a:ext>
             </a:extLst>
           </a:blip>
@@ -4376,8 +4418,68 @@
         </p:blipFill>
         <p:spPr>
           <a:xfrm>
-            <a:off x="2639105" y="2197720"/>
-            <a:ext cx="2814638" cy="3187308"/>
+            <a:off x="838126" y="2090443"/>
+            <a:ext cx="2708709" cy="4498893"/>
+          </a:xfrm>
+          <a:prstGeom prst="rect">
+            <a:avLst/>
+          </a:prstGeom>
+        </p:spPr>
+      </p:pic>
+      <p:pic>
+        <p:nvPicPr>
+          <p:cNvPr id="7" name="그림 6"/>
+          <p:cNvPicPr>
+            <a:picLocks noChangeAspect="1"/>
+          </p:cNvPicPr>
+          <p:nvPr/>
+        </p:nvPicPr>
+        <p:blipFill>
+          <a:blip r:embed="rId5" cstate="print">
+            <a:extLst>
+              <a:ext uri="{28A0092B-C50C-407E-A947-70E740481C1C}">
+                <a14:useLocalDpi xmlns="" xmlns:a14="http://schemas.microsoft.com/office/drawing/2010/main" val="0"/>
+              </a:ext>
+            </a:extLst>
+          </a:blip>
+          <a:stretch>
+            <a:fillRect/>
+          </a:stretch>
+        </p:blipFill>
+        <p:spPr>
+          <a:xfrm>
+            <a:off x="3586118" y="2090442"/>
+            <a:ext cx="2708709" cy="4498893"/>
+          </a:xfrm>
+          <a:prstGeom prst="rect">
+            <a:avLst/>
+          </a:prstGeom>
+        </p:spPr>
+      </p:pic>
+      <p:pic>
+        <p:nvPicPr>
+          <p:cNvPr id="8" name="그림 7"/>
+          <p:cNvPicPr>
+            <a:picLocks noChangeAspect="1"/>
+          </p:cNvPicPr>
+          <p:nvPr/>
+        </p:nvPicPr>
+        <p:blipFill>
+          <a:blip r:embed="rId6" cstate="print">
+            <a:extLst>
+              <a:ext uri="{28A0092B-C50C-407E-A947-70E740481C1C}">
+                <a14:useLocalDpi xmlns="" xmlns:a14="http://schemas.microsoft.com/office/drawing/2010/main" val="0"/>
+              </a:ext>
+            </a:extLst>
+          </a:blip>
+          <a:stretch>
+            <a:fillRect/>
+          </a:stretch>
+        </p:blipFill>
+        <p:spPr>
+          <a:xfrm>
+            <a:off x="6268663" y="2513445"/>
+            <a:ext cx="5844618" cy="3652886"/>
           </a:xfrm>
           <a:prstGeom prst="rect">
             <a:avLst/>
@@ -4387,7 +4489,7 @@
     </p:spTree>
     <p:extLst>
       <p:ext uri="{BB962C8B-B14F-4D97-AF65-F5344CB8AC3E}">
-        <p14:creationId xmlns:p14="http://schemas.microsoft.com/office/powerpoint/2010/main" xmlns="" val="697871090"/>
+        <p14:creationId xmlns="" xmlns:p14="http://schemas.microsoft.com/office/powerpoint/2010/main" val="1657933370"/>
       </p:ext>
     </p:extLst>
   </p:cSld>
@@ -4595,7 +4697,7 @@
                             </p:stCondLst>
                             <p:childTnLst>
                               <p:par>
-                                <p:cTn id="17" presetID="16" presetClass="entr" presetSubtype="21" fill="hold" nodeType="clickEffect">
+                                <p:cTn id="17" presetID="2" presetClass="entr" presetSubtype="4" fill="hold" nodeType="clickEffect">
                                   <p:stCondLst>
                                     <p:cond delay="0"/>
                                   </p:stCondLst>
@@ -4608,7 +4710,7 @@
                                           </p:stCondLst>
                                         </p:cTn>
                                         <p:tgtEl>
-                                          <p:spTgt spid="2"/>
+                                          <p:spTgt spid="6"/>
                                         </p:tgtEl>
                                         <p:attrNameLst>
                                           <p:attrName>style.visibility</p:attrName>
@@ -4618,14 +4720,52 @@
                                         <p:strVal val="visible"/>
                                       </p:to>
                                     </p:set>
-                                    <p:animEffect transition="in" filter="barn(inVertical)">
-                                      <p:cBhvr>
-                                        <p:cTn id="19" dur="500"/>
-                                        <p:tgtEl>
-                                          <p:spTgt spid="2"/>
-                                        </p:tgtEl>
-                                      </p:cBhvr>
-                                    </p:animEffect>
+                                    <p:anim calcmode="lin" valueType="num">
+                                      <p:cBhvr additive="base">
+                                        <p:cTn id="19" dur="500" fill="hold"/>
+                                        <p:tgtEl>
+                                          <p:spTgt spid="6"/>
+                                        </p:tgtEl>
+                                        <p:attrNameLst>
+                                          <p:attrName>ppt_x</p:attrName>
+                                        </p:attrNameLst>
+                                      </p:cBhvr>
+                                      <p:tavLst>
+                                        <p:tav tm="0">
+                                          <p:val>
+                                            <p:strVal val="#ppt_x"/>
+                                          </p:val>
+                                        </p:tav>
+                                        <p:tav tm="100000">
+                                          <p:val>
+                                            <p:strVal val="#ppt_x"/>
+                                          </p:val>
+                                        </p:tav>
+                                      </p:tavLst>
+                                    </p:anim>
+                                    <p:anim calcmode="lin" valueType="num">
+                                      <p:cBhvr additive="base">
+                                        <p:cTn id="20" dur="500" fill="hold"/>
+                                        <p:tgtEl>
+                                          <p:spTgt spid="6"/>
+                                        </p:tgtEl>
+                                        <p:attrNameLst>
+                                          <p:attrName>ppt_y</p:attrName>
+                                        </p:attrNameLst>
+                                      </p:cBhvr>
+                                      <p:tavLst>
+                                        <p:tav tm="0">
+                                          <p:val>
+                                            <p:strVal val="1+#ppt_h/2"/>
+                                          </p:val>
+                                        </p:tav>
+                                        <p:tav tm="100000">
+                                          <p:val>
+                                            <p:strVal val="#ppt_y"/>
+                                          </p:val>
+                                        </p:tav>
+                                      </p:tavLst>
+                                    </p:anim>
                                   </p:childTnLst>
                                 </p:cTn>
                               </p:par>
@@ -4636,40 +4776,178 @@
                     </p:cTn>
                   </p:par>
                   <p:par>
-                    <p:cTn id="20" fill="hold">
+                    <p:cTn id="21" fill="hold">
                       <p:stCondLst>
                         <p:cond delay="indefinite"/>
                       </p:stCondLst>
                       <p:childTnLst>
                         <p:par>
-                          <p:cTn id="21" fill="hold">
+                          <p:cTn id="22" fill="hold">
                             <p:stCondLst>
                               <p:cond delay="0"/>
                             </p:stCondLst>
                             <p:childTnLst>
                               <p:par>
-                                <p:cTn id="22" presetID="26" presetClass="emph" presetSubtype="0" fill="hold" nodeType="clickEffect">
+                                <p:cTn id="23" presetID="2" presetClass="entr" presetSubtype="4" fill="hold" nodeType="clickEffect">
                                   <p:stCondLst>
                                     <p:cond delay="0"/>
                                   </p:stCondLst>
                                   <p:childTnLst>
-                                    <p:animEffect transition="out" filter="fade">
-                                      <p:cBhvr>
-                                        <p:cTn id="23" dur="500" tmFilter="0, 0; .2, .5; .8, .5; 1, 0"/>
-                                        <p:tgtEl>
-                                          <p:spTgt spid="2"/>
-                                        </p:tgtEl>
-                                      </p:cBhvr>
-                                    </p:animEffect>
-                                    <p:animScale>
-                                      <p:cBhvr>
-                                        <p:cTn id="24" dur="250" autoRev="1" fill="hold"/>
-                                        <p:tgtEl>
-                                          <p:spTgt spid="2"/>
-                                        </p:tgtEl>
-                                      </p:cBhvr>
-                                      <p:by x="105000" y="105000"/>
-                                    </p:animScale>
+                                    <p:set>
+                                      <p:cBhvr>
+                                        <p:cTn id="24" dur="1" fill="hold">
+                                          <p:stCondLst>
+                                            <p:cond delay="0"/>
+                                          </p:stCondLst>
+                                        </p:cTn>
+                                        <p:tgtEl>
+                                          <p:spTgt spid="7"/>
+                                        </p:tgtEl>
+                                        <p:attrNameLst>
+                                          <p:attrName>style.visibility</p:attrName>
+                                        </p:attrNameLst>
+                                      </p:cBhvr>
+                                      <p:to>
+                                        <p:strVal val="visible"/>
+                                      </p:to>
+                                    </p:set>
+                                    <p:anim calcmode="lin" valueType="num">
+                                      <p:cBhvr additive="base">
+                                        <p:cTn id="25" dur="500" fill="hold"/>
+                                        <p:tgtEl>
+                                          <p:spTgt spid="7"/>
+                                        </p:tgtEl>
+                                        <p:attrNameLst>
+                                          <p:attrName>ppt_x</p:attrName>
+                                        </p:attrNameLst>
+                                      </p:cBhvr>
+                                      <p:tavLst>
+                                        <p:tav tm="0">
+                                          <p:val>
+                                            <p:strVal val="#ppt_x"/>
+                                          </p:val>
+                                        </p:tav>
+                                        <p:tav tm="100000">
+                                          <p:val>
+                                            <p:strVal val="#ppt_x"/>
+                                          </p:val>
+                                        </p:tav>
+                                      </p:tavLst>
+                                    </p:anim>
+                                    <p:anim calcmode="lin" valueType="num">
+                                      <p:cBhvr additive="base">
+                                        <p:cTn id="26" dur="500" fill="hold"/>
+                                        <p:tgtEl>
+                                          <p:spTgt spid="7"/>
+                                        </p:tgtEl>
+                                        <p:attrNameLst>
+                                          <p:attrName>ppt_y</p:attrName>
+                                        </p:attrNameLst>
+                                      </p:cBhvr>
+                                      <p:tavLst>
+                                        <p:tav tm="0">
+                                          <p:val>
+                                            <p:strVal val="1+#ppt_h/2"/>
+                                          </p:val>
+                                        </p:tav>
+                                        <p:tav tm="100000">
+                                          <p:val>
+                                            <p:strVal val="#ppt_y"/>
+                                          </p:val>
+                                        </p:tav>
+                                      </p:tavLst>
+                                    </p:anim>
+                                  </p:childTnLst>
+                                </p:cTn>
+                              </p:par>
+                            </p:childTnLst>
+                          </p:cTn>
+                        </p:par>
+                      </p:childTnLst>
+                    </p:cTn>
+                  </p:par>
+                  <p:par>
+                    <p:cTn id="27" fill="hold">
+                      <p:stCondLst>
+                        <p:cond delay="indefinite"/>
+                      </p:stCondLst>
+                      <p:childTnLst>
+                        <p:par>
+                          <p:cTn id="28" fill="hold">
+                            <p:stCondLst>
+                              <p:cond delay="0"/>
+                            </p:stCondLst>
+                            <p:childTnLst>
+                              <p:par>
+                                <p:cTn id="29" presetID="2" presetClass="entr" presetSubtype="4" fill="hold" nodeType="clickEffect">
+                                  <p:stCondLst>
+                                    <p:cond delay="0"/>
+                                  </p:stCondLst>
+                                  <p:childTnLst>
+                                    <p:set>
+                                      <p:cBhvr>
+                                        <p:cTn id="30" dur="1" fill="hold">
+                                          <p:stCondLst>
+                                            <p:cond delay="0"/>
+                                          </p:stCondLst>
+                                        </p:cTn>
+                                        <p:tgtEl>
+                                          <p:spTgt spid="8"/>
+                                        </p:tgtEl>
+                                        <p:attrNameLst>
+                                          <p:attrName>style.visibility</p:attrName>
+                                        </p:attrNameLst>
+                                      </p:cBhvr>
+                                      <p:to>
+                                        <p:strVal val="visible"/>
+                                      </p:to>
+                                    </p:set>
+                                    <p:anim calcmode="lin" valueType="num">
+                                      <p:cBhvr additive="base">
+                                        <p:cTn id="31" dur="500" fill="hold"/>
+                                        <p:tgtEl>
+                                          <p:spTgt spid="8"/>
+                                        </p:tgtEl>
+                                        <p:attrNameLst>
+                                          <p:attrName>ppt_x</p:attrName>
+                                        </p:attrNameLst>
+                                      </p:cBhvr>
+                                      <p:tavLst>
+                                        <p:tav tm="0">
+                                          <p:val>
+                                            <p:strVal val="#ppt_x"/>
+                                          </p:val>
+                                        </p:tav>
+                                        <p:tav tm="100000">
+                                          <p:val>
+                                            <p:strVal val="#ppt_x"/>
+                                          </p:val>
+                                        </p:tav>
+                                      </p:tavLst>
+                                    </p:anim>
+                                    <p:anim calcmode="lin" valueType="num">
+                                      <p:cBhvr additive="base">
+                                        <p:cTn id="32" dur="500" fill="hold"/>
+                                        <p:tgtEl>
+                                          <p:spTgt spid="8"/>
+                                        </p:tgtEl>
+                                        <p:attrNameLst>
+                                          <p:attrName>ppt_y</p:attrName>
+                                        </p:attrNameLst>
+                                      </p:cBhvr>
+                                      <p:tavLst>
+                                        <p:tav tm="0">
+                                          <p:val>
+                                            <p:strVal val="1+#ppt_h/2"/>
+                                          </p:val>
+                                        </p:tav>
+                                        <p:tav tm="100000">
+                                          <p:val>
+                                            <p:strVal val="#ppt_y"/>
+                                          </p:val>
+                                        </p:tav>
+                                      </p:tavLst>
+                                    </p:anim>
                                   </p:childTnLst>
                                 </p:cTn>
                               </p:par>
@@ -4736,7 +5014,7 @@
           <a:blip r:embed="rId2" cstate="print">
             <a:extLst>
               <a:ext uri="{28A0092B-C50C-407E-A947-70E740481C1C}">
-                <a14:useLocalDpi xmlns:a14="http://schemas.microsoft.com/office/drawing/2010/main" xmlns="" val="0"/>
+                <a14:useLocalDpi xmlns="" xmlns:a14="http://schemas.microsoft.com/office/drawing/2010/main" val="0"/>
               </a:ext>
             </a:extLst>
           </a:blip>
@@ -4766,7 +5044,7 @@
           <a:blip r:embed="rId3" cstate="print">
             <a:extLst>
               <a:ext uri="{28A0092B-C50C-407E-A947-70E740481C1C}">
-                <a14:useLocalDpi xmlns:a14="http://schemas.microsoft.com/office/drawing/2010/main" xmlns="" val="0"/>
+                <a14:useLocalDpi xmlns="" xmlns:a14="http://schemas.microsoft.com/office/drawing/2010/main" val="0"/>
               </a:ext>
             </a:extLst>
           </a:blip>
@@ -4811,7 +5089,7 @@
                 <a:latin typeface="나눔고딕 ExtraBold" panose="020D0904000000000000" pitchFamily="50" charset="-127"/>
                 <a:ea typeface="나눔고딕 ExtraBold" panose="020D0904000000000000" pitchFamily="50" charset="-127"/>
               </a:rPr>
-              <a:t>Mid-Result!</a:t>
+              <a:t>Final-Result!</a:t>
             </a:r>
             <a:endParaRPr lang="ko-KR" altLang="en-US" sz="5400" dirty="0">
               <a:latin typeface="나눔고딕 ExtraBold" panose="020D0904000000000000" pitchFamily="50" charset="-127"/>
@@ -4822,7 +5100,7 @@
       </p:sp>
       <p:pic>
         <p:nvPicPr>
-          <p:cNvPr id="6" name="그림 5"/>
+          <p:cNvPr id="2" name="그림 1"/>
           <p:cNvPicPr>
             <a:picLocks noChangeAspect="1"/>
           </p:cNvPicPr>
@@ -4832,7 +5110,7 @@
           <a:blip r:embed="rId4" cstate="print">
             <a:extLst>
               <a:ext uri="{28A0092B-C50C-407E-A947-70E740481C1C}">
-                <a14:useLocalDpi xmlns:a14="http://schemas.microsoft.com/office/drawing/2010/main" xmlns="" val="0"/>
+                <a14:useLocalDpi xmlns="" xmlns:a14="http://schemas.microsoft.com/office/drawing/2010/main" val="0"/>
               </a:ext>
             </a:extLst>
           </a:blip>
@@ -4842,8 +5120,8 @@
         </p:blipFill>
         <p:spPr>
           <a:xfrm>
-            <a:off x="838126" y="2090443"/>
-            <a:ext cx="2708709" cy="4498893"/>
+            <a:off x="1261382" y="1325058"/>
+            <a:ext cx="3105150" cy="5362575"/>
           </a:xfrm>
           <a:prstGeom prst="rect">
             <a:avLst/>
@@ -4852,7 +5130,7 @@
       </p:pic>
       <p:pic>
         <p:nvPicPr>
-          <p:cNvPr id="7" name="그림 6"/>
+          <p:cNvPr id="9" name="그림 8"/>
           <p:cNvPicPr>
             <a:picLocks noChangeAspect="1"/>
           </p:cNvPicPr>
@@ -4862,7 +5140,7 @@
           <a:blip r:embed="rId5" cstate="print">
             <a:extLst>
               <a:ext uri="{28A0092B-C50C-407E-A947-70E740481C1C}">
-                <a14:useLocalDpi xmlns:a14="http://schemas.microsoft.com/office/drawing/2010/main" xmlns="" val="0"/>
+                <a14:useLocalDpi xmlns="" xmlns:a14="http://schemas.microsoft.com/office/drawing/2010/main" val="0"/>
               </a:ext>
             </a:extLst>
           </a:blip>
@@ -4872,8 +5150,8 @@
         </p:blipFill>
         <p:spPr>
           <a:xfrm>
-            <a:off x="3586118" y="2090442"/>
-            <a:ext cx="2708709" cy="4498893"/>
+            <a:off x="4366532" y="1122971"/>
+            <a:ext cx="3171825" cy="5538146"/>
           </a:xfrm>
           <a:prstGeom prst="rect">
             <a:avLst/>
@@ -4882,7 +5160,7 @@
       </p:pic>
       <p:pic>
         <p:nvPicPr>
-          <p:cNvPr id="8" name="그림 7"/>
+          <p:cNvPr id="10" name="그림 9"/>
           <p:cNvPicPr>
             <a:picLocks noChangeAspect="1"/>
           </p:cNvPicPr>
@@ -4892,7 +5170,7 @@
           <a:blip r:embed="rId6" cstate="print">
             <a:extLst>
               <a:ext uri="{28A0092B-C50C-407E-A947-70E740481C1C}">
-                <a14:useLocalDpi xmlns:a14="http://schemas.microsoft.com/office/drawing/2010/main" xmlns="" val="0"/>
+                <a14:useLocalDpi xmlns="" xmlns:a14="http://schemas.microsoft.com/office/drawing/2010/main" val="0"/>
               </a:ext>
             </a:extLst>
           </a:blip>
@@ -4902,8 +5180,8 @@
         </p:blipFill>
         <p:spPr>
           <a:xfrm>
-            <a:off x="6268663" y="2513445"/>
-            <a:ext cx="5844618" cy="3652886"/>
+            <a:off x="7547201" y="1105982"/>
+            <a:ext cx="3143250" cy="5572125"/>
           </a:xfrm>
           <a:prstGeom prst="rect">
             <a:avLst/>
@@ -4913,7 +5191,7 @@
     </p:spTree>
     <p:extLst>
       <p:ext uri="{BB962C8B-B14F-4D97-AF65-F5344CB8AC3E}">
-        <p14:creationId xmlns:p14="http://schemas.microsoft.com/office/powerpoint/2010/main" xmlns="" val="1657933370"/>
+        <p14:creationId xmlns="" xmlns:p14="http://schemas.microsoft.com/office/powerpoint/2010/main" val="505354097"/>
       </p:ext>
     </p:extLst>
   </p:cSld>
@@ -5134,7 +5412,7 @@
                                           </p:stCondLst>
                                         </p:cTn>
                                         <p:tgtEl>
-                                          <p:spTgt spid="6"/>
+                                          <p:spTgt spid="2"/>
                                         </p:tgtEl>
                                         <p:attrNameLst>
                                           <p:attrName>style.visibility</p:attrName>
@@ -5148,7 +5426,7 @@
                                       <p:cBhvr additive="base">
                                         <p:cTn id="19" dur="500" fill="hold"/>
                                         <p:tgtEl>
-                                          <p:spTgt spid="6"/>
+                                          <p:spTgt spid="2"/>
                                         </p:tgtEl>
                                         <p:attrNameLst>
                                           <p:attrName>ppt_x</p:attrName>
@@ -5171,7 +5449,7 @@
                                       <p:cBhvr additive="base">
                                         <p:cTn id="20" dur="500" fill="hold"/>
                                         <p:tgtEl>
-                                          <p:spTgt spid="6"/>
+                                          <p:spTgt spid="2"/>
                                         </p:tgtEl>
                                         <p:attrNameLst>
                                           <p:attrName>ppt_y</p:attrName>
@@ -5225,7 +5503,7 @@
                                           </p:stCondLst>
                                         </p:cTn>
                                         <p:tgtEl>
-                                          <p:spTgt spid="7"/>
+                                          <p:spTgt spid="9"/>
                                         </p:tgtEl>
                                         <p:attrNameLst>
                                           <p:attrName>style.visibility</p:attrName>
@@ -5239,7 +5517,7 @@
                                       <p:cBhvr additive="base">
                                         <p:cTn id="25" dur="500" fill="hold"/>
                                         <p:tgtEl>
-                                          <p:spTgt spid="7"/>
+                                          <p:spTgt spid="9"/>
                                         </p:tgtEl>
                                         <p:attrNameLst>
                                           <p:attrName>ppt_x</p:attrName>
@@ -5262,7 +5540,7 @@
                                       <p:cBhvr additive="base">
                                         <p:cTn id="26" dur="500" fill="hold"/>
                                         <p:tgtEl>
-                                          <p:spTgt spid="7"/>
+                                          <p:spTgt spid="9"/>
                                         </p:tgtEl>
                                         <p:attrNameLst>
                                           <p:attrName>ppt_y</p:attrName>
@@ -5316,7 +5594,7 @@
                                           </p:stCondLst>
                                         </p:cTn>
                                         <p:tgtEl>
-                                          <p:spTgt spid="8"/>
+                                          <p:spTgt spid="10"/>
                                         </p:tgtEl>
                                         <p:attrNameLst>
                                           <p:attrName>style.visibility</p:attrName>
@@ -5330,7 +5608,7 @@
                                       <p:cBhvr additive="base">
                                         <p:cTn id="31" dur="500" fill="hold"/>
                                         <p:tgtEl>
-                                          <p:spTgt spid="8"/>
+                                          <p:spTgt spid="10"/>
                                         </p:tgtEl>
                                         <p:attrNameLst>
                                           <p:attrName>ppt_x</p:attrName>
@@ -5353,7 +5631,7 @@
                                       <p:cBhvr additive="base">
                                         <p:cTn id="32" dur="500" fill="hold"/>
                                         <p:tgtEl>
-                                          <p:spTgt spid="8"/>
+                                          <p:spTgt spid="10"/>
                                         </p:tgtEl>
                                         <p:attrNameLst>
                                           <p:attrName>ppt_y</p:attrName>
@@ -5438,7 +5716,7 @@
           <a:blip r:embed="rId2" cstate="print">
             <a:extLst>
               <a:ext uri="{28A0092B-C50C-407E-A947-70E740481C1C}">
-                <a14:useLocalDpi xmlns:a14="http://schemas.microsoft.com/office/drawing/2010/main" xmlns="" val="0"/>
+                <a14:useLocalDpi xmlns="" xmlns:a14="http://schemas.microsoft.com/office/drawing/2010/main" val="0"/>
               </a:ext>
             </a:extLst>
           </a:blip>
@@ -5468,7 +5746,7 @@
           <a:blip r:embed="rId3" cstate="print">
             <a:extLst>
               <a:ext uri="{28A0092B-C50C-407E-A947-70E740481C1C}">
-                <a14:useLocalDpi xmlns:a14="http://schemas.microsoft.com/office/drawing/2010/main" xmlns="" val="0"/>
+                <a14:useLocalDpi xmlns="" xmlns:a14="http://schemas.microsoft.com/office/drawing/2010/main" val="0"/>
               </a:ext>
             </a:extLst>
           </a:blip>
@@ -5513,7 +5791,7 @@
                 <a:latin typeface="나눔고딕 ExtraBold" panose="020D0904000000000000" pitchFamily="50" charset="-127"/>
                 <a:ea typeface="나눔고딕 ExtraBold" panose="020D0904000000000000" pitchFamily="50" charset="-127"/>
               </a:rPr>
-              <a:t>Final-Result!</a:t>
+              <a:t>Reference &amp; License</a:t>
             </a:r>
             <a:endParaRPr lang="ko-KR" altLang="en-US" sz="5400" dirty="0">
               <a:latin typeface="나눔고딕 ExtraBold" panose="020D0904000000000000" pitchFamily="50" charset="-127"/>
@@ -5522,100 +5800,120 @@
           </a:p>
         </p:txBody>
       </p:sp>
-      <p:pic>
-        <p:nvPicPr>
-          <p:cNvPr id="2" name="그림 1"/>
-          <p:cNvPicPr>
-            <a:picLocks noChangeAspect="1"/>
-          </p:cNvPicPr>
+      <p:sp>
+        <p:nvSpPr>
+          <p:cNvPr id="2" name="TextBox 1"/>
+          <p:cNvSpPr txBox="1"/>
           <p:nvPr/>
-        </p:nvPicPr>
-        <p:blipFill>
-          <a:blip r:embed="rId4" cstate="print">
-            <a:extLst>
-              <a:ext uri="{28A0092B-C50C-407E-A947-70E740481C1C}">
-                <a14:useLocalDpi xmlns:a14="http://schemas.microsoft.com/office/drawing/2010/main" xmlns="" val="0"/>
-              </a:ext>
-            </a:extLst>
-          </a:blip>
-          <a:stretch>
-            <a:fillRect/>
-          </a:stretch>
-        </p:blipFill>
+        </p:nvSpPr>
         <p:spPr>
           <a:xfrm>
-            <a:off x="1261382" y="1325058"/>
-            <a:ext cx="3105150" cy="5362575"/>
+            <a:off x="1159329" y="2057400"/>
+            <a:ext cx="7984671" cy="3231654"/>
           </a:xfrm>
           <a:prstGeom prst="rect">
             <a:avLst/>
           </a:prstGeom>
+          <a:noFill/>
         </p:spPr>
-      </p:pic>
-      <p:pic>
-        <p:nvPicPr>
-          <p:cNvPr id="9" name="그림 8"/>
-          <p:cNvPicPr>
-            <a:picLocks noChangeAspect="1"/>
-          </p:cNvPicPr>
-          <p:nvPr/>
-        </p:nvPicPr>
-        <p:blipFill>
-          <a:blip r:embed="rId5" cstate="print">
-            <a:extLst>
-              <a:ext uri="{28A0092B-C50C-407E-A947-70E740481C1C}">
-                <a14:useLocalDpi xmlns:a14="http://schemas.microsoft.com/office/drawing/2010/main" xmlns="" val="0"/>
-              </a:ext>
-            </a:extLst>
-          </a:blip>
-          <a:stretch>
-            <a:fillRect/>
-          </a:stretch>
-        </p:blipFill>
-        <p:spPr>
-          <a:xfrm>
-            <a:off x="4366532" y="1122971"/>
-            <a:ext cx="3171825" cy="5538146"/>
-          </a:xfrm>
-          <a:prstGeom prst="rect">
-            <a:avLst/>
-          </a:prstGeom>
-        </p:spPr>
-      </p:pic>
-      <p:pic>
-        <p:nvPicPr>
-          <p:cNvPr id="10" name="그림 9"/>
-          <p:cNvPicPr>
-            <a:picLocks noChangeAspect="1"/>
-          </p:cNvPicPr>
-          <p:nvPr/>
-        </p:nvPicPr>
-        <p:blipFill>
-          <a:blip r:embed="rId6" cstate="print">
-            <a:extLst>
-              <a:ext uri="{28A0092B-C50C-407E-A947-70E740481C1C}">
-                <a14:useLocalDpi xmlns:a14="http://schemas.microsoft.com/office/drawing/2010/main" xmlns="" val="0"/>
-              </a:ext>
-            </a:extLst>
-          </a:blip>
-          <a:stretch>
-            <a:fillRect/>
-          </a:stretch>
-        </p:blipFill>
-        <p:spPr>
-          <a:xfrm>
-            <a:off x="7547201" y="1105982"/>
-            <a:ext cx="3143250" cy="5572125"/>
-          </a:xfrm>
-          <a:prstGeom prst="rect">
-            <a:avLst/>
-          </a:prstGeom>
-        </p:spPr>
-      </p:pic>
+        <p:txBody>
+          <a:bodyPr wrap="square" rtlCol="0">
+            <a:spAutoFit/>
+          </a:bodyPr>
+          <a:lstStyle/>
+          <a:p>
+            <a:r>
+              <a:rPr lang="en-US" altLang="ko-KR" sz="2400" dirty="0" smtClean="0">
+                <a:latin typeface="나눔고딕 ExtraBold" panose="020D0904000000000000" pitchFamily="50" charset="-127"/>
+                <a:ea typeface="나눔고딕 ExtraBold" panose="020D0904000000000000" pitchFamily="50" charset="-127"/>
+              </a:rPr>
+              <a:t>Reference(lecture)</a:t>
+            </a:r>
+          </a:p>
+          <a:p>
+            <a:pPr marL="285750" indent="-285750">
+              <a:buFontTx/>
+              <a:buChar char="-"/>
+            </a:pPr>
+            <a:r>
+              <a:rPr lang="en-US" altLang="ko-KR" sz="2400" dirty="0" err="1" smtClean="0">
+                <a:latin typeface="나눔고딕 ExtraBold" panose="020D0904000000000000" pitchFamily="50" charset="-127"/>
+                <a:ea typeface="나눔고딕 ExtraBold" panose="020D0904000000000000" pitchFamily="50" charset="-127"/>
+              </a:rPr>
+              <a:t>git</a:t>
+            </a:r>
+            <a:r>
+              <a:rPr lang="en-US" altLang="ko-KR" sz="2400" dirty="0" smtClean="0">
+                <a:latin typeface="나눔고딕 ExtraBold" panose="020D0904000000000000" pitchFamily="50" charset="-127"/>
+                <a:ea typeface="나눔고딕 ExtraBold" panose="020D0904000000000000" pitchFamily="50" charset="-127"/>
+              </a:rPr>
+              <a:t>\2016msami\reference.txt</a:t>
+            </a:r>
+          </a:p>
+          <a:p>
+            <a:pPr marL="285750" indent="-285750">
+              <a:buFontTx/>
+              <a:buChar char="-"/>
+            </a:pPr>
+            <a:endParaRPr lang="en-US" altLang="ko-KR" sz="2400" dirty="0" smtClean="0">
+              <a:latin typeface="나눔고딕 ExtraBold" panose="020D0904000000000000" pitchFamily="50" charset="-127"/>
+              <a:ea typeface="나눔고딕 ExtraBold" panose="020D0904000000000000" pitchFamily="50" charset="-127"/>
+            </a:endParaRPr>
+          </a:p>
+          <a:p>
+            <a:pPr marL="285750" indent="-285750">
+              <a:buFontTx/>
+              <a:buChar char="-"/>
+            </a:pPr>
+            <a:endParaRPr lang="en-US" altLang="ko-KR" sz="2400" dirty="0">
+              <a:latin typeface="나눔고딕 ExtraBold" panose="020D0904000000000000" pitchFamily="50" charset="-127"/>
+              <a:ea typeface="나눔고딕 ExtraBold" panose="020D0904000000000000" pitchFamily="50" charset="-127"/>
+            </a:endParaRPr>
+          </a:p>
+          <a:p>
+            <a:pPr marL="285750" indent="-285750">
+              <a:buFontTx/>
+              <a:buChar char="-"/>
+            </a:pPr>
+            <a:endParaRPr lang="en-US" altLang="ko-KR" sz="2400" dirty="0">
+              <a:latin typeface="나눔고딕 ExtraBold" panose="020D0904000000000000" pitchFamily="50" charset="-127"/>
+              <a:ea typeface="나눔고딕 ExtraBold" panose="020D0904000000000000" pitchFamily="50" charset="-127"/>
+            </a:endParaRPr>
+          </a:p>
+          <a:p>
+            <a:r>
+              <a:rPr lang="en-US" altLang="ko-KR" sz="2400" dirty="0" smtClean="0">
+                <a:latin typeface="나눔고딕 ExtraBold" panose="020D0904000000000000" pitchFamily="50" charset="-127"/>
+                <a:ea typeface="나눔고딕 ExtraBold" panose="020D0904000000000000" pitchFamily="50" charset="-127"/>
+              </a:rPr>
+              <a:t>License</a:t>
+            </a:r>
+          </a:p>
+          <a:p>
+            <a:r>
+              <a:rPr lang="en-US" altLang="ko-KR" sz="2400" dirty="0" smtClean="0">
+                <a:latin typeface="나눔고딕 ExtraBold" panose="020D0904000000000000" pitchFamily="50" charset="-127"/>
+                <a:ea typeface="나눔고딕 ExtraBold" panose="020D0904000000000000" pitchFamily="50" charset="-127"/>
+              </a:rPr>
+              <a:t>- Apache 2.0</a:t>
+            </a:r>
+          </a:p>
+          <a:p>
+            <a:pPr marL="285750" indent="-285750">
+              <a:buFontTx/>
+              <a:buChar char="-"/>
+            </a:pPr>
+            <a:endParaRPr lang="en-US" altLang="ko-KR" dirty="0"/>
+          </a:p>
+          <a:p>
+            <a:endParaRPr lang="en-US" altLang="ko-KR" dirty="0" smtClean="0"/>
+          </a:p>
+        </p:txBody>
+      </p:sp>
     </p:spTree>
     <p:extLst>
       <p:ext uri="{BB962C8B-B14F-4D97-AF65-F5344CB8AC3E}">
-        <p14:creationId xmlns:p14="http://schemas.microsoft.com/office/powerpoint/2010/main" xmlns="" val="505354097"/>
+        <p14:creationId xmlns="" xmlns:p14="http://schemas.microsoft.com/office/powerpoint/2010/main" val="3704109737"/>
       </p:ext>
     </p:extLst>
   </p:cSld>
@@ -5823,7 +6121,7 @@
                             </p:stCondLst>
                             <p:childTnLst>
                               <p:par>
-                                <p:cTn id="17" presetID="2" presetClass="entr" presetSubtype="4" fill="hold" nodeType="clickEffect">
+                                <p:cTn id="17" presetID="10" presetClass="entr" presetSubtype="0" fill="hold" nodeType="clickEffect">
                                   <p:stCondLst>
                                     <p:cond delay="0"/>
                                   </p:stCondLst>
@@ -5836,7 +6134,11 @@
                                           </p:stCondLst>
                                         </p:cTn>
                                         <p:tgtEl>
-                                          <p:spTgt spid="2"/>
+                                          <p:spTgt spid="2">
+                                            <p:txEl>
+                                              <p:pRg st="0" end="0"/>
+                                            </p:txEl>
+                                          </p:spTgt>
                                         </p:tgtEl>
                                         <p:attrNameLst>
                                           <p:attrName>style.visibility</p:attrName>
@@ -5846,52 +6148,18 @@
                                         <p:strVal val="visible"/>
                                       </p:to>
                                     </p:set>
-                                    <p:anim calcmode="lin" valueType="num">
-                                      <p:cBhvr additive="base">
-                                        <p:cTn id="19" dur="500" fill="hold"/>
-                                        <p:tgtEl>
-                                          <p:spTgt spid="2"/>
-                                        </p:tgtEl>
-                                        <p:attrNameLst>
-                                          <p:attrName>ppt_x</p:attrName>
-                                        </p:attrNameLst>
-                                      </p:cBhvr>
-                                      <p:tavLst>
-                                        <p:tav tm="0">
-                                          <p:val>
-                                            <p:strVal val="#ppt_x"/>
-                                          </p:val>
-                                        </p:tav>
-                                        <p:tav tm="100000">
-                                          <p:val>
-                                            <p:strVal val="#ppt_x"/>
-                                          </p:val>
-                                        </p:tav>
-                                      </p:tavLst>
-                                    </p:anim>
-                                    <p:anim calcmode="lin" valueType="num">
-                                      <p:cBhvr additive="base">
-                                        <p:cTn id="20" dur="500" fill="hold"/>
-                                        <p:tgtEl>
-                                          <p:spTgt spid="2"/>
-                                        </p:tgtEl>
-                                        <p:attrNameLst>
-                                          <p:attrName>ppt_y</p:attrName>
-                                        </p:attrNameLst>
-                                      </p:cBhvr>
-                                      <p:tavLst>
-                                        <p:tav tm="0">
-                                          <p:val>
-                                            <p:strVal val="1+#ppt_h/2"/>
-                                          </p:val>
-                                        </p:tav>
-                                        <p:tav tm="100000">
-                                          <p:val>
-                                            <p:strVal val="#ppt_y"/>
-                                          </p:val>
-                                        </p:tav>
-                                      </p:tavLst>
-                                    </p:anim>
+                                    <p:animEffect transition="in" filter="fade">
+                                      <p:cBhvr>
+                                        <p:cTn id="19" dur="500"/>
+                                        <p:tgtEl>
+                                          <p:spTgt spid="2">
+                                            <p:txEl>
+                                              <p:pRg st="0" end="0"/>
+                                            </p:txEl>
+                                          </p:spTgt>
+                                        </p:tgtEl>
+                                      </p:cBhvr>
+                                    </p:animEffect>
                                   </p:childTnLst>
                                 </p:cTn>
                               </p:par>
@@ -5902,32 +6170,36 @@
                     </p:cTn>
                   </p:par>
                   <p:par>
-                    <p:cTn id="21" fill="hold">
+                    <p:cTn id="20" fill="hold">
                       <p:stCondLst>
                         <p:cond delay="indefinite"/>
                       </p:stCondLst>
                       <p:childTnLst>
                         <p:par>
-                          <p:cTn id="22" fill="hold">
+                          <p:cTn id="21" fill="hold">
                             <p:stCondLst>
                               <p:cond delay="0"/>
                             </p:stCondLst>
                             <p:childTnLst>
                               <p:par>
-                                <p:cTn id="23" presetID="2" presetClass="entr" presetSubtype="4" fill="hold" nodeType="clickEffect">
+                                <p:cTn id="22" presetID="10" presetClass="entr" presetSubtype="0" fill="hold" nodeType="clickEffect">
                                   <p:stCondLst>
                                     <p:cond delay="0"/>
                                   </p:stCondLst>
                                   <p:childTnLst>
                                     <p:set>
                                       <p:cBhvr>
-                                        <p:cTn id="24" dur="1" fill="hold">
+                                        <p:cTn id="23" dur="1" fill="hold">
                                           <p:stCondLst>
                                             <p:cond delay="0"/>
                                           </p:stCondLst>
                                         </p:cTn>
                                         <p:tgtEl>
-                                          <p:spTgt spid="9"/>
+                                          <p:spTgt spid="2">
+                                            <p:txEl>
+                                              <p:pRg st="1" end="1"/>
+                                            </p:txEl>
+                                          </p:spTgt>
                                         </p:tgtEl>
                                         <p:attrNameLst>
                                           <p:attrName>style.visibility</p:attrName>
@@ -5937,52 +6209,18 @@
                                         <p:strVal val="visible"/>
                                       </p:to>
                                     </p:set>
-                                    <p:anim calcmode="lin" valueType="num">
-                                      <p:cBhvr additive="base">
-                                        <p:cTn id="25" dur="500" fill="hold"/>
-                                        <p:tgtEl>
-                                          <p:spTgt spid="9"/>
-                                        </p:tgtEl>
-                                        <p:attrNameLst>
-                                          <p:attrName>ppt_x</p:attrName>
-                                        </p:attrNameLst>
-                                      </p:cBhvr>
-                                      <p:tavLst>
-                                        <p:tav tm="0">
-                                          <p:val>
-                                            <p:strVal val="#ppt_x"/>
-                                          </p:val>
-                                        </p:tav>
-                                        <p:tav tm="100000">
-                                          <p:val>
-                                            <p:strVal val="#ppt_x"/>
-                                          </p:val>
-                                        </p:tav>
-                                      </p:tavLst>
-                                    </p:anim>
-                                    <p:anim calcmode="lin" valueType="num">
-                                      <p:cBhvr additive="base">
-                                        <p:cTn id="26" dur="500" fill="hold"/>
-                                        <p:tgtEl>
-                                          <p:spTgt spid="9"/>
-                                        </p:tgtEl>
-                                        <p:attrNameLst>
-                                          <p:attrName>ppt_y</p:attrName>
-                                        </p:attrNameLst>
-                                      </p:cBhvr>
-                                      <p:tavLst>
-                                        <p:tav tm="0">
-                                          <p:val>
-                                            <p:strVal val="1+#ppt_h/2"/>
-                                          </p:val>
-                                        </p:tav>
-                                        <p:tav tm="100000">
-                                          <p:val>
-                                            <p:strVal val="#ppt_y"/>
-                                          </p:val>
-                                        </p:tav>
-                                      </p:tavLst>
-                                    </p:anim>
+                                    <p:animEffect transition="in" filter="fade">
+                                      <p:cBhvr>
+                                        <p:cTn id="24" dur="500"/>
+                                        <p:tgtEl>
+                                          <p:spTgt spid="2">
+                                            <p:txEl>
+                                              <p:pRg st="1" end="1"/>
+                                            </p:txEl>
+                                          </p:spTgt>
+                                        </p:tgtEl>
+                                      </p:cBhvr>
+                                    </p:animEffect>
                                   </p:childTnLst>
                                 </p:cTn>
                               </p:par>
@@ -5993,32 +6231,36 @@
                     </p:cTn>
                   </p:par>
                   <p:par>
-                    <p:cTn id="27" fill="hold">
+                    <p:cTn id="25" fill="hold">
                       <p:stCondLst>
                         <p:cond delay="indefinite"/>
                       </p:stCondLst>
                       <p:childTnLst>
                         <p:par>
-                          <p:cTn id="28" fill="hold">
+                          <p:cTn id="26" fill="hold">
                             <p:stCondLst>
                               <p:cond delay="0"/>
                             </p:stCondLst>
                             <p:childTnLst>
                               <p:par>
-                                <p:cTn id="29" presetID="2" presetClass="entr" presetSubtype="4" fill="hold" nodeType="clickEffect">
+                                <p:cTn id="27" presetID="10" presetClass="entr" presetSubtype="0" fill="hold" nodeType="clickEffect">
                                   <p:stCondLst>
                                     <p:cond delay="0"/>
                                   </p:stCondLst>
                                   <p:childTnLst>
                                     <p:set>
                                       <p:cBhvr>
-                                        <p:cTn id="30" dur="1" fill="hold">
+                                        <p:cTn id="28" dur="1" fill="hold">
                                           <p:stCondLst>
                                             <p:cond delay="0"/>
                                           </p:stCondLst>
                                         </p:cTn>
                                         <p:tgtEl>
-                                          <p:spTgt spid="10"/>
+                                          <p:spTgt spid="2">
+                                            <p:txEl>
+                                              <p:pRg st="5" end="5"/>
+                                            </p:txEl>
+                                          </p:spTgt>
                                         </p:tgtEl>
                                         <p:attrNameLst>
                                           <p:attrName>style.visibility</p:attrName>
@@ -6028,52 +6270,61 @@
                                         <p:strVal val="visible"/>
                                       </p:to>
                                     </p:set>
-                                    <p:anim calcmode="lin" valueType="num">
-                                      <p:cBhvr additive="base">
-                                        <p:cTn id="31" dur="500" fill="hold"/>
-                                        <p:tgtEl>
-                                          <p:spTgt spid="10"/>
-                                        </p:tgtEl>
-                                        <p:attrNameLst>
-                                          <p:attrName>ppt_x</p:attrName>
-                                        </p:attrNameLst>
-                                      </p:cBhvr>
-                                      <p:tavLst>
-                                        <p:tav tm="0">
-                                          <p:val>
-                                            <p:strVal val="#ppt_x"/>
-                                          </p:val>
-                                        </p:tav>
-                                        <p:tav tm="100000">
-                                          <p:val>
-                                            <p:strVal val="#ppt_x"/>
-                                          </p:val>
-                                        </p:tav>
-                                      </p:tavLst>
-                                    </p:anim>
-                                    <p:anim calcmode="lin" valueType="num">
-                                      <p:cBhvr additive="base">
-                                        <p:cTn id="32" dur="500" fill="hold"/>
-                                        <p:tgtEl>
-                                          <p:spTgt spid="10"/>
-                                        </p:tgtEl>
-                                        <p:attrNameLst>
-                                          <p:attrName>ppt_y</p:attrName>
-                                        </p:attrNameLst>
-                                      </p:cBhvr>
-                                      <p:tavLst>
-                                        <p:tav tm="0">
-                                          <p:val>
-                                            <p:strVal val="1+#ppt_h/2"/>
-                                          </p:val>
-                                        </p:tav>
-                                        <p:tav tm="100000">
-                                          <p:val>
-                                            <p:strVal val="#ppt_y"/>
-                                          </p:val>
-                                        </p:tav>
-                                      </p:tavLst>
-                                    </p:anim>
+                                    <p:animEffect transition="in" filter="fade">
+                                      <p:cBhvr>
+                                        <p:cTn id="29" dur="500"/>
+                                        <p:tgtEl>
+                                          <p:spTgt spid="2">
+                                            <p:txEl>
+                                              <p:pRg st="5" end="5"/>
+                                            </p:txEl>
+                                          </p:spTgt>
+                                        </p:tgtEl>
+                                      </p:cBhvr>
+                                    </p:animEffect>
+                                  </p:childTnLst>
+                                </p:cTn>
+                              </p:par>
+                              <p:par>
+                                <p:cTn id="30" presetID="10" presetClass="entr" presetSubtype="0" fill="hold" nodeType="withEffect">
+                                  <p:stCondLst>
+                                    <p:cond delay="0"/>
+                                  </p:stCondLst>
+                                  <p:childTnLst>
+                                    <p:set>
+                                      <p:cBhvr>
+                                        <p:cTn id="31" dur="1" fill="hold">
+                                          <p:stCondLst>
+                                            <p:cond delay="0"/>
+                                          </p:stCondLst>
+                                        </p:cTn>
+                                        <p:tgtEl>
+                                          <p:spTgt spid="2">
+                                            <p:txEl>
+                                              <p:pRg st="6" end="6"/>
+                                            </p:txEl>
+                                          </p:spTgt>
+                                        </p:tgtEl>
+                                        <p:attrNameLst>
+                                          <p:attrName>style.visibility</p:attrName>
+                                        </p:attrNameLst>
+                                      </p:cBhvr>
+                                      <p:to>
+                                        <p:strVal val="visible"/>
+                                      </p:to>
+                                    </p:set>
+                                    <p:animEffect transition="in" filter="fade">
+                                      <p:cBhvr>
+                                        <p:cTn id="32" dur="500"/>
+                                        <p:tgtEl>
+                                          <p:spTgt spid="2">
+                                            <p:txEl>
+                                              <p:pRg st="6" end="6"/>
+                                            </p:txEl>
+                                          </p:spTgt>
+                                        </p:tgtEl>
+                                      </p:cBhvr>
+                                    </p:animEffect>
                                   </p:childTnLst>
                                 </p:cTn>
                               </p:par>
@@ -6140,686 +6391,7 @@
           <a:blip r:embed="rId2" cstate="print">
             <a:extLst>
               <a:ext uri="{28A0092B-C50C-407E-A947-70E740481C1C}">
-                <a14:useLocalDpi xmlns:a14="http://schemas.microsoft.com/office/drawing/2010/main" xmlns="" val="0"/>
-              </a:ext>
-            </a:extLst>
-          </a:blip>
-          <a:stretch>
-            <a:fillRect/>
-          </a:stretch>
-        </p:blipFill>
-        <p:spPr>
-          <a:xfrm>
-            <a:off x="6216261" y="3494083"/>
-            <a:ext cx="5975739" cy="3363917"/>
-          </a:xfrm>
-          <a:prstGeom prst="rect">
-            <a:avLst/>
-          </a:prstGeom>
-        </p:spPr>
-      </p:pic>
-      <p:pic>
-        <p:nvPicPr>
-          <p:cNvPr id="3" name="그림 2"/>
-          <p:cNvPicPr>
-            <a:picLocks noChangeAspect="1"/>
-          </p:cNvPicPr>
-          <p:nvPr/>
-        </p:nvPicPr>
-        <p:blipFill>
-          <a:blip r:embed="rId3" cstate="print">
-            <a:extLst>
-              <a:ext uri="{28A0092B-C50C-407E-A947-70E740481C1C}">
-                <a14:useLocalDpi xmlns:a14="http://schemas.microsoft.com/office/drawing/2010/main" xmlns="" val="0"/>
-              </a:ext>
-            </a:extLst>
-          </a:blip>
-          <a:stretch>
-            <a:fillRect/>
-          </a:stretch>
-        </p:blipFill>
-        <p:spPr>
-          <a:xfrm>
-            <a:off x="271449" y="227244"/>
-            <a:ext cx="1130702" cy="1130702"/>
-          </a:xfrm>
-          <a:prstGeom prst="rect">
-            <a:avLst/>
-          </a:prstGeom>
-        </p:spPr>
-      </p:pic>
-      <p:sp>
-        <p:nvSpPr>
-          <p:cNvPr id="5" name="TextBox 4"/>
-          <p:cNvSpPr txBox="1"/>
-          <p:nvPr/>
-        </p:nvSpPr>
-        <p:spPr>
-          <a:xfrm>
-            <a:off x="1402151" y="330930"/>
-            <a:ext cx="10074729" cy="923330"/>
-          </a:xfrm>
-          <a:prstGeom prst="rect">
-            <a:avLst/>
-          </a:prstGeom>
-          <a:noFill/>
-        </p:spPr>
-        <p:txBody>
-          <a:bodyPr wrap="square" rtlCol="0">
-            <a:spAutoFit/>
-          </a:bodyPr>
-          <a:lstStyle/>
-          <a:p>
-            <a:r>
-              <a:rPr lang="en-US" altLang="ko-KR" sz="5400" dirty="0" smtClean="0">
-                <a:latin typeface="나눔고딕 ExtraBold" panose="020D0904000000000000" pitchFamily="50" charset="-127"/>
-                <a:ea typeface="나눔고딕 ExtraBold" panose="020D0904000000000000" pitchFamily="50" charset="-127"/>
-              </a:rPr>
-              <a:t>Reference &amp; License</a:t>
-            </a:r>
-            <a:endParaRPr lang="ko-KR" altLang="en-US" sz="5400" dirty="0">
-              <a:latin typeface="나눔고딕 ExtraBold" panose="020D0904000000000000" pitchFamily="50" charset="-127"/>
-              <a:ea typeface="나눔고딕 ExtraBold" panose="020D0904000000000000" pitchFamily="50" charset="-127"/>
-            </a:endParaRPr>
-          </a:p>
-        </p:txBody>
-      </p:sp>
-      <p:sp>
-        <p:nvSpPr>
-          <p:cNvPr id="2" name="TextBox 1"/>
-          <p:cNvSpPr txBox="1"/>
-          <p:nvPr/>
-        </p:nvSpPr>
-        <p:spPr>
-          <a:xfrm>
-            <a:off x="1159329" y="2057400"/>
-            <a:ext cx="7984671" cy="3231654"/>
-          </a:xfrm>
-          <a:prstGeom prst="rect">
-            <a:avLst/>
-          </a:prstGeom>
-          <a:noFill/>
-        </p:spPr>
-        <p:txBody>
-          <a:bodyPr wrap="square" rtlCol="0">
-            <a:spAutoFit/>
-          </a:bodyPr>
-          <a:lstStyle/>
-          <a:p>
-            <a:r>
-              <a:rPr lang="en-US" altLang="ko-KR" sz="2400" dirty="0" smtClean="0">
-                <a:latin typeface="나눔고딕 ExtraBold" panose="020D0904000000000000" pitchFamily="50" charset="-127"/>
-                <a:ea typeface="나눔고딕 ExtraBold" panose="020D0904000000000000" pitchFamily="50" charset="-127"/>
-              </a:rPr>
-              <a:t>Reference(lecture)</a:t>
-            </a:r>
-          </a:p>
-          <a:p>
-            <a:pPr marL="285750" indent="-285750">
-              <a:buFontTx/>
-              <a:buChar char="-"/>
-            </a:pPr>
-            <a:r>
-              <a:rPr lang="en-US" altLang="ko-KR" sz="2400" dirty="0" err="1" smtClean="0">
-                <a:latin typeface="나눔고딕 ExtraBold" panose="020D0904000000000000" pitchFamily="50" charset="-127"/>
-                <a:ea typeface="나눔고딕 ExtraBold" panose="020D0904000000000000" pitchFamily="50" charset="-127"/>
-              </a:rPr>
-              <a:t>git</a:t>
-            </a:r>
-            <a:r>
-              <a:rPr lang="en-US" altLang="ko-KR" sz="2400" dirty="0" smtClean="0">
-                <a:latin typeface="나눔고딕 ExtraBold" panose="020D0904000000000000" pitchFamily="50" charset="-127"/>
-                <a:ea typeface="나눔고딕 ExtraBold" panose="020D0904000000000000" pitchFamily="50" charset="-127"/>
-              </a:rPr>
-              <a:t>\2016msami\reference.txt</a:t>
-            </a:r>
-            <a:endParaRPr lang="en-US" altLang="ko-KR" sz="2400" dirty="0" smtClean="0">
-              <a:latin typeface="나눔고딕 ExtraBold" panose="020D0904000000000000" pitchFamily="50" charset="-127"/>
-              <a:ea typeface="나눔고딕 ExtraBold" panose="020D0904000000000000" pitchFamily="50" charset="-127"/>
-            </a:endParaRPr>
-          </a:p>
-          <a:p>
-            <a:pPr marL="285750" indent="-285750">
-              <a:buFontTx/>
-              <a:buChar char="-"/>
-            </a:pPr>
-            <a:endParaRPr lang="en-US" altLang="ko-KR" sz="2400" dirty="0" smtClean="0">
-              <a:latin typeface="나눔고딕 ExtraBold" panose="020D0904000000000000" pitchFamily="50" charset="-127"/>
-              <a:ea typeface="나눔고딕 ExtraBold" panose="020D0904000000000000" pitchFamily="50" charset="-127"/>
-            </a:endParaRPr>
-          </a:p>
-          <a:p>
-            <a:pPr marL="285750" indent="-285750">
-              <a:buFontTx/>
-              <a:buChar char="-"/>
-            </a:pPr>
-            <a:endParaRPr lang="en-US" altLang="ko-KR" sz="2400" dirty="0">
-              <a:latin typeface="나눔고딕 ExtraBold" panose="020D0904000000000000" pitchFamily="50" charset="-127"/>
-              <a:ea typeface="나눔고딕 ExtraBold" panose="020D0904000000000000" pitchFamily="50" charset="-127"/>
-            </a:endParaRPr>
-          </a:p>
-          <a:p>
-            <a:pPr marL="285750" indent="-285750">
-              <a:buFontTx/>
-              <a:buChar char="-"/>
-            </a:pPr>
-            <a:endParaRPr lang="en-US" altLang="ko-KR" sz="2400" dirty="0">
-              <a:latin typeface="나눔고딕 ExtraBold" panose="020D0904000000000000" pitchFamily="50" charset="-127"/>
-              <a:ea typeface="나눔고딕 ExtraBold" panose="020D0904000000000000" pitchFamily="50" charset="-127"/>
-            </a:endParaRPr>
-          </a:p>
-          <a:p>
-            <a:r>
-              <a:rPr lang="en-US" altLang="ko-KR" sz="2400" dirty="0" smtClean="0">
-                <a:latin typeface="나눔고딕 ExtraBold" panose="020D0904000000000000" pitchFamily="50" charset="-127"/>
-                <a:ea typeface="나눔고딕 ExtraBold" panose="020D0904000000000000" pitchFamily="50" charset="-127"/>
-              </a:rPr>
-              <a:t>License</a:t>
-            </a:r>
-          </a:p>
-          <a:p>
-            <a:r>
-              <a:rPr lang="en-US" altLang="ko-KR" sz="2400" dirty="0" smtClean="0">
-                <a:latin typeface="나눔고딕 ExtraBold" panose="020D0904000000000000" pitchFamily="50" charset="-127"/>
-                <a:ea typeface="나눔고딕 ExtraBold" panose="020D0904000000000000" pitchFamily="50" charset="-127"/>
-              </a:rPr>
-              <a:t>- Apache 2.0</a:t>
-            </a:r>
-          </a:p>
-          <a:p>
-            <a:pPr marL="285750" indent="-285750">
-              <a:buFontTx/>
-              <a:buChar char="-"/>
-            </a:pPr>
-            <a:endParaRPr lang="en-US" altLang="ko-KR" dirty="0"/>
-          </a:p>
-          <a:p>
-            <a:endParaRPr lang="en-US" altLang="ko-KR" dirty="0" smtClean="0"/>
-          </a:p>
-        </p:txBody>
-      </p:sp>
-    </p:spTree>
-    <p:extLst>
-      <p:ext uri="{BB962C8B-B14F-4D97-AF65-F5344CB8AC3E}">
-        <p14:creationId xmlns:p14="http://schemas.microsoft.com/office/powerpoint/2010/main" xmlns="" val="3704109737"/>
-      </p:ext>
-    </p:extLst>
-  </p:cSld>
-  <p:clrMapOvr>
-    <a:masterClrMapping/>
-  </p:clrMapOvr>
-  <p:timing>
-    <p:tnLst>
-      <p:par>
-        <p:cTn id="1" dur="indefinite" restart="never" nodeType="tmRoot">
-          <p:childTnLst>
-            <p:seq concurrent="1" nextAc="seek">
-              <p:cTn id="2" dur="indefinite" nodeType="mainSeq">
-                <p:childTnLst>
-                  <p:par>
-                    <p:cTn id="3" fill="hold">
-                      <p:stCondLst>
-                        <p:cond delay="indefinite"/>
-                      </p:stCondLst>
-                      <p:childTnLst>
-                        <p:par>
-                          <p:cTn id="4" fill="hold">
-                            <p:stCondLst>
-                              <p:cond delay="0"/>
-                            </p:stCondLst>
-                            <p:childTnLst>
-                              <p:par>
-                                <p:cTn id="5" presetID="47" presetClass="entr" presetSubtype="0" fill="hold" nodeType="clickEffect">
-                                  <p:stCondLst>
-                                    <p:cond delay="0"/>
-                                  </p:stCondLst>
-                                  <p:childTnLst>
-                                    <p:set>
-                                      <p:cBhvr>
-                                        <p:cTn id="6" dur="1" fill="hold">
-                                          <p:stCondLst>
-                                            <p:cond delay="0"/>
-                                          </p:stCondLst>
-                                        </p:cTn>
-                                        <p:tgtEl>
-                                          <p:spTgt spid="3"/>
-                                        </p:tgtEl>
-                                        <p:attrNameLst>
-                                          <p:attrName>style.visibility</p:attrName>
-                                        </p:attrNameLst>
-                                      </p:cBhvr>
-                                      <p:to>
-                                        <p:strVal val="visible"/>
-                                      </p:to>
-                                    </p:set>
-                                    <p:animEffect transition="in" filter="fade">
-                                      <p:cBhvr>
-                                        <p:cTn id="7" dur="1000"/>
-                                        <p:tgtEl>
-                                          <p:spTgt spid="3"/>
-                                        </p:tgtEl>
-                                      </p:cBhvr>
-                                    </p:animEffect>
-                                    <p:anim calcmode="lin" valueType="num">
-                                      <p:cBhvr>
-                                        <p:cTn id="8" dur="1000" fill="hold"/>
-                                        <p:tgtEl>
-                                          <p:spTgt spid="3"/>
-                                        </p:tgtEl>
-                                        <p:attrNameLst>
-                                          <p:attrName>ppt_x</p:attrName>
-                                        </p:attrNameLst>
-                                      </p:cBhvr>
-                                      <p:tavLst>
-                                        <p:tav tm="0">
-                                          <p:val>
-                                            <p:strVal val="#ppt_x"/>
-                                          </p:val>
-                                        </p:tav>
-                                        <p:tav tm="100000">
-                                          <p:val>
-                                            <p:strVal val="#ppt_x"/>
-                                          </p:val>
-                                        </p:tav>
-                                      </p:tavLst>
-                                    </p:anim>
-                                    <p:anim calcmode="lin" valueType="num">
-                                      <p:cBhvr>
-                                        <p:cTn id="9" dur="1000" fill="hold"/>
-                                        <p:tgtEl>
-                                          <p:spTgt spid="3"/>
-                                        </p:tgtEl>
-                                        <p:attrNameLst>
-                                          <p:attrName>ppt_y</p:attrName>
-                                        </p:attrNameLst>
-                                      </p:cBhvr>
-                                      <p:tavLst>
-                                        <p:tav tm="0">
-                                          <p:val>
-                                            <p:strVal val="#ppt_y-.1"/>
-                                          </p:val>
-                                        </p:tav>
-                                        <p:tav tm="100000">
-                                          <p:val>
-                                            <p:strVal val="#ppt_y"/>
-                                          </p:val>
-                                        </p:tav>
-                                      </p:tavLst>
-                                    </p:anim>
-                                  </p:childTnLst>
-                                </p:cTn>
-                              </p:par>
-                              <p:par>
-                                <p:cTn id="10" presetID="47" presetClass="entr" presetSubtype="0" fill="hold" grpId="0" nodeType="withEffect">
-                                  <p:stCondLst>
-                                    <p:cond delay="0"/>
-                                  </p:stCondLst>
-                                  <p:childTnLst>
-                                    <p:set>
-                                      <p:cBhvr>
-                                        <p:cTn id="11" dur="1" fill="hold">
-                                          <p:stCondLst>
-                                            <p:cond delay="0"/>
-                                          </p:stCondLst>
-                                        </p:cTn>
-                                        <p:tgtEl>
-                                          <p:spTgt spid="5"/>
-                                        </p:tgtEl>
-                                        <p:attrNameLst>
-                                          <p:attrName>style.visibility</p:attrName>
-                                        </p:attrNameLst>
-                                      </p:cBhvr>
-                                      <p:to>
-                                        <p:strVal val="visible"/>
-                                      </p:to>
-                                    </p:set>
-                                    <p:animEffect transition="in" filter="fade">
-                                      <p:cBhvr>
-                                        <p:cTn id="12" dur="1000"/>
-                                        <p:tgtEl>
-                                          <p:spTgt spid="5"/>
-                                        </p:tgtEl>
-                                      </p:cBhvr>
-                                    </p:animEffect>
-                                    <p:anim calcmode="lin" valueType="num">
-                                      <p:cBhvr>
-                                        <p:cTn id="13" dur="1000" fill="hold"/>
-                                        <p:tgtEl>
-                                          <p:spTgt spid="5"/>
-                                        </p:tgtEl>
-                                        <p:attrNameLst>
-                                          <p:attrName>ppt_x</p:attrName>
-                                        </p:attrNameLst>
-                                      </p:cBhvr>
-                                      <p:tavLst>
-                                        <p:tav tm="0">
-                                          <p:val>
-                                            <p:strVal val="#ppt_x"/>
-                                          </p:val>
-                                        </p:tav>
-                                        <p:tav tm="100000">
-                                          <p:val>
-                                            <p:strVal val="#ppt_x"/>
-                                          </p:val>
-                                        </p:tav>
-                                      </p:tavLst>
-                                    </p:anim>
-                                    <p:anim calcmode="lin" valueType="num">
-                                      <p:cBhvr>
-                                        <p:cTn id="14" dur="1000" fill="hold"/>
-                                        <p:tgtEl>
-                                          <p:spTgt spid="5"/>
-                                        </p:tgtEl>
-                                        <p:attrNameLst>
-                                          <p:attrName>ppt_y</p:attrName>
-                                        </p:attrNameLst>
-                                      </p:cBhvr>
-                                      <p:tavLst>
-                                        <p:tav tm="0">
-                                          <p:val>
-                                            <p:strVal val="#ppt_y-.1"/>
-                                          </p:val>
-                                        </p:tav>
-                                        <p:tav tm="100000">
-                                          <p:val>
-                                            <p:strVal val="#ppt_y"/>
-                                          </p:val>
-                                        </p:tav>
-                                      </p:tavLst>
-                                    </p:anim>
-                                  </p:childTnLst>
-                                </p:cTn>
-                              </p:par>
-                            </p:childTnLst>
-                          </p:cTn>
-                        </p:par>
-                      </p:childTnLst>
-                    </p:cTn>
-                  </p:par>
-                  <p:par>
-                    <p:cTn id="15" fill="hold">
-                      <p:stCondLst>
-                        <p:cond delay="indefinite"/>
-                      </p:stCondLst>
-                      <p:childTnLst>
-                        <p:par>
-                          <p:cTn id="16" fill="hold">
-                            <p:stCondLst>
-                              <p:cond delay="0"/>
-                            </p:stCondLst>
-                            <p:childTnLst>
-                              <p:par>
-                                <p:cTn id="17" presetID="10" presetClass="entr" presetSubtype="0" fill="hold" nodeType="clickEffect">
-                                  <p:stCondLst>
-                                    <p:cond delay="0"/>
-                                  </p:stCondLst>
-                                  <p:childTnLst>
-                                    <p:set>
-                                      <p:cBhvr>
-                                        <p:cTn id="18" dur="1" fill="hold">
-                                          <p:stCondLst>
-                                            <p:cond delay="0"/>
-                                          </p:stCondLst>
-                                        </p:cTn>
-                                        <p:tgtEl>
-                                          <p:spTgt spid="2">
-                                            <p:txEl>
-                                              <p:pRg st="0" end="0"/>
-                                            </p:txEl>
-                                          </p:spTgt>
-                                        </p:tgtEl>
-                                        <p:attrNameLst>
-                                          <p:attrName>style.visibility</p:attrName>
-                                        </p:attrNameLst>
-                                      </p:cBhvr>
-                                      <p:to>
-                                        <p:strVal val="visible"/>
-                                      </p:to>
-                                    </p:set>
-                                    <p:animEffect transition="in" filter="fade">
-                                      <p:cBhvr>
-                                        <p:cTn id="19" dur="500"/>
-                                        <p:tgtEl>
-                                          <p:spTgt spid="2">
-                                            <p:txEl>
-                                              <p:pRg st="0" end="0"/>
-                                            </p:txEl>
-                                          </p:spTgt>
-                                        </p:tgtEl>
-                                      </p:cBhvr>
-                                    </p:animEffect>
-                                  </p:childTnLst>
-                                </p:cTn>
-                              </p:par>
-                            </p:childTnLst>
-                          </p:cTn>
-                        </p:par>
-                      </p:childTnLst>
-                    </p:cTn>
-                  </p:par>
-                  <p:par>
-                    <p:cTn id="20" fill="hold">
-                      <p:stCondLst>
-                        <p:cond delay="indefinite"/>
-                      </p:stCondLst>
-                      <p:childTnLst>
-                        <p:par>
-                          <p:cTn id="21" fill="hold">
-                            <p:stCondLst>
-                              <p:cond delay="0"/>
-                            </p:stCondLst>
-                            <p:childTnLst>
-                              <p:par>
-                                <p:cTn id="22" presetID="10" presetClass="entr" presetSubtype="0" fill="hold" nodeType="clickEffect">
-                                  <p:stCondLst>
-                                    <p:cond delay="0"/>
-                                  </p:stCondLst>
-                                  <p:childTnLst>
-                                    <p:set>
-                                      <p:cBhvr>
-                                        <p:cTn id="23" dur="1" fill="hold">
-                                          <p:stCondLst>
-                                            <p:cond delay="0"/>
-                                          </p:stCondLst>
-                                        </p:cTn>
-                                        <p:tgtEl>
-                                          <p:spTgt spid="2">
-                                            <p:txEl>
-                                              <p:pRg st="1" end="1"/>
-                                            </p:txEl>
-                                          </p:spTgt>
-                                        </p:tgtEl>
-                                        <p:attrNameLst>
-                                          <p:attrName>style.visibility</p:attrName>
-                                        </p:attrNameLst>
-                                      </p:cBhvr>
-                                      <p:to>
-                                        <p:strVal val="visible"/>
-                                      </p:to>
-                                    </p:set>
-                                    <p:animEffect transition="in" filter="fade">
-                                      <p:cBhvr>
-                                        <p:cTn id="24" dur="500"/>
-                                        <p:tgtEl>
-                                          <p:spTgt spid="2">
-                                            <p:txEl>
-                                              <p:pRg st="1" end="1"/>
-                                            </p:txEl>
-                                          </p:spTgt>
-                                        </p:tgtEl>
-                                      </p:cBhvr>
-                                    </p:animEffect>
-                                  </p:childTnLst>
-                                </p:cTn>
-                              </p:par>
-                            </p:childTnLst>
-                          </p:cTn>
-                        </p:par>
-                      </p:childTnLst>
-                    </p:cTn>
-                  </p:par>
-                  <p:par>
-                    <p:cTn id="25" fill="hold">
-                      <p:stCondLst>
-                        <p:cond delay="indefinite"/>
-                      </p:stCondLst>
-                      <p:childTnLst>
-                        <p:par>
-                          <p:cTn id="26" fill="hold">
-                            <p:stCondLst>
-                              <p:cond delay="0"/>
-                            </p:stCondLst>
-                            <p:childTnLst>
-                              <p:par>
-                                <p:cTn id="27" presetID="10" presetClass="entr" presetSubtype="0" fill="hold" nodeType="clickEffect">
-                                  <p:stCondLst>
-                                    <p:cond delay="0"/>
-                                  </p:stCondLst>
-                                  <p:childTnLst>
-                                    <p:set>
-                                      <p:cBhvr>
-                                        <p:cTn id="28" dur="1" fill="hold">
-                                          <p:stCondLst>
-                                            <p:cond delay="0"/>
-                                          </p:stCondLst>
-                                        </p:cTn>
-                                        <p:tgtEl>
-                                          <p:spTgt spid="2">
-                                            <p:txEl>
-                                              <p:pRg st="5" end="5"/>
-                                            </p:txEl>
-                                          </p:spTgt>
-                                        </p:tgtEl>
-                                        <p:attrNameLst>
-                                          <p:attrName>style.visibility</p:attrName>
-                                        </p:attrNameLst>
-                                      </p:cBhvr>
-                                      <p:to>
-                                        <p:strVal val="visible"/>
-                                      </p:to>
-                                    </p:set>
-                                    <p:animEffect transition="in" filter="fade">
-                                      <p:cBhvr>
-                                        <p:cTn id="29" dur="500"/>
-                                        <p:tgtEl>
-                                          <p:spTgt spid="2">
-                                            <p:txEl>
-                                              <p:pRg st="5" end="5"/>
-                                            </p:txEl>
-                                          </p:spTgt>
-                                        </p:tgtEl>
-                                      </p:cBhvr>
-                                    </p:animEffect>
-                                  </p:childTnLst>
-                                </p:cTn>
-                              </p:par>
-                              <p:par>
-                                <p:cTn id="30" presetID="10" presetClass="entr" presetSubtype="0" fill="hold" nodeType="withEffect">
-                                  <p:stCondLst>
-                                    <p:cond delay="0"/>
-                                  </p:stCondLst>
-                                  <p:childTnLst>
-                                    <p:set>
-                                      <p:cBhvr>
-                                        <p:cTn id="31" dur="1" fill="hold">
-                                          <p:stCondLst>
-                                            <p:cond delay="0"/>
-                                          </p:stCondLst>
-                                        </p:cTn>
-                                        <p:tgtEl>
-                                          <p:spTgt spid="2">
-                                            <p:txEl>
-                                              <p:pRg st="6" end="6"/>
-                                            </p:txEl>
-                                          </p:spTgt>
-                                        </p:tgtEl>
-                                        <p:attrNameLst>
-                                          <p:attrName>style.visibility</p:attrName>
-                                        </p:attrNameLst>
-                                      </p:cBhvr>
-                                      <p:to>
-                                        <p:strVal val="visible"/>
-                                      </p:to>
-                                    </p:set>
-                                    <p:animEffect transition="in" filter="fade">
-                                      <p:cBhvr>
-                                        <p:cTn id="32" dur="500"/>
-                                        <p:tgtEl>
-                                          <p:spTgt spid="2">
-                                            <p:txEl>
-                                              <p:pRg st="6" end="6"/>
-                                            </p:txEl>
-                                          </p:spTgt>
-                                        </p:tgtEl>
-                                      </p:cBhvr>
-                                    </p:animEffect>
-                                  </p:childTnLst>
-                                </p:cTn>
-                              </p:par>
-                            </p:childTnLst>
-                          </p:cTn>
-                        </p:par>
-                      </p:childTnLst>
-                    </p:cTn>
-                  </p:par>
-                </p:childTnLst>
-              </p:cTn>
-              <p:prevCondLst>
-                <p:cond evt="onPrev" delay="0">
-                  <p:tgtEl>
-                    <p:sldTgt/>
-                  </p:tgtEl>
-                </p:cond>
-              </p:prevCondLst>
-              <p:nextCondLst>
-                <p:cond evt="onNext" delay="0">
-                  <p:tgtEl>
-                    <p:sldTgt/>
-                  </p:tgtEl>
-                </p:cond>
-              </p:nextCondLst>
-            </p:seq>
-          </p:childTnLst>
-        </p:cTn>
-      </p:par>
-    </p:tnLst>
-    <p:bldLst>
-      <p:bldP spid="5" grpId="0"/>
-    </p:bldLst>
-  </p:timing>
-</p:sld>
-</file>
-
-<file path=ppt/slides/slide15.xml><?xml version="1.0" encoding="utf-8"?>
-<p:sld xmlns:a="http://schemas.openxmlformats.org/drawingml/2006/main" xmlns:r="http://schemas.openxmlformats.org/officeDocument/2006/relationships" xmlns:p="http://schemas.openxmlformats.org/presentationml/2006/main">
-  <p:cSld>
-    <p:spTree>
-      <p:nvGrpSpPr>
-        <p:cNvPr id="1" name=""/>
-        <p:cNvGrpSpPr/>
-        <p:nvPr/>
-      </p:nvGrpSpPr>
-      <p:grpSpPr>
-        <a:xfrm>
-          <a:off x="0" y="0"/>
-          <a:ext cx="0" cy="0"/>
-          <a:chOff x="0" y="0"/>
-          <a:chExt cx="0" cy="0"/>
-        </a:xfrm>
-      </p:grpSpPr>
-      <p:pic>
-        <p:nvPicPr>
-          <p:cNvPr id="4" name="그림 3"/>
-          <p:cNvPicPr>
-            <a:picLocks noChangeAspect="1"/>
-          </p:cNvPicPr>
-          <p:nvPr/>
-        </p:nvPicPr>
-        <p:blipFill>
-          <a:blip r:embed="rId2" cstate="print">
-            <a:extLst>
-              <a:ext uri="{28A0092B-C50C-407E-A947-70E740481C1C}">
-                <a14:useLocalDpi xmlns:a14="http://schemas.microsoft.com/office/drawing/2010/main" xmlns="" val="0"/>
+                <a14:useLocalDpi xmlns="" xmlns:a14="http://schemas.microsoft.com/office/drawing/2010/main" val="0"/>
               </a:ext>
             </a:extLst>
           </a:blip>
@@ -6884,7 +6456,7 @@
     </p:spTree>
     <p:extLst>
       <p:ext uri="{BB962C8B-B14F-4D97-AF65-F5344CB8AC3E}">
-        <p14:creationId xmlns:p14="http://schemas.microsoft.com/office/powerpoint/2010/main" xmlns="" val="513736078"/>
+        <p14:creationId xmlns="" xmlns:p14="http://schemas.microsoft.com/office/powerpoint/2010/main" val="513736078"/>
       </p:ext>
     </p:extLst>
   </p:cSld>
@@ -7009,7 +6581,7 @@
           <a:blip r:embed="rId2" cstate="print">
             <a:extLst>
               <a:ext uri="{28A0092B-C50C-407E-A947-70E740481C1C}">
-                <a14:useLocalDpi xmlns:a14="http://schemas.microsoft.com/office/drawing/2010/main" xmlns="" val="0"/>
+                <a14:useLocalDpi xmlns="" xmlns:a14="http://schemas.microsoft.com/office/drawing/2010/main" val="0"/>
               </a:ext>
             </a:extLst>
           </a:blip>
@@ -7039,7 +6611,7 @@
           <a:blip r:embed="rId3" cstate="print">
             <a:extLst>
               <a:ext uri="{28A0092B-C50C-407E-A947-70E740481C1C}">
-                <a14:useLocalDpi xmlns:a14="http://schemas.microsoft.com/office/drawing/2010/main" xmlns="" val="0"/>
+                <a14:useLocalDpi xmlns="" xmlns:a14="http://schemas.microsoft.com/office/drawing/2010/main" val="0"/>
               </a:ext>
             </a:extLst>
           </a:blip>
@@ -7165,8 +6737,26 @@
                 <a:latin typeface="나눔고딕 ExtraBold" panose="020D0904000000000000" pitchFamily="50" charset="-127"/>
                 <a:ea typeface="나눔고딕 ExtraBold" panose="020D0904000000000000" pitchFamily="50" charset="-127"/>
               </a:rPr>
-              <a:t> Product and Result</a:t>
-            </a:r>
+              <a:t> Product and </a:t>
+            </a:r>
+            <a:r>
+              <a:rPr lang="en-US" altLang="ko-KR" sz="3000" dirty="0" smtClean="0">
+                <a:latin typeface="나눔고딕 ExtraBold" panose="020D0904000000000000" pitchFamily="50" charset="-127"/>
+                <a:ea typeface="나눔고딕 ExtraBold" panose="020D0904000000000000" pitchFamily="50" charset="-127"/>
+              </a:rPr>
+              <a:t>Result</a:t>
+            </a:r>
+            <a:r>
+              <a:rPr lang="en-US" altLang="ko-KR" sz="3000" dirty="0" smtClean="0">
+                <a:latin typeface="나눔고딕 ExtraBold" panose="020D0904000000000000" pitchFamily="50" charset="-127"/>
+                <a:ea typeface="나눔고딕 ExtraBold" panose="020D0904000000000000" pitchFamily="50" charset="-127"/>
+              </a:rPr>
+              <a:t> </a:t>
+            </a:r>
+            <a:endParaRPr lang="en-US" altLang="ko-KR" sz="3000" dirty="0" smtClean="0">
+              <a:latin typeface="나눔고딕 ExtraBold" panose="020D0904000000000000" pitchFamily="50" charset="-127"/>
+              <a:ea typeface="나눔고딕 ExtraBold" panose="020D0904000000000000" pitchFamily="50" charset="-127"/>
+            </a:endParaRPr>
           </a:p>
           <a:p>
             <a:pPr marL="342900" indent="-342900">
@@ -7186,21 +6776,21 @@
                 <a:latin typeface="나눔고딕 ExtraBold" panose="020D0904000000000000" pitchFamily="50" charset="-127"/>
                 <a:ea typeface="나눔고딕 ExtraBold" panose="020D0904000000000000" pitchFamily="50" charset="-127"/>
               </a:rPr>
-              <a:t> Our Task(</a:t>
-            </a:r>
-            <a:r>
-              <a:rPr lang="en-US" altLang="ko-KR" sz="3000" dirty="0" err="1" smtClean="0">
-                <a:latin typeface="나눔고딕 ExtraBold" panose="020D0904000000000000" pitchFamily="50" charset="-127"/>
-                <a:ea typeface="나눔고딕 ExtraBold" panose="020D0904000000000000" pitchFamily="50" charset="-127"/>
-              </a:rPr>
-              <a:t>Delvelope</a:t>
+              <a:t> Our </a:t>
             </a:r>
             <a:r>
               <a:rPr lang="en-US" altLang="ko-KR" sz="3000" dirty="0" smtClean="0">
                 <a:latin typeface="나눔고딕 ExtraBold" panose="020D0904000000000000" pitchFamily="50" charset="-127"/>
                 <a:ea typeface="나눔고딕 ExtraBold" panose="020D0904000000000000" pitchFamily="50" charset="-127"/>
               </a:rPr>
-              <a:t> &amp; Problem)</a:t>
+              <a:t>Task(Develop </a:t>
+            </a:r>
+            <a:r>
+              <a:rPr lang="en-US" altLang="ko-KR" sz="3000" dirty="0" smtClean="0">
+                <a:latin typeface="나눔고딕 ExtraBold" panose="020D0904000000000000" pitchFamily="50" charset="-127"/>
+                <a:ea typeface="나눔고딕 ExtraBold" panose="020D0904000000000000" pitchFamily="50" charset="-127"/>
+              </a:rPr>
+              <a:t>&amp; Problem)</a:t>
             </a:r>
           </a:p>
           <a:p>
@@ -7237,7 +6827,7 @@
     </p:spTree>
     <p:extLst>
       <p:ext uri="{BB962C8B-B14F-4D97-AF65-F5344CB8AC3E}">
-        <p14:creationId xmlns:p14="http://schemas.microsoft.com/office/powerpoint/2010/main" xmlns="" val="4044702580"/>
+        <p14:creationId xmlns="" xmlns:p14="http://schemas.microsoft.com/office/powerpoint/2010/main" val="4044702580"/>
       </p:ext>
     </p:extLst>
   </p:cSld>
@@ -7794,7 +7384,7 @@
           <a:blip r:embed="rId2" cstate="print">
             <a:extLst>
               <a:ext uri="{28A0092B-C50C-407E-A947-70E740481C1C}">
-                <a14:useLocalDpi xmlns:a14="http://schemas.microsoft.com/office/drawing/2010/main" xmlns="" val="0"/>
+                <a14:useLocalDpi xmlns="" xmlns:a14="http://schemas.microsoft.com/office/drawing/2010/main" val="0"/>
               </a:ext>
             </a:extLst>
           </a:blip>
@@ -7824,7 +7414,7 @@
           <a:blip r:embed="rId3" cstate="print">
             <a:extLst>
               <a:ext uri="{28A0092B-C50C-407E-A947-70E740481C1C}">
-                <a14:useLocalDpi xmlns:a14="http://schemas.microsoft.com/office/drawing/2010/main" xmlns="" val="0"/>
+                <a14:useLocalDpi xmlns="" xmlns:a14="http://schemas.microsoft.com/office/drawing/2010/main" val="0"/>
               </a:ext>
             </a:extLst>
           </a:blip>
@@ -7890,7 +7480,7 @@
           <a:blip r:embed="rId4" cstate="print">
             <a:extLst>
               <a:ext uri="{28A0092B-C50C-407E-A947-70E740481C1C}">
-                <a14:useLocalDpi xmlns:a14="http://schemas.microsoft.com/office/drawing/2010/main" xmlns="" val="0"/>
+                <a14:useLocalDpi xmlns="" xmlns:a14="http://schemas.microsoft.com/office/drawing/2010/main" val="0"/>
               </a:ext>
             </a:extLst>
           </a:blip>
@@ -7920,7 +7510,7 @@
           <a:blip r:embed="rId5" cstate="print">
             <a:extLst>
               <a:ext uri="{28A0092B-C50C-407E-A947-70E740481C1C}">
-                <a14:useLocalDpi xmlns:a14="http://schemas.microsoft.com/office/drawing/2010/main" xmlns="" val="0"/>
+                <a14:useLocalDpi xmlns="" xmlns:a14="http://schemas.microsoft.com/office/drawing/2010/main" val="0"/>
               </a:ext>
             </a:extLst>
           </a:blip>
@@ -7938,149 +7528,6 @@
           </a:prstGeom>
         </p:spPr>
       </p:pic>
-      <p:sp>
-        <p:nvSpPr>
-          <p:cNvPr id="7" name="TextBox 6"/>
-          <p:cNvSpPr txBox="1"/>
-          <p:nvPr/>
-        </p:nvSpPr>
-        <p:spPr>
-          <a:xfrm>
-            <a:off x="1259551" y="5381961"/>
-            <a:ext cx="1741195" cy="369332"/>
-          </a:xfrm>
-          <a:prstGeom prst="rect">
-            <a:avLst/>
-          </a:prstGeom>
-          <a:noFill/>
-        </p:spPr>
-        <p:txBody>
-          <a:bodyPr wrap="square" rtlCol="0">
-            <a:spAutoFit/>
-          </a:bodyPr>
-          <a:lstStyle/>
-          <a:p>
-            <a:r>
-              <a:rPr lang="en-US" altLang="ko-KR" dirty="0" smtClean="0">
-                <a:latin typeface="나눔고딕 ExtraBold" panose="020D0904000000000000" pitchFamily="50" charset="-127"/>
-                <a:ea typeface="나눔고딕 ExtraBold" panose="020D0904000000000000" pitchFamily="50" charset="-127"/>
-              </a:rPr>
-              <a:t>Park </a:t>
-            </a:r>
-            <a:r>
-              <a:rPr lang="en-US" altLang="ko-KR" dirty="0">
-                <a:latin typeface="나눔고딕 ExtraBold" panose="020D0904000000000000" pitchFamily="50" charset="-127"/>
-                <a:ea typeface="나눔고딕 ExtraBold" panose="020D0904000000000000" pitchFamily="50" charset="-127"/>
-              </a:rPr>
-              <a:t>J</a:t>
-            </a:r>
-            <a:r>
-              <a:rPr lang="en-US" altLang="ko-KR" dirty="0" smtClean="0">
-                <a:latin typeface="나눔고딕 ExtraBold" panose="020D0904000000000000" pitchFamily="50" charset="-127"/>
-                <a:ea typeface="나눔고딕 ExtraBold" panose="020D0904000000000000" pitchFamily="50" charset="-127"/>
-              </a:rPr>
-              <a:t>ae </a:t>
-            </a:r>
-            <a:r>
-              <a:rPr lang="en-US" altLang="ko-KR" dirty="0">
-                <a:latin typeface="나눔고딕 ExtraBold" panose="020D0904000000000000" pitchFamily="50" charset="-127"/>
-                <a:ea typeface="나눔고딕 ExtraBold" panose="020D0904000000000000" pitchFamily="50" charset="-127"/>
-              </a:rPr>
-              <a:t>Y</a:t>
-            </a:r>
-            <a:r>
-              <a:rPr lang="en-US" altLang="ko-KR" dirty="0" smtClean="0">
-                <a:latin typeface="나눔고딕 ExtraBold" panose="020D0904000000000000" pitchFamily="50" charset="-127"/>
-                <a:ea typeface="나눔고딕 ExtraBold" panose="020D0904000000000000" pitchFamily="50" charset="-127"/>
-              </a:rPr>
-              <a:t>ong</a:t>
-            </a:r>
-            <a:endParaRPr lang="ko-KR" altLang="en-US" dirty="0">
-              <a:latin typeface="나눔고딕 ExtraBold" panose="020D0904000000000000" pitchFamily="50" charset="-127"/>
-              <a:ea typeface="나눔고딕 ExtraBold" panose="020D0904000000000000" pitchFamily="50" charset="-127"/>
-            </a:endParaRPr>
-          </a:p>
-        </p:txBody>
-      </p:sp>
-      <p:sp>
-        <p:nvSpPr>
-          <p:cNvPr id="8" name="TextBox 7"/>
-          <p:cNvSpPr txBox="1"/>
-          <p:nvPr/>
-        </p:nvSpPr>
-        <p:spPr>
-          <a:xfrm>
-            <a:off x="4064389" y="5381961"/>
-            <a:ext cx="1754803" cy="369332"/>
-          </a:xfrm>
-          <a:prstGeom prst="rect">
-            <a:avLst/>
-          </a:prstGeom>
-          <a:noFill/>
-        </p:spPr>
-        <p:txBody>
-          <a:bodyPr wrap="square" rtlCol="0">
-            <a:spAutoFit/>
-          </a:bodyPr>
-          <a:lstStyle/>
-          <a:p>
-            <a:r>
-              <a:rPr lang="en-US" altLang="ko-KR" dirty="0" smtClean="0">
-                <a:latin typeface="나눔고딕 ExtraBold" panose="020D0904000000000000" pitchFamily="50" charset="-127"/>
-                <a:ea typeface="나눔고딕 ExtraBold" panose="020D0904000000000000" pitchFamily="50" charset="-127"/>
-              </a:rPr>
-              <a:t>Kim Dong </a:t>
-            </a:r>
-            <a:r>
-              <a:rPr lang="en-US" altLang="ko-KR" dirty="0" err="1" smtClean="0">
-                <a:latin typeface="나눔고딕 ExtraBold" panose="020D0904000000000000" pitchFamily="50" charset="-127"/>
-                <a:ea typeface="나눔고딕 ExtraBold" panose="020D0904000000000000" pitchFamily="50" charset="-127"/>
-              </a:rPr>
-              <a:t>Gyu</a:t>
-            </a:r>
-            <a:endParaRPr lang="ko-KR" altLang="en-US" dirty="0">
-              <a:latin typeface="나눔고딕 ExtraBold" panose="020D0904000000000000" pitchFamily="50" charset="-127"/>
-              <a:ea typeface="나눔고딕 ExtraBold" panose="020D0904000000000000" pitchFamily="50" charset="-127"/>
-            </a:endParaRPr>
-          </a:p>
-        </p:txBody>
-      </p:sp>
-      <p:sp>
-        <p:nvSpPr>
-          <p:cNvPr id="9" name="TextBox 8"/>
-          <p:cNvSpPr txBox="1"/>
-          <p:nvPr/>
-        </p:nvSpPr>
-        <p:spPr>
-          <a:xfrm>
-            <a:off x="6953745" y="5381217"/>
-            <a:ext cx="1852453" cy="369332"/>
-          </a:xfrm>
-          <a:prstGeom prst="rect">
-            <a:avLst/>
-          </a:prstGeom>
-          <a:noFill/>
-        </p:spPr>
-        <p:txBody>
-          <a:bodyPr wrap="square" rtlCol="0">
-            <a:spAutoFit/>
-          </a:bodyPr>
-          <a:lstStyle/>
-          <a:p>
-            <a:r>
-              <a:rPr lang="en-US" altLang="ko-KR" dirty="0" smtClean="0">
-                <a:latin typeface="나눔고딕 ExtraBold" panose="020D0904000000000000" pitchFamily="50" charset="-127"/>
-                <a:ea typeface="나눔고딕 ExtraBold" panose="020D0904000000000000" pitchFamily="50" charset="-127"/>
-              </a:rPr>
-              <a:t>Kim Min Sang</a:t>
-            </a:r>
-            <a:endParaRPr lang="ko-KR" altLang="en-US" dirty="0">
-              <a:latin typeface="나눔고딕 ExtraBold" panose="020D0904000000000000" pitchFamily="50" charset="-127"/>
-              <a:ea typeface="나눔고딕 ExtraBold" panose="020D0904000000000000" pitchFamily="50" charset="-127"/>
-            </a:endParaRPr>
-          </a:p>
-        </p:txBody>
-      </p:sp>
       <p:pic>
         <p:nvPicPr>
           <p:cNvPr id="10" name="그림 9"/>
@@ -8093,7 +7540,7 @@
           <a:blip r:embed="rId6" cstate="print">
             <a:extLst>
               <a:ext uri="{28A0092B-C50C-407E-A947-70E740481C1C}">
-                <a14:useLocalDpi xmlns:a14="http://schemas.microsoft.com/office/drawing/2010/main" xmlns="" val="0"/>
+                <a14:useLocalDpi xmlns="" xmlns:a14="http://schemas.microsoft.com/office/drawing/2010/main" val="0"/>
               </a:ext>
             </a:extLst>
           </a:blip>
@@ -8111,10 +7558,211 @@
           </a:prstGeom>
         </p:spPr>
       </p:pic>
+      <p:sp>
+        <p:nvSpPr>
+          <p:cNvPr id="12" name="TextBox 11"/>
+          <p:cNvSpPr txBox="1"/>
+          <p:nvPr/>
+        </p:nvSpPr>
+        <p:spPr>
+          <a:xfrm>
+            <a:off x="610195" y="5209682"/>
+            <a:ext cx="2729353" cy="646331"/>
+          </a:xfrm>
+          <a:prstGeom prst="rect">
+            <a:avLst/>
+          </a:prstGeom>
+          <a:noFill/>
+        </p:spPr>
+        <p:txBody>
+          <a:bodyPr wrap="square" rtlCol="0">
+            <a:spAutoFit/>
+          </a:bodyPr>
+          <a:lstStyle/>
+          <a:p>
+            <a:pPr algn="ctr"/>
+            <a:r>
+              <a:rPr lang="en-US" altLang="ko-KR" dirty="0" smtClean="0">
+                <a:latin typeface="나눔고딕 ExtraBold" panose="020D0904000000000000" pitchFamily="50" charset="-127"/>
+                <a:ea typeface="나눔고딕 ExtraBold" panose="020D0904000000000000" pitchFamily="50" charset="-127"/>
+              </a:rPr>
+              <a:t>Park </a:t>
+            </a:r>
+            <a:r>
+              <a:rPr lang="en-US" altLang="ko-KR" dirty="0">
+                <a:latin typeface="나눔고딕 ExtraBold" panose="020D0904000000000000" pitchFamily="50" charset="-127"/>
+                <a:ea typeface="나눔고딕 ExtraBold" panose="020D0904000000000000" pitchFamily="50" charset="-127"/>
+              </a:rPr>
+              <a:t>J</a:t>
+            </a:r>
+            <a:r>
+              <a:rPr lang="en-US" altLang="ko-KR" dirty="0" smtClean="0">
+                <a:latin typeface="나눔고딕 ExtraBold" panose="020D0904000000000000" pitchFamily="50" charset="-127"/>
+                <a:ea typeface="나눔고딕 ExtraBold" panose="020D0904000000000000" pitchFamily="50" charset="-127"/>
+              </a:rPr>
+              <a:t>ae </a:t>
+            </a:r>
+            <a:r>
+              <a:rPr lang="en-US" altLang="ko-KR" dirty="0" smtClean="0">
+                <a:latin typeface="나눔고딕 ExtraBold" panose="020D0904000000000000" pitchFamily="50" charset="-127"/>
+                <a:ea typeface="나눔고딕 ExtraBold" panose="020D0904000000000000" pitchFamily="50" charset="-127"/>
+              </a:rPr>
+              <a:t>Yong</a:t>
+            </a:r>
+          </a:p>
+          <a:p>
+            <a:r>
+              <a:rPr lang="en-US" altLang="ko-KR" dirty="0" smtClean="0">
+                <a:latin typeface="나눔고딕 ExtraBold" panose="020D0904000000000000" pitchFamily="50" charset="-127"/>
+                <a:ea typeface="나눔고딕 ExtraBold" panose="020D0904000000000000" pitchFamily="50" charset="-127"/>
+              </a:rPr>
+              <a:t>Developer and</a:t>
+            </a:r>
+            <a:r>
+              <a:rPr lang="ko-KR" altLang="en-US" dirty="0" smtClean="0">
+                <a:latin typeface="나눔고딕 ExtraBold" panose="020D0904000000000000" pitchFamily="50" charset="-127"/>
+                <a:ea typeface="나눔고딕 ExtraBold" panose="020D0904000000000000" pitchFamily="50" charset="-127"/>
+              </a:rPr>
+              <a:t> </a:t>
+            </a:r>
+            <a:r>
+              <a:rPr lang="en-US" altLang="ko-KR" dirty="0" smtClean="0">
+                <a:latin typeface="나눔고딕 ExtraBold" panose="020D0904000000000000" pitchFamily="50" charset="-127"/>
+                <a:ea typeface="나눔고딕 ExtraBold" panose="020D0904000000000000" pitchFamily="50" charset="-127"/>
+              </a:rPr>
+              <a:t>designer</a:t>
+            </a:r>
+          </a:p>
+        </p:txBody>
+      </p:sp>
+      <p:sp>
+        <p:nvSpPr>
+          <p:cNvPr id="13" name="TextBox 12"/>
+          <p:cNvSpPr txBox="1"/>
+          <p:nvPr/>
+        </p:nvSpPr>
+        <p:spPr>
+          <a:xfrm>
+            <a:off x="3184072" y="5289196"/>
+            <a:ext cx="3150468" cy="646331"/>
+          </a:xfrm>
+          <a:prstGeom prst="rect">
+            <a:avLst/>
+          </a:prstGeom>
+          <a:noFill/>
+        </p:spPr>
+        <p:txBody>
+          <a:bodyPr wrap="square" rtlCol="0">
+            <a:spAutoFit/>
+          </a:bodyPr>
+          <a:lstStyle/>
+          <a:p>
+            <a:pPr algn="ctr"/>
+            <a:r>
+              <a:rPr lang="en-US" altLang="ko-KR" dirty="0" smtClean="0">
+                <a:latin typeface="나눔고딕 ExtraBold" panose="020D0904000000000000" pitchFamily="50" charset="-127"/>
+                <a:ea typeface="나눔고딕 ExtraBold" panose="020D0904000000000000" pitchFamily="50" charset="-127"/>
+              </a:rPr>
+              <a:t>Kim Dong </a:t>
+            </a:r>
+            <a:r>
+              <a:rPr lang="en-US" altLang="ko-KR" dirty="0" err="1" smtClean="0">
+                <a:latin typeface="나눔고딕 ExtraBold" panose="020D0904000000000000" pitchFamily="50" charset="-127"/>
+                <a:ea typeface="나눔고딕 ExtraBold" panose="020D0904000000000000" pitchFamily="50" charset="-127"/>
+              </a:rPr>
+              <a:t>Gyu</a:t>
+            </a:r>
+            <a:endParaRPr lang="en-US" altLang="ko-KR" dirty="0" smtClean="0">
+              <a:latin typeface="나눔고딕 ExtraBold" panose="020D0904000000000000" pitchFamily="50" charset="-127"/>
+              <a:ea typeface="나눔고딕 ExtraBold" panose="020D0904000000000000" pitchFamily="50" charset="-127"/>
+            </a:endParaRPr>
+          </a:p>
+          <a:p>
+            <a:r>
+              <a:rPr lang="en-US" altLang="ko-KR" dirty="0" smtClean="0">
+                <a:latin typeface="나눔고딕 ExtraBold" panose="020D0904000000000000" pitchFamily="50" charset="-127"/>
+                <a:ea typeface="나눔고딕 ExtraBold" panose="020D0904000000000000" pitchFamily="50" charset="-127"/>
+              </a:rPr>
+              <a:t>Making </a:t>
+            </a:r>
+            <a:r>
+              <a:rPr lang="en-US" altLang="ko-KR" dirty="0" err="1" smtClean="0">
+                <a:latin typeface="나눔고딕 ExtraBold" panose="020D0904000000000000" pitchFamily="50" charset="-127"/>
+                <a:ea typeface="나눔고딕 ExtraBold" panose="020D0904000000000000" pitchFamily="50" charset="-127"/>
+              </a:rPr>
+              <a:t>ppt</a:t>
+            </a:r>
+            <a:r>
+              <a:rPr lang="en-US" altLang="ko-KR" dirty="0" smtClean="0">
+                <a:latin typeface="나눔고딕 ExtraBold" panose="020D0904000000000000" pitchFamily="50" charset="-127"/>
+                <a:ea typeface="나눔고딕 ExtraBold" panose="020D0904000000000000" pitchFamily="50" charset="-127"/>
+              </a:rPr>
+              <a:t> and Document</a:t>
+            </a:r>
+            <a:endParaRPr lang="ko-KR" altLang="en-US" dirty="0">
+              <a:latin typeface="나눔고딕 ExtraBold" panose="020D0904000000000000" pitchFamily="50" charset="-127"/>
+              <a:ea typeface="나눔고딕 ExtraBold" panose="020D0904000000000000" pitchFamily="50" charset="-127"/>
+            </a:endParaRPr>
+          </a:p>
+        </p:txBody>
+      </p:sp>
+      <p:sp>
+        <p:nvSpPr>
+          <p:cNvPr id="14" name="TextBox 13"/>
+          <p:cNvSpPr txBox="1"/>
+          <p:nvPr/>
+        </p:nvSpPr>
+        <p:spPr>
+          <a:xfrm>
+            <a:off x="6149386" y="5304781"/>
+            <a:ext cx="3369698" cy="646331"/>
+          </a:xfrm>
+          <a:prstGeom prst="rect">
+            <a:avLst/>
+          </a:prstGeom>
+          <a:noFill/>
+        </p:spPr>
+        <p:txBody>
+          <a:bodyPr wrap="square" rtlCol="0">
+            <a:spAutoFit/>
+          </a:bodyPr>
+          <a:lstStyle/>
+          <a:p>
+            <a:pPr algn="ctr"/>
+            <a:r>
+              <a:rPr lang="en-US" altLang="ko-KR" dirty="0" smtClean="0">
+                <a:latin typeface="나눔고딕 ExtraBold" panose="020D0904000000000000" pitchFamily="50" charset="-127"/>
+                <a:ea typeface="나눔고딕 ExtraBold" panose="020D0904000000000000" pitchFamily="50" charset="-127"/>
+              </a:rPr>
+              <a:t>Kim Min </a:t>
+            </a:r>
+            <a:r>
+              <a:rPr lang="en-US" altLang="ko-KR" dirty="0" smtClean="0">
+                <a:latin typeface="나눔고딕 ExtraBold" panose="020D0904000000000000" pitchFamily="50" charset="-127"/>
+                <a:ea typeface="나눔고딕 ExtraBold" panose="020D0904000000000000" pitchFamily="50" charset="-127"/>
+              </a:rPr>
+              <a:t>Sang</a:t>
+            </a:r>
+          </a:p>
+          <a:p>
+            <a:r>
+              <a:rPr lang="en-US" altLang="ko-KR" dirty="0" smtClean="0">
+                <a:latin typeface="나눔고딕 ExtraBold" panose="020D0904000000000000" pitchFamily="50" charset="-127"/>
+                <a:ea typeface="나눔고딕 ExtraBold" panose="020D0904000000000000" pitchFamily="50" charset="-127"/>
+              </a:rPr>
+              <a:t>Main Developer and Designer</a:t>
+            </a:r>
+            <a:endParaRPr lang="ko-KR" altLang="en-US" dirty="0">
+              <a:latin typeface="나눔고딕 ExtraBold" panose="020D0904000000000000" pitchFamily="50" charset="-127"/>
+              <a:ea typeface="나눔고딕 ExtraBold" panose="020D0904000000000000" pitchFamily="50" charset="-127"/>
+            </a:endParaRPr>
+          </a:p>
+        </p:txBody>
+      </p:sp>
     </p:spTree>
     <p:extLst>
       <p:ext uri="{BB962C8B-B14F-4D97-AF65-F5344CB8AC3E}">
-        <p14:creationId xmlns:p14="http://schemas.microsoft.com/office/powerpoint/2010/main" xmlns="" val="480007770"/>
+        <p14:creationId xmlns="" xmlns:p14="http://schemas.microsoft.com/office/powerpoint/2010/main" val="480007770"/>
       </p:ext>
     </p:extLst>
   </p:cSld>
@@ -8375,7 +8023,7 @@
                             </p:stCondLst>
                             <p:childTnLst>
                               <p:par>
-                                <p:cTn id="22" presetID="2" presetClass="entr" presetSubtype="4" fill="hold" grpId="0" nodeType="clickEffect">
+                                <p:cTn id="22" presetID="22" presetClass="entr" presetSubtype="1" fill="hold" nodeType="clickEffect">
                                   <p:stCondLst>
                                     <p:cond delay="0"/>
                                   </p:stCondLst>
@@ -8388,7 +8036,113 @@
                                           </p:stCondLst>
                                         </p:cTn>
                                         <p:tgtEl>
-                                          <p:spTgt spid="7"/>
+                                          <p:spTgt spid="6"/>
+                                        </p:tgtEl>
+                                        <p:attrNameLst>
+                                          <p:attrName>style.visibility</p:attrName>
+                                        </p:attrNameLst>
+                                      </p:cBhvr>
+                                      <p:to>
+                                        <p:strVal val="visible"/>
+                                      </p:to>
+                                    </p:set>
+                                    <p:animEffect transition="in" filter="wipe(up)">
+                                      <p:cBhvr>
+                                        <p:cTn id="24" dur="500"/>
+                                        <p:tgtEl>
+                                          <p:spTgt spid="6"/>
+                                        </p:tgtEl>
+                                      </p:cBhvr>
+                                    </p:animEffect>
+                                  </p:childTnLst>
+                                </p:cTn>
+                              </p:par>
+                            </p:childTnLst>
+                          </p:cTn>
+                        </p:par>
+                      </p:childTnLst>
+                    </p:cTn>
+                  </p:par>
+                  <p:par>
+                    <p:cTn id="25" fill="hold">
+                      <p:stCondLst>
+                        <p:cond delay="indefinite"/>
+                      </p:stCondLst>
+                      <p:childTnLst>
+                        <p:par>
+                          <p:cTn id="26" fill="hold">
+                            <p:stCondLst>
+                              <p:cond delay="0"/>
+                            </p:stCondLst>
+                            <p:childTnLst>
+                              <p:par>
+                                <p:cTn id="27" presetID="22" presetClass="entr" presetSubtype="1" fill="hold" nodeType="clickEffect">
+                                  <p:stCondLst>
+                                    <p:cond delay="0"/>
+                                  </p:stCondLst>
+                                  <p:childTnLst>
+                                    <p:set>
+                                      <p:cBhvr>
+                                        <p:cTn id="28" dur="1" fill="hold">
+                                          <p:stCondLst>
+                                            <p:cond delay="0"/>
+                                          </p:stCondLst>
+                                        </p:cTn>
+                                        <p:tgtEl>
+                                          <p:spTgt spid="10"/>
+                                        </p:tgtEl>
+                                        <p:attrNameLst>
+                                          <p:attrName>style.visibility</p:attrName>
+                                        </p:attrNameLst>
+                                      </p:cBhvr>
+                                      <p:to>
+                                        <p:strVal val="visible"/>
+                                      </p:to>
+                                    </p:set>
+                                    <p:animEffect transition="in" filter="wipe(up)">
+                                      <p:cBhvr>
+                                        <p:cTn id="29" dur="500"/>
+                                        <p:tgtEl>
+                                          <p:spTgt spid="10"/>
+                                        </p:tgtEl>
+                                      </p:cBhvr>
+                                    </p:animEffect>
+                                  </p:childTnLst>
+                                </p:cTn>
+                              </p:par>
+                            </p:childTnLst>
+                          </p:cTn>
+                        </p:par>
+                      </p:childTnLst>
+                    </p:cTn>
+                  </p:par>
+                  <p:par>
+                    <p:cTn id="30" fill="hold">
+                      <p:stCondLst>
+                        <p:cond delay="indefinite"/>
+                      </p:stCondLst>
+                      <p:childTnLst>
+                        <p:par>
+                          <p:cTn id="31" fill="hold">
+                            <p:stCondLst>
+                              <p:cond delay="0"/>
+                            </p:stCondLst>
+                            <p:childTnLst>
+                              <p:par>
+                                <p:cTn id="32" presetID="2" presetClass="entr" presetSubtype="4" fill="hold" grpId="0" nodeType="clickEffect">
+                                  <p:stCondLst>
+                                    <p:cond delay="0"/>
+                                  </p:stCondLst>
+                                  <p:childTnLst>
+                                    <p:set>
+                                      <p:cBhvr>
+                                        <p:cTn id="33" dur="1" fill="hold">
+                                          <p:stCondLst>
+                                            <p:cond delay="0"/>
+                                          </p:stCondLst>
+                                        </p:cTn>
+                                        <p:tgtEl>
+                                          <p:spTgt spid="12"/>
                                         </p:tgtEl>
                                         <p:attrNameLst>
                                           <p:attrName>style.visibility</p:attrName>
@@ -8400,9 +8154,9 @@
                                     </p:set>
                                     <p:anim calcmode="lin" valueType="num">
                                       <p:cBhvr additive="base">
-                                        <p:cTn id="24" dur="500" fill="hold"/>
-                                        <p:tgtEl>
-                                          <p:spTgt spid="7"/>
+                                        <p:cTn id="34" dur="500" fill="hold"/>
+                                        <p:tgtEl>
+                                          <p:spTgt spid="12"/>
                                         </p:tgtEl>
                                         <p:attrNameLst>
                                           <p:attrName>ppt_x</p:attrName>
@@ -8423,9 +8177,9 @@
                                     </p:anim>
                                     <p:anim calcmode="lin" valueType="num">
                                       <p:cBhvr additive="base">
-                                        <p:cTn id="25" dur="500" fill="hold"/>
-                                        <p:tgtEl>
-                                          <p:spTgt spid="7"/>
+                                        <p:cTn id="35" dur="500" fill="hold"/>
+                                        <p:tgtEl>
+                                          <p:spTgt spid="12"/>
                                         </p:tgtEl>
                                         <p:attrNameLst>
                                           <p:attrName>ppt_y</p:attrName>
@@ -8454,85 +8208,32 @@
                     </p:cTn>
                   </p:par>
                   <p:par>
-                    <p:cTn id="26" fill="hold">
+                    <p:cTn id="36" fill="hold">
                       <p:stCondLst>
                         <p:cond delay="indefinite"/>
                       </p:stCondLst>
                       <p:childTnLst>
                         <p:par>
-                          <p:cTn id="27" fill="hold">
+                          <p:cTn id="37" fill="hold">
                             <p:stCondLst>
                               <p:cond delay="0"/>
                             </p:stCondLst>
                             <p:childTnLst>
                               <p:par>
-                                <p:cTn id="28" presetID="22" presetClass="entr" presetSubtype="1" fill="hold" nodeType="clickEffect">
+                                <p:cTn id="38" presetID="2" presetClass="entr" presetSubtype="4" fill="hold" grpId="0" nodeType="clickEffect">
                                   <p:stCondLst>
                                     <p:cond delay="0"/>
                                   </p:stCondLst>
                                   <p:childTnLst>
                                     <p:set>
                                       <p:cBhvr>
-                                        <p:cTn id="29" dur="1" fill="hold">
+                                        <p:cTn id="39" dur="1" fill="hold">
                                           <p:stCondLst>
                                             <p:cond delay="0"/>
                                           </p:stCondLst>
                                         </p:cTn>
                                         <p:tgtEl>
-                                          <p:spTgt spid="6"/>
-                                        </p:tgtEl>
-                                        <p:attrNameLst>
-                                          <p:attrName>style.visibility</p:attrName>
-                                        </p:attrNameLst>
-                                      </p:cBhvr>
-                                      <p:to>
-                                        <p:strVal val="visible"/>
-                                      </p:to>
-                                    </p:set>
-                                    <p:animEffect transition="in" filter="wipe(up)">
-                                      <p:cBhvr>
-                                        <p:cTn id="30" dur="500"/>
-                                        <p:tgtEl>
-                                          <p:spTgt spid="6"/>
-                                        </p:tgtEl>
-                                      </p:cBhvr>
-                                    </p:animEffect>
-                                  </p:childTnLst>
-                                </p:cTn>
-                              </p:par>
-                            </p:childTnLst>
-                          </p:cTn>
-                        </p:par>
-                      </p:childTnLst>
-                    </p:cTn>
-                  </p:par>
-                  <p:par>
-                    <p:cTn id="31" fill="hold">
-                      <p:stCondLst>
-                        <p:cond delay="indefinite"/>
-                      </p:stCondLst>
-                      <p:childTnLst>
-                        <p:par>
-                          <p:cTn id="32" fill="hold">
-                            <p:stCondLst>
-                              <p:cond delay="0"/>
-                            </p:stCondLst>
-                            <p:childTnLst>
-                              <p:par>
-                                <p:cTn id="33" presetID="2" presetClass="entr" presetSubtype="4" fill="hold" grpId="0" nodeType="clickEffect">
-                                  <p:stCondLst>
-                                    <p:cond delay="0"/>
-                                  </p:stCondLst>
-                                  <p:childTnLst>
-                                    <p:set>
-                                      <p:cBhvr>
-                                        <p:cTn id="34" dur="1" fill="hold">
-                                          <p:stCondLst>
-                                            <p:cond delay="0"/>
-                                          </p:stCondLst>
-                                        </p:cTn>
-                                        <p:tgtEl>
-                                          <p:spTgt spid="8"/>
+                                          <p:spTgt spid="13"/>
                                         </p:tgtEl>
                                         <p:attrNameLst>
                                           <p:attrName>style.visibility</p:attrName>
@@ -8544,9 +8245,9 @@
                                     </p:set>
                                     <p:anim calcmode="lin" valueType="num">
                                       <p:cBhvr additive="base">
-                                        <p:cTn id="35" dur="500" fill="hold"/>
-                                        <p:tgtEl>
-                                          <p:spTgt spid="8"/>
+                                        <p:cTn id="40" dur="500" fill="hold"/>
+                                        <p:tgtEl>
+                                          <p:spTgt spid="13"/>
                                         </p:tgtEl>
                                         <p:attrNameLst>
                                           <p:attrName>ppt_x</p:attrName>
@@ -8567,9 +8268,9 @@
                                     </p:anim>
                                     <p:anim calcmode="lin" valueType="num">
                                       <p:cBhvr additive="base">
-                                        <p:cTn id="36" dur="500" fill="hold"/>
-                                        <p:tgtEl>
-                                          <p:spTgt spid="8"/>
+                                        <p:cTn id="41" dur="500" fill="hold"/>
+                                        <p:tgtEl>
+                                          <p:spTgt spid="13"/>
                                         </p:tgtEl>
                                         <p:attrNameLst>
                                           <p:attrName>ppt_y</p:attrName>
@@ -8588,59 +8289,6 @@
                                         </p:tav>
                                       </p:tavLst>
                                     </p:anim>
-                                  </p:childTnLst>
-                                </p:cTn>
-                              </p:par>
-                            </p:childTnLst>
-                          </p:cTn>
-                        </p:par>
-                      </p:childTnLst>
-                    </p:cTn>
-                  </p:par>
-                  <p:par>
-                    <p:cTn id="37" fill="hold">
-                      <p:stCondLst>
-                        <p:cond delay="indefinite"/>
-                      </p:stCondLst>
-                      <p:childTnLst>
-                        <p:par>
-                          <p:cTn id="38" fill="hold">
-                            <p:stCondLst>
-                              <p:cond delay="0"/>
-                            </p:stCondLst>
-                            <p:childTnLst>
-                              <p:par>
-                                <p:cTn id="39" presetID="22" presetClass="entr" presetSubtype="1" fill="hold" nodeType="clickEffect">
-                                  <p:stCondLst>
-                                    <p:cond delay="0"/>
-                                  </p:stCondLst>
-                                  <p:childTnLst>
-                                    <p:set>
-                                      <p:cBhvr>
-                                        <p:cTn id="40" dur="1" fill="hold">
-                                          <p:stCondLst>
-                                            <p:cond delay="0"/>
-                                          </p:stCondLst>
-                                        </p:cTn>
-                                        <p:tgtEl>
-                                          <p:spTgt spid="10"/>
-                                        </p:tgtEl>
-                                        <p:attrNameLst>
-                                          <p:attrName>style.visibility</p:attrName>
-                                        </p:attrNameLst>
-                                      </p:cBhvr>
-                                      <p:to>
-                                        <p:strVal val="visible"/>
-                                      </p:to>
-                                    </p:set>
-                                    <p:animEffect transition="in" filter="wipe(up)">
-                                      <p:cBhvr>
-                                        <p:cTn id="41" dur="500"/>
-                                        <p:tgtEl>
-                                          <p:spTgt spid="10"/>
-                                        </p:tgtEl>
-                                      </p:cBhvr>
-                                    </p:animEffect>
                                   </p:childTnLst>
                                 </p:cTn>
                               </p:par>
@@ -8676,7 +8324,7 @@
                                           </p:stCondLst>
                                         </p:cTn>
                                         <p:tgtEl>
-                                          <p:spTgt spid="9"/>
+                                          <p:spTgt spid="14"/>
                                         </p:tgtEl>
                                         <p:attrNameLst>
                                           <p:attrName>style.visibility</p:attrName>
@@ -8690,7 +8338,7 @@
                                       <p:cBhvr additive="base">
                                         <p:cTn id="46" dur="500" fill="hold"/>
                                         <p:tgtEl>
-                                          <p:spTgt spid="9"/>
+                                          <p:spTgt spid="14"/>
                                         </p:tgtEl>
                                         <p:attrNameLst>
                                           <p:attrName>ppt_x</p:attrName>
@@ -8713,7 +8361,7 @@
                                       <p:cBhvr additive="base">
                                         <p:cTn id="47" dur="500" fill="hold"/>
                                         <p:tgtEl>
-                                          <p:spTgt spid="9"/>
+                                          <p:spTgt spid="14"/>
                                         </p:tgtEl>
                                         <p:attrNameLst>
                                           <p:attrName>ppt_y</p:attrName>
@@ -8764,9 +8412,9 @@
     </p:tnLst>
     <p:bldLst>
       <p:bldP spid="5" grpId="0"/>
-      <p:bldP spid="7" grpId="0"/>
-      <p:bldP spid="8" grpId="0"/>
-      <p:bldP spid="9" grpId="0"/>
+      <p:bldP spid="12" grpId="0"/>
+      <p:bldP spid="13" grpId="0"/>
+      <p:bldP spid="14" grpId="0"/>
     </p:bldLst>
   </p:timing>
 </p:sld>
@@ -8801,7 +8449,7 @@
           <a:blip r:embed="rId2" cstate="print">
             <a:extLst>
               <a:ext uri="{28A0092B-C50C-407E-A947-70E740481C1C}">
-                <a14:useLocalDpi xmlns:a14="http://schemas.microsoft.com/office/drawing/2010/main" xmlns="" val="0"/>
+                <a14:useLocalDpi xmlns="" xmlns:a14="http://schemas.microsoft.com/office/drawing/2010/main" val="0"/>
               </a:ext>
             </a:extLst>
           </a:blip>
@@ -8831,7 +8479,7 @@
           <a:blip r:embed="rId3" cstate="print">
             <a:extLst>
               <a:ext uri="{28A0092B-C50C-407E-A947-70E740481C1C}">
-                <a14:useLocalDpi xmlns:a14="http://schemas.microsoft.com/office/drawing/2010/main" xmlns="" val="0"/>
+                <a14:useLocalDpi xmlns="" xmlns:a14="http://schemas.microsoft.com/office/drawing/2010/main" val="0"/>
               </a:ext>
             </a:extLst>
           </a:blip>
@@ -8897,7 +8545,7 @@
           <a:blip r:embed="rId4" cstate="print">
             <a:extLst>
               <a:ext uri="{28A0092B-C50C-407E-A947-70E740481C1C}">
-                <a14:useLocalDpi xmlns:a14="http://schemas.microsoft.com/office/drawing/2010/main" xmlns="" val="0"/>
+                <a14:useLocalDpi xmlns="" xmlns:a14="http://schemas.microsoft.com/office/drawing/2010/main" val="0"/>
               </a:ext>
             </a:extLst>
           </a:blip>
@@ -8927,7 +8575,7 @@
           <a:blip r:embed="rId5" cstate="print">
             <a:extLst>
               <a:ext uri="{28A0092B-C50C-407E-A947-70E740481C1C}">
-                <a14:useLocalDpi xmlns:a14="http://schemas.microsoft.com/office/drawing/2010/main" xmlns="" val="0"/>
+                <a14:useLocalDpi xmlns="" xmlns:a14="http://schemas.microsoft.com/office/drawing/2010/main" val="0"/>
               </a:ext>
             </a:extLst>
           </a:blip>
@@ -8957,7 +8605,7 @@
           <a:blip r:embed="rId6" cstate="print">
             <a:extLst>
               <a:ext uri="{28A0092B-C50C-407E-A947-70E740481C1C}">
-                <a14:useLocalDpi xmlns:a14="http://schemas.microsoft.com/office/drawing/2010/main" xmlns="" val="0"/>
+                <a14:useLocalDpi xmlns="" xmlns:a14="http://schemas.microsoft.com/office/drawing/2010/main" val="0"/>
               </a:ext>
             </a:extLst>
           </a:blip>
@@ -9014,7 +8662,7 @@
     </p:spTree>
     <p:extLst>
       <p:ext uri="{BB962C8B-B14F-4D97-AF65-F5344CB8AC3E}">
-        <p14:creationId xmlns:p14="http://schemas.microsoft.com/office/powerpoint/2010/main" xmlns="" val="3975010217"/>
+        <p14:creationId xmlns="" xmlns:p14="http://schemas.microsoft.com/office/powerpoint/2010/main" val="3975010217"/>
       </p:ext>
     </p:extLst>
   </p:cSld>
@@ -9662,1042 +9310,7 @@
           <a:blip r:embed="rId2" cstate="print">
             <a:extLst>
               <a:ext uri="{28A0092B-C50C-407E-A947-70E740481C1C}">
-                <a14:useLocalDpi xmlns:a14="http://schemas.microsoft.com/office/drawing/2010/main" xmlns="" val="0"/>
-              </a:ext>
-            </a:extLst>
-          </a:blip>
-          <a:stretch>
-            <a:fillRect/>
-          </a:stretch>
-        </p:blipFill>
-        <p:spPr>
-          <a:xfrm>
-            <a:off x="6216261" y="3494083"/>
-            <a:ext cx="5975739" cy="3363917"/>
-          </a:xfrm>
-          <a:prstGeom prst="rect">
-            <a:avLst/>
-          </a:prstGeom>
-        </p:spPr>
-      </p:pic>
-      <p:pic>
-        <p:nvPicPr>
-          <p:cNvPr id="3" name="그림 2"/>
-          <p:cNvPicPr>
-            <a:picLocks noChangeAspect="1"/>
-          </p:cNvPicPr>
-          <p:nvPr/>
-        </p:nvPicPr>
-        <p:blipFill>
-          <a:blip r:embed="rId3" cstate="print">
-            <a:extLst>
-              <a:ext uri="{28A0092B-C50C-407E-A947-70E740481C1C}">
-                <a14:useLocalDpi xmlns:a14="http://schemas.microsoft.com/office/drawing/2010/main" xmlns="" val="0"/>
-              </a:ext>
-            </a:extLst>
-          </a:blip>
-          <a:stretch>
-            <a:fillRect/>
-          </a:stretch>
-        </p:blipFill>
-        <p:spPr>
-          <a:xfrm>
-            <a:off x="271449" y="227244"/>
-            <a:ext cx="1130702" cy="1130702"/>
-          </a:xfrm>
-          <a:prstGeom prst="rect">
-            <a:avLst/>
-          </a:prstGeom>
-        </p:spPr>
-      </p:pic>
-      <p:sp>
-        <p:nvSpPr>
-          <p:cNvPr id="2" name="TextBox 1"/>
-          <p:cNvSpPr txBox="1"/>
-          <p:nvPr/>
-        </p:nvSpPr>
-        <p:spPr>
-          <a:xfrm>
-            <a:off x="1402151" y="330930"/>
-            <a:ext cx="10074729" cy="923330"/>
-          </a:xfrm>
-          <a:prstGeom prst="rect">
-            <a:avLst/>
-          </a:prstGeom>
-          <a:noFill/>
-        </p:spPr>
-        <p:txBody>
-          <a:bodyPr wrap="square" rtlCol="0">
-            <a:spAutoFit/>
-          </a:bodyPr>
-          <a:lstStyle/>
-          <a:p>
-            <a:r>
-              <a:rPr lang="en-US" altLang="ko-KR" sz="5400" dirty="0" smtClean="0">
-                <a:latin typeface="나눔고딕 ExtraBold" panose="020D0904000000000000" pitchFamily="50" charset="-127"/>
-                <a:ea typeface="나눔고딕 ExtraBold" panose="020D0904000000000000" pitchFamily="50" charset="-127"/>
-              </a:rPr>
-              <a:t>What App We Want To Make?</a:t>
-            </a:r>
-            <a:endParaRPr lang="ko-KR" altLang="en-US" sz="5400" dirty="0">
-              <a:latin typeface="나눔고딕 ExtraBold" panose="020D0904000000000000" pitchFamily="50" charset="-127"/>
-              <a:ea typeface="나눔고딕 ExtraBold" panose="020D0904000000000000" pitchFamily="50" charset="-127"/>
-            </a:endParaRPr>
-          </a:p>
-        </p:txBody>
-      </p:sp>
-      <p:pic>
-        <p:nvPicPr>
-          <p:cNvPr id="5" name="그림 4"/>
-          <p:cNvPicPr>
-            <a:picLocks noChangeAspect="1"/>
-          </p:cNvPicPr>
-          <p:nvPr/>
-        </p:nvPicPr>
-        <p:blipFill>
-          <a:blip r:embed="rId4" cstate="print">
-            <a:extLst>
-              <a:ext uri="{28A0092B-C50C-407E-A947-70E740481C1C}">
-                <a14:useLocalDpi xmlns:a14="http://schemas.microsoft.com/office/drawing/2010/main" xmlns="" val="0"/>
-              </a:ext>
-            </a:extLst>
-          </a:blip>
-          <a:stretch>
-            <a:fillRect/>
-          </a:stretch>
-        </p:blipFill>
-        <p:spPr>
-          <a:xfrm>
-            <a:off x="587830" y="2699656"/>
-            <a:ext cx="2073728" cy="2073728"/>
-          </a:xfrm>
-          <a:prstGeom prst="rect">
-            <a:avLst/>
-          </a:prstGeom>
-        </p:spPr>
-      </p:pic>
-      <p:pic>
-        <p:nvPicPr>
-          <p:cNvPr id="6" name="그림 5"/>
-          <p:cNvPicPr>
-            <a:picLocks noChangeAspect="1"/>
-          </p:cNvPicPr>
-          <p:nvPr/>
-        </p:nvPicPr>
-        <p:blipFill>
-          <a:blip r:embed="rId5" cstate="print">
-            <a:extLst>
-              <a:ext uri="{28A0092B-C50C-407E-A947-70E740481C1C}">
-                <a14:useLocalDpi xmlns:a14="http://schemas.microsoft.com/office/drawing/2010/main" xmlns="" val="0"/>
-              </a:ext>
-            </a:extLst>
-          </a:blip>
-          <a:stretch>
-            <a:fillRect/>
-          </a:stretch>
-        </p:blipFill>
-        <p:spPr>
-          <a:xfrm>
-            <a:off x="3510902" y="2808513"/>
-            <a:ext cx="1856014" cy="1856014"/>
-          </a:xfrm>
-          <a:prstGeom prst="rect">
-            <a:avLst/>
-          </a:prstGeom>
-        </p:spPr>
-      </p:pic>
-      <p:pic>
-        <p:nvPicPr>
-          <p:cNvPr id="7" name="그림 6"/>
-          <p:cNvPicPr>
-            <a:picLocks noChangeAspect="1"/>
-          </p:cNvPicPr>
-          <p:nvPr/>
-        </p:nvPicPr>
-        <p:blipFill>
-          <a:blip r:embed="rId6" cstate="print">
-            <a:extLst>
-              <a:ext uri="{28A0092B-C50C-407E-A947-70E740481C1C}">
-                <a14:useLocalDpi xmlns:a14="http://schemas.microsoft.com/office/drawing/2010/main" xmlns="" val="0"/>
-              </a:ext>
-            </a:extLst>
-          </a:blip>
-          <a:stretch>
-            <a:fillRect/>
-          </a:stretch>
-        </p:blipFill>
-        <p:spPr>
-          <a:xfrm>
-            <a:off x="6216260" y="2736927"/>
-            <a:ext cx="1999185" cy="1999185"/>
-          </a:xfrm>
-          <a:prstGeom prst="rect">
-            <a:avLst/>
-          </a:prstGeom>
-        </p:spPr>
-      </p:pic>
-      <p:sp>
-        <p:nvSpPr>
-          <p:cNvPr id="8" name="TextBox 7"/>
-          <p:cNvSpPr txBox="1"/>
-          <p:nvPr/>
-        </p:nvSpPr>
-        <p:spPr>
-          <a:xfrm>
-            <a:off x="2476758" y="5145819"/>
-            <a:ext cx="4810162" cy="769441"/>
-          </a:xfrm>
-          <a:prstGeom prst="rect">
-            <a:avLst/>
-          </a:prstGeom>
-          <a:noFill/>
-        </p:spPr>
-        <p:txBody>
-          <a:bodyPr wrap="square" rtlCol="0">
-            <a:spAutoFit/>
-          </a:bodyPr>
-          <a:lstStyle/>
-          <a:p>
-            <a:r>
-              <a:rPr lang="en-US" altLang="ko-KR" sz="4400" dirty="0" smtClean="0">
-                <a:latin typeface="나눔고딕 ExtraBold" panose="020D0904000000000000" pitchFamily="50" charset="-127"/>
-                <a:ea typeface="나눔고딕 ExtraBold" panose="020D0904000000000000" pitchFamily="50" charset="-127"/>
-              </a:rPr>
-              <a:t>Comfortable!!!!!</a:t>
-            </a:r>
-            <a:endParaRPr lang="ko-KR" altLang="en-US" sz="4400" dirty="0">
-              <a:latin typeface="나눔고딕 ExtraBold" panose="020D0904000000000000" pitchFamily="50" charset="-127"/>
-              <a:ea typeface="나눔고딕 ExtraBold" panose="020D0904000000000000" pitchFamily="50" charset="-127"/>
-            </a:endParaRPr>
-          </a:p>
-        </p:txBody>
-      </p:sp>
-    </p:spTree>
-    <p:extLst>
-      <p:ext uri="{BB962C8B-B14F-4D97-AF65-F5344CB8AC3E}">
-        <p14:creationId xmlns:p14="http://schemas.microsoft.com/office/powerpoint/2010/main" xmlns="" val="2264901083"/>
-      </p:ext>
-    </p:extLst>
-  </p:cSld>
-  <p:clrMapOvr>
-    <a:masterClrMapping/>
-  </p:clrMapOvr>
-  <p:timing>
-    <p:tnLst>
-      <p:par>
-        <p:cTn id="1" dur="indefinite" restart="never" nodeType="tmRoot">
-          <p:childTnLst>
-            <p:seq concurrent="1" nextAc="seek">
-              <p:cTn id="2" dur="indefinite" nodeType="mainSeq">
-                <p:childTnLst>
-                  <p:par>
-                    <p:cTn id="3" fill="hold">
-                      <p:stCondLst>
-                        <p:cond delay="indefinite"/>
-                      </p:stCondLst>
-                      <p:childTnLst>
-                        <p:par>
-                          <p:cTn id="4" fill="hold">
-                            <p:stCondLst>
-                              <p:cond delay="0"/>
-                            </p:stCondLst>
-                            <p:childTnLst>
-                              <p:par>
-                                <p:cTn id="5" presetID="47" presetClass="entr" presetSubtype="0" fill="hold" nodeType="clickEffect">
-                                  <p:stCondLst>
-                                    <p:cond delay="0"/>
-                                  </p:stCondLst>
-                                  <p:childTnLst>
-                                    <p:set>
-                                      <p:cBhvr>
-                                        <p:cTn id="6" dur="1" fill="hold">
-                                          <p:stCondLst>
-                                            <p:cond delay="0"/>
-                                          </p:stCondLst>
-                                        </p:cTn>
-                                        <p:tgtEl>
-                                          <p:spTgt spid="3"/>
-                                        </p:tgtEl>
-                                        <p:attrNameLst>
-                                          <p:attrName>style.visibility</p:attrName>
-                                        </p:attrNameLst>
-                                      </p:cBhvr>
-                                      <p:to>
-                                        <p:strVal val="visible"/>
-                                      </p:to>
-                                    </p:set>
-                                    <p:animEffect transition="in" filter="fade">
-                                      <p:cBhvr>
-                                        <p:cTn id="7" dur="1000"/>
-                                        <p:tgtEl>
-                                          <p:spTgt spid="3"/>
-                                        </p:tgtEl>
-                                      </p:cBhvr>
-                                    </p:animEffect>
-                                    <p:anim calcmode="lin" valueType="num">
-                                      <p:cBhvr>
-                                        <p:cTn id="8" dur="1000" fill="hold"/>
-                                        <p:tgtEl>
-                                          <p:spTgt spid="3"/>
-                                        </p:tgtEl>
-                                        <p:attrNameLst>
-                                          <p:attrName>ppt_x</p:attrName>
-                                        </p:attrNameLst>
-                                      </p:cBhvr>
-                                      <p:tavLst>
-                                        <p:tav tm="0">
-                                          <p:val>
-                                            <p:strVal val="#ppt_x"/>
-                                          </p:val>
-                                        </p:tav>
-                                        <p:tav tm="100000">
-                                          <p:val>
-                                            <p:strVal val="#ppt_x"/>
-                                          </p:val>
-                                        </p:tav>
-                                      </p:tavLst>
-                                    </p:anim>
-                                    <p:anim calcmode="lin" valueType="num">
-                                      <p:cBhvr>
-                                        <p:cTn id="9" dur="1000" fill="hold"/>
-                                        <p:tgtEl>
-                                          <p:spTgt spid="3"/>
-                                        </p:tgtEl>
-                                        <p:attrNameLst>
-                                          <p:attrName>ppt_y</p:attrName>
-                                        </p:attrNameLst>
-                                      </p:cBhvr>
-                                      <p:tavLst>
-                                        <p:tav tm="0">
-                                          <p:val>
-                                            <p:strVal val="#ppt_y-.1"/>
-                                          </p:val>
-                                        </p:tav>
-                                        <p:tav tm="100000">
-                                          <p:val>
-                                            <p:strVal val="#ppt_y"/>
-                                          </p:val>
-                                        </p:tav>
-                                      </p:tavLst>
-                                    </p:anim>
-                                  </p:childTnLst>
-                                </p:cTn>
-                              </p:par>
-                              <p:par>
-                                <p:cTn id="10" presetID="47" presetClass="entr" presetSubtype="0" fill="hold" grpId="0" nodeType="withEffect">
-                                  <p:stCondLst>
-                                    <p:cond delay="0"/>
-                                  </p:stCondLst>
-                                  <p:childTnLst>
-                                    <p:set>
-                                      <p:cBhvr>
-                                        <p:cTn id="11" dur="1" fill="hold">
-                                          <p:stCondLst>
-                                            <p:cond delay="0"/>
-                                          </p:stCondLst>
-                                        </p:cTn>
-                                        <p:tgtEl>
-                                          <p:spTgt spid="2"/>
-                                        </p:tgtEl>
-                                        <p:attrNameLst>
-                                          <p:attrName>style.visibility</p:attrName>
-                                        </p:attrNameLst>
-                                      </p:cBhvr>
-                                      <p:to>
-                                        <p:strVal val="visible"/>
-                                      </p:to>
-                                    </p:set>
-                                    <p:animEffect transition="in" filter="fade">
-                                      <p:cBhvr>
-                                        <p:cTn id="12" dur="1000"/>
-                                        <p:tgtEl>
-                                          <p:spTgt spid="2"/>
-                                        </p:tgtEl>
-                                      </p:cBhvr>
-                                    </p:animEffect>
-                                    <p:anim calcmode="lin" valueType="num">
-                                      <p:cBhvr>
-                                        <p:cTn id="13" dur="1000" fill="hold"/>
-                                        <p:tgtEl>
-                                          <p:spTgt spid="2"/>
-                                        </p:tgtEl>
-                                        <p:attrNameLst>
-                                          <p:attrName>ppt_x</p:attrName>
-                                        </p:attrNameLst>
-                                      </p:cBhvr>
-                                      <p:tavLst>
-                                        <p:tav tm="0">
-                                          <p:val>
-                                            <p:strVal val="#ppt_x"/>
-                                          </p:val>
-                                        </p:tav>
-                                        <p:tav tm="100000">
-                                          <p:val>
-                                            <p:strVal val="#ppt_x"/>
-                                          </p:val>
-                                        </p:tav>
-                                      </p:tavLst>
-                                    </p:anim>
-                                    <p:anim calcmode="lin" valueType="num">
-                                      <p:cBhvr>
-                                        <p:cTn id="14" dur="1000" fill="hold"/>
-                                        <p:tgtEl>
-                                          <p:spTgt spid="2"/>
-                                        </p:tgtEl>
-                                        <p:attrNameLst>
-                                          <p:attrName>ppt_y</p:attrName>
-                                        </p:attrNameLst>
-                                      </p:cBhvr>
-                                      <p:tavLst>
-                                        <p:tav tm="0">
-                                          <p:val>
-                                            <p:strVal val="#ppt_y-.1"/>
-                                          </p:val>
-                                        </p:tav>
-                                        <p:tav tm="100000">
-                                          <p:val>
-                                            <p:strVal val="#ppt_y"/>
-                                          </p:val>
-                                        </p:tav>
-                                      </p:tavLst>
-                                    </p:anim>
-                                  </p:childTnLst>
-                                </p:cTn>
-                              </p:par>
-                            </p:childTnLst>
-                          </p:cTn>
-                        </p:par>
-                      </p:childTnLst>
-                    </p:cTn>
-                  </p:par>
-                  <p:par>
-                    <p:cTn id="15" fill="hold">
-                      <p:stCondLst>
-                        <p:cond delay="indefinite"/>
-                      </p:stCondLst>
-                      <p:childTnLst>
-                        <p:par>
-                          <p:cTn id="16" fill="hold">
-                            <p:stCondLst>
-                              <p:cond delay="0"/>
-                            </p:stCondLst>
-                            <p:childTnLst>
-                              <p:par>
-                                <p:cTn id="17" presetID="2" presetClass="entr" presetSubtype="8" fill="hold" nodeType="clickEffect">
-                                  <p:stCondLst>
-                                    <p:cond delay="0"/>
-                                  </p:stCondLst>
-                                  <p:childTnLst>
-                                    <p:set>
-                                      <p:cBhvr>
-                                        <p:cTn id="18" dur="1" fill="hold">
-                                          <p:stCondLst>
-                                            <p:cond delay="0"/>
-                                          </p:stCondLst>
-                                        </p:cTn>
-                                        <p:tgtEl>
-                                          <p:spTgt spid="5"/>
-                                        </p:tgtEl>
-                                        <p:attrNameLst>
-                                          <p:attrName>style.visibility</p:attrName>
-                                        </p:attrNameLst>
-                                      </p:cBhvr>
-                                      <p:to>
-                                        <p:strVal val="visible"/>
-                                      </p:to>
-                                    </p:set>
-                                    <p:anim calcmode="lin" valueType="num">
-                                      <p:cBhvr additive="base">
-                                        <p:cTn id="19" dur="500" fill="hold"/>
-                                        <p:tgtEl>
-                                          <p:spTgt spid="5"/>
-                                        </p:tgtEl>
-                                        <p:attrNameLst>
-                                          <p:attrName>ppt_x</p:attrName>
-                                        </p:attrNameLst>
-                                      </p:cBhvr>
-                                      <p:tavLst>
-                                        <p:tav tm="0">
-                                          <p:val>
-                                            <p:strVal val="0-#ppt_w/2"/>
-                                          </p:val>
-                                        </p:tav>
-                                        <p:tav tm="100000">
-                                          <p:val>
-                                            <p:strVal val="#ppt_x"/>
-                                          </p:val>
-                                        </p:tav>
-                                      </p:tavLst>
-                                    </p:anim>
-                                    <p:anim calcmode="lin" valueType="num">
-                                      <p:cBhvr additive="base">
-                                        <p:cTn id="20" dur="500" fill="hold"/>
-                                        <p:tgtEl>
-                                          <p:spTgt spid="5"/>
-                                        </p:tgtEl>
-                                        <p:attrNameLst>
-                                          <p:attrName>ppt_y</p:attrName>
-                                        </p:attrNameLst>
-                                      </p:cBhvr>
-                                      <p:tavLst>
-                                        <p:tav tm="0">
-                                          <p:val>
-                                            <p:strVal val="#ppt_y"/>
-                                          </p:val>
-                                        </p:tav>
-                                        <p:tav tm="100000">
-                                          <p:val>
-                                            <p:strVal val="#ppt_y"/>
-                                          </p:val>
-                                        </p:tav>
-                                      </p:tavLst>
-                                    </p:anim>
-                                  </p:childTnLst>
-                                </p:cTn>
-                              </p:par>
-                            </p:childTnLst>
-                          </p:cTn>
-                        </p:par>
-                      </p:childTnLst>
-                    </p:cTn>
-                  </p:par>
-                  <p:par>
-                    <p:cTn id="21" fill="hold">
-                      <p:stCondLst>
-                        <p:cond delay="indefinite"/>
-                      </p:stCondLst>
-                      <p:childTnLst>
-                        <p:par>
-                          <p:cTn id="22" fill="hold">
-                            <p:stCondLst>
-                              <p:cond delay="0"/>
-                            </p:stCondLst>
-                            <p:childTnLst>
-                              <p:par>
-                                <p:cTn id="23" presetID="2" presetClass="entr" presetSubtype="8" fill="hold" nodeType="clickEffect">
-                                  <p:stCondLst>
-                                    <p:cond delay="0"/>
-                                  </p:stCondLst>
-                                  <p:childTnLst>
-                                    <p:set>
-                                      <p:cBhvr>
-                                        <p:cTn id="24" dur="1" fill="hold">
-                                          <p:stCondLst>
-                                            <p:cond delay="0"/>
-                                          </p:stCondLst>
-                                        </p:cTn>
-                                        <p:tgtEl>
-                                          <p:spTgt spid="6"/>
-                                        </p:tgtEl>
-                                        <p:attrNameLst>
-                                          <p:attrName>style.visibility</p:attrName>
-                                        </p:attrNameLst>
-                                      </p:cBhvr>
-                                      <p:to>
-                                        <p:strVal val="visible"/>
-                                      </p:to>
-                                    </p:set>
-                                    <p:anim calcmode="lin" valueType="num">
-                                      <p:cBhvr additive="base">
-                                        <p:cTn id="25" dur="500" fill="hold"/>
-                                        <p:tgtEl>
-                                          <p:spTgt spid="6"/>
-                                        </p:tgtEl>
-                                        <p:attrNameLst>
-                                          <p:attrName>ppt_x</p:attrName>
-                                        </p:attrNameLst>
-                                      </p:cBhvr>
-                                      <p:tavLst>
-                                        <p:tav tm="0">
-                                          <p:val>
-                                            <p:strVal val="0-#ppt_w/2"/>
-                                          </p:val>
-                                        </p:tav>
-                                        <p:tav tm="100000">
-                                          <p:val>
-                                            <p:strVal val="#ppt_x"/>
-                                          </p:val>
-                                        </p:tav>
-                                      </p:tavLst>
-                                    </p:anim>
-                                    <p:anim calcmode="lin" valueType="num">
-                                      <p:cBhvr additive="base">
-                                        <p:cTn id="26" dur="500" fill="hold"/>
-                                        <p:tgtEl>
-                                          <p:spTgt spid="6"/>
-                                        </p:tgtEl>
-                                        <p:attrNameLst>
-                                          <p:attrName>ppt_y</p:attrName>
-                                        </p:attrNameLst>
-                                      </p:cBhvr>
-                                      <p:tavLst>
-                                        <p:tav tm="0">
-                                          <p:val>
-                                            <p:strVal val="#ppt_y"/>
-                                          </p:val>
-                                        </p:tav>
-                                        <p:tav tm="100000">
-                                          <p:val>
-                                            <p:strVal val="#ppt_y"/>
-                                          </p:val>
-                                        </p:tav>
-                                      </p:tavLst>
-                                    </p:anim>
-                                  </p:childTnLst>
-                                </p:cTn>
-                              </p:par>
-                            </p:childTnLst>
-                          </p:cTn>
-                        </p:par>
-                      </p:childTnLst>
-                    </p:cTn>
-                  </p:par>
-                  <p:par>
-                    <p:cTn id="27" fill="hold">
-                      <p:stCondLst>
-                        <p:cond delay="indefinite"/>
-                      </p:stCondLst>
-                      <p:childTnLst>
-                        <p:par>
-                          <p:cTn id="28" fill="hold">
-                            <p:stCondLst>
-                              <p:cond delay="0"/>
-                            </p:stCondLst>
-                            <p:childTnLst>
-                              <p:par>
-                                <p:cTn id="29" presetID="2" presetClass="entr" presetSubtype="8" fill="hold" nodeType="clickEffect">
-                                  <p:stCondLst>
-                                    <p:cond delay="0"/>
-                                  </p:stCondLst>
-                                  <p:childTnLst>
-                                    <p:set>
-                                      <p:cBhvr>
-                                        <p:cTn id="30" dur="1" fill="hold">
-                                          <p:stCondLst>
-                                            <p:cond delay="0"/>
-                                          </p:stCondLst>
-                                        </p:cTn>
-                                        <p:tgtEl>
-                                          <p:spTgt spid="7"/>
-                                        </p:tgtEl>
-                                        <p:attrNameLst>
-                                          <p:attrName>style.visibility</p:attrName>
-                                        </p:attrNameLst>
-                                      </p:cBhvr>
-                                      <p:to>
-                                        <p:strVal val="visible"/>
-                                      </p:to>
-                                    </p:set>
-                                    <p:anim calcmode="lin" valueType="num">
-                                      <p:cBhvr additive="base">
-                                        <p:cTn id="31" dur="500" fill="hold"/>
-                                        <p:tgtEl>
-                                          <p:spTgt spid="7"/>
-                                        </p:tgtEl>
-                                        <p:attrNameLst>
-                                          <p:attrName>ppt_x</p:attrName>
-                                        </p:attrNameLst>
-                                      </p:cBhvr>
-                                      <p:tavLst>
-                                        <p:tav tm="0">
-                                          <p:val>
-                                            <p:strVal val="0-#ppt_w/2"/>
-                                          </p:val>
-                                        </p:tav>
-                                        <p:tav tm="100000">
-                                          <p:val>
-                                            <p:strVal val="#ppt_x"/>
-                                          </p:val>
-                                        </p:tav>
-                                      </p:tavLst>
-                                    </p:anim>
-                                    <p:anim calcmode="lin" valueType="num">
-                                      <p:cBhvr additive="base">
-                                        <p:cTn id="32" dur="500" fill="hold"/>
-                                        <p:tgtEl>
-                                          <p:spTgt spid="7"/>
-                                        </p:tgtEl>
-                                        <p:attrNameLst>
-                                          <p:attrName>ppt_y</p:attrName>
-                                        </p:attrNameLst>
-                                      </p:cBhvr>
-                                      <p:tavLst>
-                                        <p:tav tm="0">
-                                          <p:val>
-                                            <p:strVal val="#ppt_y"/>
-                                          </p:val>
-                                        </p:tav>
-                                        <p:tav tm="100000">
-                                          <p:val>
-                                            <p:strVal val="#ppt_y"/>
-                                          </p:val>
-                                        </p:tav>
-                                      </p:tavLst>
-                                    </p:anim>
-                                  </p:childTnLst>
-                                </p:cTn>
-                              </p:par>
-                            </p:childTnLst>
-                          </p:cTn>
-                        </p:par>
-                      </p:childTnLst>
-                    </p:cTn>
-                  </p:par>
-                  <p:par>
-                    <p:cTn id="33" fill="hold">
-                      <p:stCondLst>
-                        <p:cond delay="indefinite"/>
-                      </p:stCondLst>
-                      <p:childTnLst>
-                        <p:par>
-                          <p:cTn id="34" fill="hold">
-                            <p:stCondLst>
-                              <p:cond delay="0"/>
-                            </p:stCondLst>
-                            <p:childTnLst>
-                              <p:par>
-                                <p:cTn id="35" presetID="26" presetClass="entr" presetSubtype="0" fill="hold" grpId="0" nodeType="clickEffect">
-                                  <p:stCondLst>
-                                    <p:cond delay="0"/>
-                                  </p:stCondLst>
-                                  <p:childTnLst>
-                                    <p:set>
-                                      <p:cBhvr>
-                                        <p:cTn id="36" dur="1" fill="hold">
-                                          <p:stCondLst>
-                                            <p:cond delay="0"/>
-                                          </p:stCondLst>
-                                        </p:cTn>
-                                        <p:tgtEl>
-                                          <p:spTgt spid="8"/>
-                                        </p:tgtEl>
-                                        <p:attrNameLst>
-                                          <p:attrName>style.visibility</p:attrName>
-                                        </p:attrNameLst>
-                                      </p:cBhvr>
-                                      <p:to>
-                                        <p:strVal val="visible"/>
-                                      </p:to>
-                                    </p:set>
-                                    <p:animEffect transition="in" filter="wipe(down)">
-                                      <p:cBhvr>
-                                        <p:cTn id="37" dur="580">
-                                          <p:stCondLst>
-                                            <p:cond delay="0"/>
-                                          </p:stCondLst>
-                                        </p:cTn>
-                                        <p:tgtEl>
-                                          <p:spTgt spid="8"/>
-                                        </p:tgtEl>
-                                      </p:cBhvr>
-                                    </p:animEffect>
-                                    <p:anim calcmode="lin" valueType="num">
-                                      <p:cBhvr>
-                                        <p:cTn id="38" dur="1822" tmFilter="0,0; 0.14,0.36; 0.43,0.73; 0.71,0.91; 1.0,1.0">
-                                          <p:stCondLst>
-                                            <p:cond delay="0"/>
-                                          </p:stCondLst>
-                                        </p:cTn>
-                                        <p:tgtEl>
-                                          <p:spTgt spid="8"/>
-                                        </p:tgtEl>
-                                        <p:attrNameLst>
-                                          <p:attrName>ppt_x</p:attrName>
-                                        </p:attrNameLst>
-                                      </p:cBhvr>
-                                      <p:tavLst>
-                                        <p:tav tm="0">
-                                          <p:val>
-                                            <p:strVal val="#ppt_x-0.25"/>
-                                          </p:val>
-                                        </p:tav>
-                                        <p:tav tm="100000">
-                                          <p:val>
-                                            <p:strVal val="#ppt_x"/>
-                                          </p:val>
-                                        </p:tav>
-                                      </p:tavLst>
-                                    </p:anim>
-                                    <p:anim calcmode="lin" valueType="num">
-                                      <p:cBhvr>
-                                        <p:cTn id="39" dur="664" tmFilter="0.0,0.0; 0.25,0.07; 0.50,0.2; 0.75,0.467; 1.0,1.0">
-                                          <p:stCondLst>
-                                            <p:cond delay="0"/>
-                                          </p:stCondLst>
-                                        </p:cTn>
-                                        <p:tgtEl>
-                                          <p:spTgt spid="8"/>
-                                        </p:tgtEl>
-                                        <p:attrNameLst>
-                                          <p:attrName>ppt_y</p:attrName>
-                                        </p:attrNameLst>
-                                      </p:cBhvr>
-                                      <p:tavLst>
-                                        <p:tav tm="0" fmla="#ppt_y-sin(pi*$)/3">
-                                          <p:val>
-                                            <p:fltVal val="0.5"/>
-                                          </p:val>
-                                        </p:tav>
-                                        <p:tav tm="100000">
-                                          <p:val>
-                                            <p:fltVal val="1"/>
-                                          </p:val>
-                                        </p:tav>
-                                      </p:tavLst>
-                                    </p:anim>
-                                    <p:anim calcmode="lin" valueType="num">
-                                      <p:cBhvr>
-                                        <p:cTn id="40" dur="664" tmFilter="0, 0; 0.125,0.2665; 0.25,0.4; 0.375,0.465; 0.5,0.5;  0.625,0.535; 0.75,0.6; 0.875,0.7335; 1,1">
-                                          <p:stCondLst>
-                                            <p:cond delay="664"/>
-                                          </p:stCondLst>
-                                        </p:cTn>
-                                        <p:tgtEl>
-                                          <p:spTgt spid="8"/>
-                                        </p:tgtEl>
-                                        <p:attrNameLst>
-                                          <p:attrName>ppt_y</p:attrName>
-                                        </p:attrNameLst>
-                                      </p:cBhvr>
-                                      <p:tavLst>
-                                        <p:tav tm="0" fmla="#ppt_y-sin(pi*$)/9">
-                                          <p:val>
-                                            <p:fltVal val="0"/>
-                                          </p:val>
-                                        </p:tav>
-                                        <p:tav tm="100000">
-                                          <p:val>
-                                            <p:fltVal val="1"/>
-                                          </p:val>
-                                        </p:tav>
-                                      </p:tavLst>
-                                    </p:anim>
-                                    <p:anim calcmode="lin" valueType="num">
-                                      <p:cBhvr>
-                                        <p:cTn id="41" dur="332" tmFilter="0, 0; 0.125,0.2665; 0.25,0.4; 0.375,0.465; 0.5,0.5;  0.625,0.535; 0.75,0.6; 0.875,0.7335; 1,1">
-                                          <p:stCondLst>
-                                            <p:cond delay="1324"/>
-                                          </p:stCondLst>
-                                        </p:cTn>
-                                        <p:tgtEl>
-                                          <p:spTgt spid="8"/>
-                                        </p:tgtEl>
-                                        <p:attrNameLst>
-                                          <p:attrName>ppt_y</p:attrName>
-                                        </p:attrNameLst>
-                                      </p:cBhvr>
-                                      <p:tavLst>
-                                        <p:tav tm="0" fmla="#ppt_y-sin(pi*$)/27">
-                                          <p:val>
-                                            <p:fltVal val="0"/>
-                                          </p:val>
-                                        </p:tav>
-                                        <p:tav tm="100000">
-                                          <p:val>
-                                            <p:fltVal val="1"/>
-                                          </p:val>
-                                        </p:tav>
-                                      </p:tavLst>
-                                    </p:anim>
-                                    <p:anim calcmode="lin" valueType="num">
-                                      <p:cBhvr>
-                                        <p:cTn id="42" dur="164" tmFilter="0, 0; 0.125,0.2665; 0.25,0.4; 0.375,0.465; 0.5,0.5;  0.625,0.535; 0.75,0.6; 0.875,0.7335; 1,1">
-                                          <p:stCondLst>
-                                            <p:cond delay="1656"/>
-                                          </p:stCondLst>
-                                        </p:cTn>
-                                        <p:tgtEl>
-                                          <p:spTgt spid="8"/>
-                                        </p:tgtEl>
-                                        <p:attrNameLst>
-                                          <p:attrName>ppt_y</p:attrName>
-                                        </p:attrNameLst>
-                                      </p:cBhvr>
-                                      <p:tavLst>
-                                        <p:tav tm="0" fmla="#ppt_y-sin(pi*$)/81">
-                                          <p:val>
-                                            <p:fltVal val="0"/>
-                                          </p:val>
-                                        </p:tav>
-                                        <p:tav tm="100000">
-                                          <p:val>
-                                            <p:fltVal val="1"/>
-                                          </p:val>
-                                        </p:tav>
-                                      </p:tavLst>
-                                    </p:anim>
-                                    <p:animScale>
-                                      <p:cBhvr>
-                                        <p:cTn id="43" dur="26">
-                                          <p:stCondLst>
-                                            <p:cond delay="650"/>
-                                          </p:stCondLst>
-                                        </p:cTn>
-                                        <p:tgtEl>
-                                          <p:spTgt spid="8"/>
-                                        </p:tgtEl>
-                                      </p:cBhvr>
-                                      <p:to x="100000" y="60000"/>
-                                    </p:animScale>
-                                    <p:animScale>
-                                      <p:cBhvr>
-                                        <p:cTn id="44" dur="166" decel="50000">
-                                          <p:stCondLst>
-                                            <p:cond delay="676"/>
-                                          </p:stCondLst>
-                                        </p:cTn>
-                                        <p:tgtEl>
-                                          <p:spTgt spid="8"/>
-                                        </p:tgtEl>
-                                      </p:cBhvr>
-                                      <p:to x="100000" y="100000"/>
-                                    </p:animScale>
-                                    <p:animScale>
-                                      <p:cBhvr>
-                                        <p:cTn id="45" dur="26">
-                                          <p:stCondLst>
-                                            <p:cond delay="1312"/>
-                                          </p:stCondLst>
-                                        </p:cTn>
-                                        <p:tgtEl>
-                                          <p:spTgt spid="8"/>
-                                        </p:tgtEl>
-                                      </p:cBhvr>
-                                      <p:to x="100000" y="80000"/>
-                                    </p:animScale>
-                                    <p:animScale>
-                                      <p:cBhvr>
-                                        <p:cTn id="46" dur="166" decel="50000">
-                                          <p:stCondLst>
-                                            <p:cond delay="1338"/>
-                                          </p:stCondLst>
-                                        </p:cTn>
-                                        <p:tgtEl>
-                                          <p:spTgt spid="8"/>
-                                        </p:tgtEl>
-                                      </p:cBhvr>
-                                      <p:to x="100000" y="100000"/>
-                                    </p:animScale>
-                                    <p:animScale>
-                                      <p:cBhvr>
-                                        <p:cTn id="47" dur="26">
-                                          <p:stCondLst>
-                                            <p:cond delay="1642"/>
-                                          </p:stCondLst>
-                                        </p:cTn>
-                                        <p:tgtEl>
-                                          <p:spTgt spid="8"/>
-                                        </p:tgtEl>
-                                      </p:cBhvr>
-                                      <p:to x="100000" y="90000"/>
-                                    </p:animScale>
-                                    <p:animScale>
-                                      <p:cBhvr>
-                                        <p:cTn id="48" dur="166" decel="50000">
-                                          <p:stCondLst>
-                                            <p:cond delay="1668"/>
-                                          </p:stCondLst>
-                                        </p:cTn>
-                                        <p:tgtEl>
-                                          <p:spTgt spid="8"/>
-                                        </p:tgtEl>
-                                      </p:cBhvr>
-                                      <p:to x="100000" y="100000"/>
-                                    </p:animScale>
-                                    <p:animScale>
-                                      <p:cBhvr>
-                                        <p:cTn id="49" dur="26">
-                                          <p:stCondLst>
-                                            <p:cond delay="1808"/>
-                                          </p:stCondLst>
-                                        </p:cTn>
-                                        <p:tgtEl>
-                                          <p:spTgt spid="8"/>
-                                        </p:tgtEl>
-                                      </p:cBhvr>
-                                      <p:to x="100000" y="95000"/>
-                                    </p:animScale>
-                                    <p:animScale>
-                                      <p:cBhvr>
-                                        <p:cTn id="50" dur="166" decel="50000">
-                                          <p:stCondLst>
-                                            <p:cond delay="1834"/>
-                                          </p:stCondLst>
-                                        </p:cTn>
-                                        <p:tgtEl>
-                                          <p:spTgt spid="8"/>
-                                        </p:tgtEl>
-                                      </p:cBhvr>
-                                      <p:to x="100000" y="100000"/>
-                                    </p:animScale>
-                                  </p:childTnLst>
-                                </p:cTn>
-                              </p:par>
-                            </p:childTnLst>
-                          </p:cTn>
-                        </p:par>
-                      </p:childTnLst>
-                    </p:cTn>
-                  </p:par>
-                </p:childTnLst>
-              </p:cTn>
-              <p:prevCondLst>
-                <p:cond evt="onPrev" delay="0">
-                  <p:tgtEl>
-                    <p:sldTgt/>
-                  </p:tgtEl>
-                </p:cond>
-              </p:prevCondLst>
-              <p:nextCondLst>
-                <p:cond evt="onNext" delay="0">
-                  <p:tgtEl>
-                    <p:sldTgt/>
-                  </p:tgtEl>
-                </p:cond>
-              </p:nextCondLst>
-            </p:seq>
-          </p:childTnLst>
-        </p:cTn>
-      </p:par>
-    </p:tnLst>
-    <p:bldLst>
-      <p:bldP spid="2" grpId="0"/>
-      <p:bldP spid="8" grpId="0"/>
-    </p:bldLst>
-  </p:timing>
-</p:sld>
-</file>
-
-<file path=ppt/slides/slide6.xml><?xml version="1.0" encoding="utf-8"?>
-<p:sld xmlns:a="http://schemas.openxmlformats.org/drawingml/2006/main" xmlns:r="http://schemas.openxmlformats.org/officeDocument/2006/relationships" xmlns:p="http://schemas.openxmlformats.org/presentationml/2006/main">
-  <p:cSld>
-    <p:spTree>
-      <p:nvGrpSpPr>
-        <p:cNvPr id="1" name=""/>
-        <p:cNvGrpSpPr/>
-        <p:nvPr/>
-      </p:nvGrpSpPr>
-      <p:grpSpPr>
-        <a:xfrm>
-          <a:off x="0" y="0"/>
-          <a:ext cx="0" cy="0"/>
-          <a:chOff x="0" y="0"/>
-          <a:chExt cx="0" cy="0"/>
-        </a:xfrm>
-      </p:grpSpPr>
-      <p:pic>
-        <p:nvPicPr>
-          <p:cNvPr id="4" name="그림 3"/>
-          <p:cNvPicPr>
-            <a:picLocks noChangeAspect="1"/>
-          </p:cNvPicPr>
-          <p:nvPr/>
-        </p:nvPicPr>
-        <p:blipFill>
-          <a:blip r:embed="rId2" cstate="print">
-            <a:extLst>
-              <a:ext uri="{28A0092B-C50C-407E-A947-70E740481C1C}">
-                <a14:useLocalDpi xmlns:a14="http://schemas.microsoft.com/office/drawing/2010/main" xmlns="" val="0"/>
+                <a14:useLocalDpi xmlns="" xmlns:a14="http://schemas.microsoft.com/office/drawing/2010/main" val="0"/>
               </a:ext>
             </a:extLst>
           </a:blip>
@@ -10754,7 +9367,7 @@
     </p:spTree>
     <p:extLst>
       <p:ext uri="{BB962C8B-B14F-4D97-AF65-F5344CB8AC3E}">
-        <p14:creationId xmlns:p14="http://schemas.microsoft.com/office/powerpoint/2010/main" xmlns="" val="1980715465"/>
+        <p14:creationId xmlns="" xmlns:p14="http://schemas.microsoft.com/office/powerpoint/2010/main" val="1980715465"/>
       </p:ext>
     </p:extLst>
   </p:cSld>
@@ -10771,7 +9384,7 @@
 </p:sld>
 </file>
 
-<file path=ppt/slides/slide7.xml><?xml version="1.0" encoding="utf-8"?>
+<file path=ppt/slides/slide6.xml><?xml version="1.0" encoding="utf-8"?>
 <p:sld xmlns:a="http://schemas.openxmlformats.org/drawingml/2006/main" xmlns:r="http://schemas.openxmlformats.org/officeDocument/2006/relationships" xmlns:p="http://schemas.openxmlformats.org/presentationml/2006/main">
   <p:cSld>
     <p:spTree>
@@ -10800,7 +9413,7 @@
           <a:blip r:embed="rId2" cstate="print">
             <a:extLst>
               <a:ext uri="{28A0092B-C50C-407E-A947-70E740481C1C}">
-                <a14:useLocalDpi xmlns:a14="http://schemas.microsoft.com/office/drawing/2010/main" xmlns="" val="0"/>
+                <a14:useLocalDpi xmlns="" xmlns:a14="http://schemas.microsoft.com/office/drawing/2010/main" val="0"/>
               </a:ext>
             </a:extLst>
           </a:blip>
@@ -10845,7 +9458,14 @@
                 <a:latin typeface="나눔고딕 ExtraBold" panose="020D0904000000000000" pitchFamily="50" charset="-127"/>
                 <a:ea typeface="나눔고딕 ExtraBold" panose="020D0904000000000000" pitchFamily="50" charset="-127"/>
               </a:rPr>
-              <a:t> Outline</a:t>
+              <a:t> </a:t>
+            </a:r>
+            <a:r>
+              <a:rPr lang="en-US" altLang="ko-KR" sz="5400" dirty="0" smtClean="0">
+                <a:latin typeface="나눔고딕 ExtraBold" panose="020D0904000000000000" pitchFamily="50" charset="-127"/>
+                <a:ea typeface="나눔고딕 ExtraBold" panose="020D0904000000000000" pitchFamily="50" charset="-127"/>
+              </a:rPr>
+              <a:t>Outline &amp; Using Language</a:t>
             </a:r>
             <a:endParaRPr lang="ko-KR" altLang="en-US" sz="5400" dirty="0">
               <a:latin typeface="나눔고딕 ExtraBold" panose="020D0904000000000000" pitchFamily="50" charset="-127"/>
@@ -10866,7 +9486,7 @@
           <a:blip r:embed="rId3" cstate="print">
             <a:extLst>
               <a:ext uri="{28A0092B-C50C-407E-A947-70E740481C1C}">
-                <a14:useLocalDpi xmlns:a14="http://schemas.microsoft.com/office/drawing/2010/main" xmlns="" val="0"/>
+                <a14:useLocalDpi xmlns="" xmlns:a14="http://schemas.microsoft.com/office/drawing/2010/main" val="0"/>
               </a:ext>
             </a:extLst>
           </a:blip>
@@ -10901,7 +9521,7 @@
         </p:blipFill>
         <p:spPr bwMode="auto">
           <a:xfrm>
-            <a:off x="2299460" y="1318385"/>
+            <a:off x="617617" y="1334713"/>
             <a:ext cx="6261445" cy="4870013"/>
           </a:xfrm>
           <a:prstGeom prst="rect">
@@ -10916,10 +9536,46 @@
           </a:ln>
         </p:spPr>
       </p:pic>
+      <p:sp>
+        <p:nvSpPr>
+          <p:cNvPr id="7" name="TextBox 6"/>
+          <p:cNvSpPr txBox="1"/>
+          <p:nvPr/>
+        </p:nvSpPr>
+        <p:spPr>
+          <a:xfrm>
+            <a:off x="7396843" y="1877785"/>
+            <a:ext cx="3869871" cy="1261884"/>
+          </a:xfrm>
+          <a:prstGeom prst="rect">
+            <a:avLst/>
+          </a:prstGeom>
+          <a:noFill/>
+        </p:spPr>
+        <p:txBody>
+          <a:bodyPr wrap="square" rtlCol="0">
+            <a:spAutoFit/>
+          </a:bodyPr>
+          <a:lstStyle/>
+          <a:p>
+            <a:r>
+              <a:rPr lang="en-US" altLang="ko-KR" sz="3800" dirty="0" smtClean="0"/>
+              <a:t>Language : </a:t>
+            </a:r>
+          </a:p>
+          <a:p>
+            <a:r>
+              <a:rPr lang="en-US" altLang="ko-KR" sz="3800" dirty="0" smtClean="0"/>
+              <a:t>JAVA &amp; XML</a:t>
+            </a:r>
+            <a:endParaRPr lang="ko-KR" altLang="en-US" sz="3800" dirty="0"/>
+          </a:p>
+        </p:txBody>
+      </p:sp>
     </p:spTree>
     <p:extLst>
       <p:ext uri="{BB962C8B-B14F-4D97-AF65-F5344CB8AC3E}">
-        <p14:creationId xmlns:p14="http://schemas.microsoft.com/office/powerpoint/2010/main" xmlns="" val="2880880992"/>
+        <p14:creationId xmlns="" xmlns:p14="http://schemas.microsoft.com/office/powerpoint/2010/main" val="2880880992"/>
       </p:ext>
     </p:extLst>
   </p:cSld>
@@ -11142,7 +9798,7 @@
 </p:sld>
 </file>
 
-<file path=ppt/slides/slide8.xml><?xml version="1.0" encoding="utf-8"?>
+<file path=ppt/slides/slide7.xml><?xml version="1.0" encoding="utf-8"?>
 <p:sld xmlns:a="http://schemas.openxmlformats.org/drawingml/2006/main" xmlns:r="http://schemas.openxmlformats.org/officeDocument/2006/relationships" xmlns:p="http://schemas.openxmlformats.org/presentationml/2006/main">
   <p:cSld>
     <p:spTree>
@@ -11171,7 +9827,7 @@
           <a:blip r:embed="rId2" cstate="print">
             <a:extLst>
               <a:ext uri="{28A0092B-C50C-407E-A947-70E740481C1C}">
-                <a14:useLocalDpi xmlns:a14="http://schemas.microsoft.com/office/drawing/2010/main" xmlns="" val="0"/>
+                <a14:useLocalDpi xmlns="" xmlns:a14="http://schemas.microsoft.com/office/drawing/2010/main" val="0"/>
               </a:ext>
             </a:extLst>
           </a:blip>
@@ -11201,7 +9857,7 @@
           <a:blip r:embed="rId3" cstate="print">
             <a:extLst>
               <a:ext uri="{28A0092B-C50C-407E-A947-70E740481C1C}">
-                <a14:useLocalDpi xmlns:a14="http://schemas.microsoft.com/office/drawing/2010/main" xmlns="" val="0"/>
+                <a14:useLocalDpi xmlns="" xmlns:a14="http://schemas.microsoft.com/office/drawing/2010/main" val="0"/>
               </a:ext>
             </a:extLst>
           </a:blip>
@@ -11267,7 +9923,7 @@
           <a:blip r:embed="rId4" cstate="print">
             <a:extLst>
               <a:ext uri="{28A0092B-C50C-407E-A947-70E740481C1C}">
-                <a14:useLocalDpi xmlns:a14="http://schemas.microsoft.com/office/drawing/2010/main" xmlns="" val="0"/>
+                <a14:useLocalDpi xmlns="" xmlns:a14="http://schemas.microsoft.com/office/drawing/2010/main" val="0"/>
               </a:ext>
             </a:extLst>
           </a:blip>
@@ -11311,7 +9967,7 @@
           <a:blip r:embed="rId5" cstate="print">
             <a:extLst>
               <a:ext uri="{28A0092B-C50C-407E-A947-70E740481C1C}">
-                <a14:useLocalDpi xmlns:a14="http://schemas.microsoft.com/office/drawing/2010/main" xmlns="" val="0"/>
+                <a14:useLocalDpi xmlns="" xmlns:a14="http://schemas.microsoft.com/office/drawing/2010/main" val="0"/>
               </a:ext>
             </a:extLst>
           </a:blip>
@@ -11355,7 +10011,7 @@
           <a:blip r:embed="rId6" cstate="print">
             <a:extLst>
               <a:ext uri="{28A0092B-C50C-407E-A947-70E740481C1C}">
-                <a14:useLocalDpi xmlns:a14="http://schemas.microsoft.com/office/drawing/2010/main" xmlns="" val="0"/>
+                <a14:useLocalDpi xmlns="" xmlns:a14="http://schemas.microsoft.com/office/drawing/2010/main" val="0"/>
               </a:ext>
             </a:extLst>
           </a:blip>
@@ -11520,7 +10176,7 @@
           <a:blip r:embed="rId7" cstate="print">
             <a:extLst>
               <a:ext uri="{28A0092B-C50C-407E-A947-70E740481C1C}">
-                <a14:useLocalDpi xmlns:a14="http://schemas.microsoft.com/office/drawing/2010/main" xmlns="" val="0"/>
+                <a14:useLocalDpi xmlns="" xmlns:a14="http://schemas.microsoft.com/office/drawing/2010/main" val="0"/>
               </a:ext>
             </a:extLst>
           </a:blip>
@@ -11564,7 +10220,7 @@
           <a:blip r:embed="rId8" cstate="print">
             <a:extLst>
               <a:ext uri="{28A0092B-C50C-407E-A947-70E740481C1C}">
-                <a14:useLocalDpi xmlns:a14="http://schemas.microsoft.com/office/drawing/2010/main" xmlns="" val="0"/>
+                <a14:useLocalDpi xmlns="" xmlns:a14="http://schemas.microsoft.com/office/drawing/2010/main" val="0"/>
               </a:ext>
             </a:extLst>
           </a:blip>
@@ -11608,7 +10264,7 @@
           <a:blip r:embed="rId9" cstate="print">
             <a:extLst>
               <a:ext uri="{28A0092B-C50C-407E-A947-70E740481C1C}">
-                <a14:useLocalDpi xmlns:a14="http://schemas.microsoft.com/office/drawing/2010/main" xmlns="" val="0"/>
+                <a14:useLocalDpi xmlns="" xmlns:a14="http://schemas.microsoft.com/office/drawing/2010/main" val="0"/>
               </a:ext>
             </a:extLst>
           </a:blip>
@@ -11652,7 +10308,7 @@
           <a:blip r:embed="rId10" cstate="print">
             <a:extLst>
               <a:ext uri="{28A0092B-C50C-407E-A947-70E740481C1C}">
-                <a14:useLocalDpi xmlns:a14="http://schemas.microsoft.com/office/drawing/2010/main" xmlns="" val="0"/>
+                <a14:useLocalDpi xmlns="" xmlns:a14="http://schemas.microsoft.com/office/drawing/2010/main" val="0"/>
               </a:ext>
             </a:extLst>
           </a:blip>
@@ -11687,7 +10343,7 @@
     </p:spTree>
     <p:extLst>
       <p:ext uri="{BB962C8B-B14F-4D97-AF65-F5344CB8AC3E}">
-        <p14:creationId xmlns:p14="http://schemas.microsoft.com/office/powerpoint/2010/main" xmlns="" val="2123220773"/>
+        <p14:creationId xmlns="" xmlns:p14="http://schemas.microsoft.com/office/powerpoint/2010/main" val="2123220773"/>
       </p:ext>
     </p:extLst>
   </p:cSld>
@@ -12601,7 +11257,7 @@
 </p:sld>
 </file>
 
-<file path=ppt/slides/slide9.xml><?xml version="1.0" encoding="utf-8"?>
+<file path=ppt/slides/slide8.xml><?xml version="1.0" encoding="utf-8"?>
 <p:sld xmlns:a="http://schemas.openxmlformats.org/drawingml/2006/main" xmlns:r="http://schemas.openxmlformats.org/officeDocument/2006/relationships" xmlns:p="http://schemas.openxmlformats.org/presentationml/2006/main">
   <p:cSld>
     <p:spTree>
@@ -12630,7 +11286,7 @@
           <a:blip r:embed="rId2" cstate="print">
             <a:extLst>
               <a:ext uri="{28A0092B-C50C-407E-A947-70E740481C1C}">
-                <a14:useLocalDpi xmlns:a14="http://schemas.microsoft.com/office/drawing/2010/main" xmlns="" val="0"/>
+                <a14:useLocalDpi xmlns="" xmlns:a14="http://schemas.microsoft.com/office/drawing/2010/main" val="0"/>
               </a:ext>
             </a:extLst>
           </a:blip>
@@ -12660,7 +11316,7 @@
           <a:blip r:embed="rId3" cstate="print">
             <a:extLst>
               <a:ext uri="{28A0092B-C50C-407E-A947-70E740481C1C}">
-                <a14:useLocalDpi xmlns:a14="http://schemas.microsoft.com/office/drawing/2010/main" xmlns="" val="0"/>
+                <a14:useLocalDpi xmlns="" xmlns:a14="http://schemas.microsoft.com/office/drawing/2010/main" val="0"/>
               </a:ext>
             </a:extLst>
           </a:blip>
@@ -12726,7 +11382,7 @@
           <a:blip r:embed="rId4" cstate="print">
             <a:extLst>
               <a:ext uri="{28A0092B-C50C-407E-A947-70E740481C1C}">
-                <a14:useLocalDpi xmlns:a14="http://schemas.microsoft.com/office/drawing/2010/main" xmlns="" val="0"/>
+                <a14:useLocalDpi xmlns="" xmlns:a14="http://schemas.microsoft.com/office/drawing/2010/main" val="0"/>
               </a:ext>
             </a:extLst>
           </a:blip>
@@ -12756,7 +11412,7 @@
           <a:blip r:embed="rId5" cstate="print">
             <a:extLst>
               <a:ext uri="{28A0092B-C50C-407E-A947-70E740481C1C}">
-                <a14:useLocalDpi xmlns:a14="http://schemas.microsoft.com/office/drawing/2010/main" xmlns="" val="0"/>
+                <a14:useLocalDpi xmlns="" xmlns:a14="http://schemas.microsoft.com/office/drawing/2010/main" val="0"/>
               </a:ext>
             </a:extLst>
           </a:blip>
@@ -12786,7 +11442,7 @@
           <a:blip r:embed="rId6" cstate="print">
             <a:extLst>
               <a:ext uri="{28A0092B-C50C-407E-A947-70E740481C1C}">
-                <a14:useLocalDpi xmlns:a14="http://schemas.microsoft.com/office/drawing/2010/main" xmlns="" val="0"/>
+                <a14:useLocalDpi xmlns="" xmlns:a14="http://schemas.microsoft.com/office/drawing/2010/main" val="0"/>
               </a:ext>
             </a:extLst>
           </a:blip>
@@ -12816,7 +11472,7 @@
           <a:blip r:embed="rId7" cstate="print">
             <a:extLst>
               <a:ext uri="{28A0092B-C50C-407E-A947-70E740481C1C}">
-                <a14:useLocalDpi xmlns:a14="http://schemas.microsoft.com/office/drawing/2010/main" xmlns="" val="0"/>
+                <a14:useLocalDpi xmlns="" xmlns:a14="http://schemas.microsoft.com/office/drawing/2010/main" val="0"/>
               </a:ext>
             </a:extLst>
           </a:blip>
@@ -12837,7 +11493,7 @@
     </p:spTree>
     <p:extLst>
       <p:ext uri="{BB962C8B-B14F-4D97-AF65-F5344CB8AC3E}">
-        <p14:creationId xmlns:p14="http://schemas.microsoft.com/office/powerpoint/2010/main" xmlns="" val="81038480"/>
+        <p14:creationId xmlns="" xmlns:p14="http://schemas.microsoft.com/office/powerpoint/2010/main" val="81038480"/>
       </p:ext>
     </p:extLst>
   </p:cSld>
@@ -13815,6 +12471,517 @@
     </p:tnLst>
     <p:bldLst>
       <p:bldP spid="5" grpId="0"/>
+    </p:bldLst>
+  </p:timing>
+</p:sld>
+</file>
+
+<file path=ppt/slides/slide9.xml><?xml version="1.0" encoding="utf-8"?>
+<p:sld xmlns:a="http://schemas.openxmlformats.org/drawingml/2006/main" xmlns:r="http://schemas.openxmlformats.org/officeDocument/2006/relationships" xmlns:p="http://schemas.openxmlformats.org/presentationml/2006/main">
+  <p:cSld>
+    <p:spTree>
+      <p:nvGrpSpPr>
+        <p:cNvPr id="1" name=""/>
+        <p:cNvGrpSpPr/>
+        <p:nvPr/>
+      </p:nvGrpSpPr>
+      <p:grpSpPr>
+        <a:xfrm>
+          <a:off x="0" y="0"/>
+          <a:ext cx="0" cy="0"/>
+          <a:chOff x="0" y="0"/>
+          <a:chExt cx="0" cy="0"/>
+        </a:xfrm>
+      </p:grpSpPr>
+      <p:pic>
+        <p:nvPicPr>
+          <p:cNvPr id="4" name="그림 3"/>
+          <p:cNvPicPr>
+            <a:picLocks noChangeAspect="1"/>
+          </p:cNvPicPr>
+          <p:nvPr/>
+        </p:nvPicPr>
+        <p:blipFill>
+          <a:blip r:embed="rId2" cstate="print">
+            <a:extLst>
+              <a:ext uri="{28A0092B-C50C-407E-A947-70E740481C1C}">
+                <a14:useLocalDpi xmlns="" xmlns:a14="http://schemas.microsoft.com/office/drawing/2010/main" val="0"/>
+              </a:ext>
+            </a:extLst>
+          </a:blip>
+          <a:stretch>
+            <a:fillRect/>
+          </a:stretch>
+        </p:blipFill>
+        <p:spPr>
+          <a:xfrm>
+            <a:off x="6216261" y="3494083"/>
+            <a:ext cx="5975739" cy="3363917"/>
+          </a:xfrm>
+          <a:prstGeom prst="rect">
+            <a:avLst/>
+          </a:prstGeom>
+        </p:spPr>
+      </p:pic>
+      <p:pic>
+        <p:nvPicPr>
+          <p:cNvPr id="3" name="그림 2"/>
+          <p:cNvPicPr>
+            <a:picLocks noChangeAspect="1"/>
+          </p:cNvPicPr>
+          <p:nvPr/>
+        </p:nvPicPr>
+        <p:blipFill>
+          <a:blip r:embed="rId3" cstate="print">
+            <a:extLst>
+              <a:ext uri="{28A0092B-C50C-407E-A947-70E740481C1C}">
+                <a14:useLocalDpi xmlns="" xmlns:a14="http://schemas.microsoft.com/office/drawing/2010/main" val="0"/>
+              </a:ext>
+            </a:extLst>
+          </a:blip>
+          <a:stretch>
+            <a:fillRect/>
+          </a:stretch>
+        </p:blipFill>
+        <p:spPr>
+          <a:xfrm>
+            <a:off x="271449" y="227244"/>
+            <a:ext cx="1130702" cy="1130702"/>
+          </a:xfrm>
+          <a:prstGeom prst="rect">
+            <a:avLst/>
+          </a:prstGeom>
+        </p:spPr>
+      </p:pic>
+      <p:sp>
+        <p:nvSpPr>
+          <p:cNvPr id="5" name="TextBox 4"/>
+          <p:cNvSpPr txBox="1"/>
+          <p:nvPr/>
+        </p:nvSpPr>
+        <p:spPr>
+          <a:xfrm>
+            <a:off x="1402151" y="330930"/>
+            <a:ext cx="10074729" cy="923330"/>
+          </a:xfrm>
+          <a:prstGeom prst="rect">
+            <a:avLst/>
+          </a:prstGeom>
+          <a:noFill/>
+        </p:spPr>
+        <p:txBody>
+          <a:bodyPr wrap="square" rtlCol="0">
+            <a:spAutoFit/>
+          </a:bodyPr>
+          <a:lstStyle/>
+          <a:p>
+            <a:r>
+              <a:rPr lang="en-US" altLang="ko-KR" sz="5400" dirty="0" smtClean="0">
+                <a:latin typeface="나눔고딕 ExtraBold" panose="020D0904000000000000" pitchFamily="50" charset="-127"/>
+                <a:ea typeface="나눔고딕 ExtraBold" panose="020D0904000000000000" pitchFamily="50" charset="-127"/>
+              </a:rPr>
+              <a:t>Problem</a:t>
+            </a:r>
+            <a:endParaRPr lang="ko-KR" altLang="en-US" sz="5400" dirty="0">
+              <a:latin typeface="나눔고딕 ExtraBold" panose="020D0904000000000000" pitchFamily="50" charset="-127"/>
+              <a:ea typeface="나눔고딕 ExtraBold" panose="020D0904000000000000" pitchFamily="50" charset="-127"/>
+            </a:endParaRPr>
+          </a:p>
+        </p:txBody>
+      </p:sp>
+      <p:sp>
+        <p:nvSpPr>
+          <p:cNvPr id="9" name="TextBox 8"/>
+          <p:cNvSpPr txBox="1"/>
+          <p:nvPr/>
+        </p:nvSpPr>
+        <p:spPr>
+          <a:xfrm>
+            <a:off x="1172122" y="1860615"/>
+            <a:ext cx="4430598" cy="584775"/>
+          </a:xfrm>
+          <a:prstGeom prst="rect">
+            <a:avLst/>
+          </a:prstGeom>
+          <a:noFill/>
+        </p:spPr>
+        <p:txBody>
+          <a:bodyPr wrap="square" rtlCol="0">
+            <a:spAutoFit/>
+          </a:bodyPr>
+          <a:lstStyle/>
+          <a:p>
+            <a:r>
+              <a:rPr lang="en-US" altLang="ko-KR" sz="3200" dirty="0" smtClean="0"/>
+              <a:t>- Error Modify</a:t>
+            </a:r>
+            <a:endParaRPr lang="ko-KR" altLang="en-US" sz="3200" dirty="0"/>
+          </a:p>
+        </p:txBody>
+      </p:sp>
+      <p:sp>
+        <p:nvSpPr>
+          <p:cNvPr id="7" name="TextBox 6"/>
+          <p:cNvSpPr txBox="1"/>
+          <p:nvPr/>
+        </p:nvSpPr>
+        <p:spPr>
+          <a:xfrm>
+            <a:off x="1188451" y="2709701"/>
+            <a:ext cx="5245006" cy="584775"/>
+          </a:xfrm>
+          <a:prstGeom prst="rect">
+            <a:avLst/>
+          </a:prstGeom>
+          <a:noFill/>
+        </p:spPr>
+        <p:txBody>
+          <a:bodyPr wrap="square" rtlCol="0">
+            <a:spAutoFit/>
+          </a:bodyPr>
+          <a:lstStyle/>
+          <a:p>
+            <a:r>
+              <a:rPr lang="en-US" altLang="ko-KR" sz="3200" dirty="0" smtClean="0"/>
+              <a:t>- </a:t>
+            </a:r>
+            <a:r>
+              <a:rPr lang="en-US" altLang="ko-KR" sz="3200" dirty="0" smtClean="0"/>
+              <a:t>Image Extension error</a:t>
+            </a:r>
+            <a:endParaRPr lang="ko-KR" altLang="en-US" sz="3200" dirty="0"/>
+          </a:p>
+        </p:txBody>
+      </p:sp>
+    </p:spTree>
+    <p:extLst>
+      <p:ext uri="{BB962C8B-B14F-4D97-AF65-F5344CB8AC3E}">
+        <p14:creationId xmlns="" xmlns:p14="http://schemas.microsoft.com/office/powerpoint/2010/main" val="544492876"/>
+      </p:ext>
+    </p:extLst>
+  </p:cSld>
+  <p:clrMapOvr>
+    <a:masterClrMapping/>
+  </p:clrMapOvr>
+  <p:timing>
+    <p:tnLst>
+      <p:par>
+        <p:cTn id="1" dur="indefinite" restart="never" nodeType="tmRoot">
+          <p:childTnLst>
+            <p:seq concurrent="1" nextAc="seek">
+              <p:cTn id="2" dur="indefinite" nodeType="mainSeq">
+                <p:childTnLst>
+                  <p:par>
+                    <p:cTn id="3" fill="hold">
+                      <p:stCondLst>
+                        <p:cond delay="indefinite"/>
+                      </p:stCondLst>
+                      <p:childTnLst>
+                        <p:par>
+                          <p:cTn id="4" fill="hold">
+                            <p:stCondLst>
+                              <p:cond delay="0"/>
+                            </p:stCondLst>
+                            <p:childTnLst>
+                              <p:par>
+                                <p:cTn id="5" presetID="47" presetClass="entr" presetSubtype="0" fill="hold" nodeType="clickEffect">
+                                  <p:stCondLst>
+                                    <p:cond delay="0"/>
+                                  </p:stCondLst>
+                                  <p:childTnLst>
+                                    <p:set>
+                                      <p:cBhvr>
+                                        <p:cTn id="6" dur="1" fill="hold">
+                                          <p:stCondLst>
+                                            <p:cond delay="0"/>
+                                          </p:stCondLst>
+                                        </p:cTn>
+                                        <p:tgtEl>
+                                          <p:spTgt spid="3"/>
+                                        </p:tgtEl>
+                                        <p:attrNameLst>
+                                          <p:attrName>style.visibility</p:attrName>
+                                        </p:attrNameLst>
+                                      </p:cBhvr>
+                                      <p:to>
+                                        <p:strVal val="visible"/>
+                                      </p:to>
+                                    </p:set>
+                                    <p:animEffect transition="in" filter="fade">
+                                      <p:cBhvr>
+                                        <p:cTn id="7" dur="1000"/>
+                                        <p:tgtEl>
+                                          <p:spTgt spid="3"/>
+                                        </p:tgtEl>
+                                      </p:cBhvr>
+                                    </p:animEffect>
+                                    <p:anim calcmode="lin" valueType="num">
+                                      <p:cBhvr>
+                                        <p:cTn id="8" dur="1000" fill="hold"/>
+                                        <p:tgtEl>
+                                          <p:spTgt spid="3"/>
+                                        </p:tgtEl>
+                                        <p:attrNameLst>
+                                          <p:attrName>ppt_x</p:attrName>
+                                        </p:attrNameLst>
+                                      </p:cBhvr>
+                                      <p:tavLst>
+                                        <p:tav tm="0">
+                                          <p:val>
+                                            <p:strVal val="#ppt_x"/>
+                                          </p:val>
+                                        </p:tav>
+                                        <p:tav tm="100000">
+                                          <p:val>
+                                            <p:strVal val="#ppt_x"/>
+                                          </p:val>
+                                        </p:tav>
+                                      </p:tavLst>
+                                    </p:anim>
+                                    <p:anim calcmode="lin" valueType="num">
+                                      <p:cBhvr>
+                                        <p:cTn id="9" dur="1000" fill="hold"/>
+                                        <p:tgtEl>
+                                          <p:spTgt spid="3"/>
+                                        </p:tgtEl>
+                                        <p:attrNameLst>
+                                          <p:attrName>ppt_y</p:attrName>
+                                        </p:attrNameLst>
+                                      </p:cBhvr>
+                                      <p:tavLst>
+                                        <p:tav tm="0">
+                                          <p:val>
+                                            <p:strVal val="#ppt_y-.1"/>
+                                          </p:val>
+                                        </p:tav>
+                                        <p:tav tm="100000">
+                                          <p:val>
+                                            <p:strVal val="#ppt_y"/>
+                                          </p:val>
+                                        </p:tav>
+                                      </p:tavLst>
+                                    </p:anim>
+                                  </p:childTnLst>
+                                </p:cTn>
+                              </p:par>
+                              <p:par>
+                                <p:cTn id="10" presetID="47" presetClass="entr" presetSubtype="0" fill="hold" grpId="0" nodeType="withEffect">
+                                  <p:stCondLst>
+                                    <p:cond delay="0"/>
+                                  </p:stCondLst>
+                                  <p:childTnLst>
+                                    <p:set>
+                                      <p:cBhvr>
+                                        <p:cTn id="11" dur="1" fill="hold">
+                                          <p:stCondLst>
+                                            <p:cond delay="0"/>
+                                          </p:stCondLst>
+                                        </p:cTn>
+                                        <p:tgtEl>
+                                          <p:spTgt spid="5"/>
+                                        </p:tgtEl>
+                                        <p:attrNameLst>
+                                          <p:attrName>style.visibility</p:attrName>
+                                        </p:attrNameLst>
+                                      </p:cBhvr>
+                                      <p:to>
+                                        <p:strVal val="visible"/>
+                                      </p:to>
+                                    </p:set>
+                                    <p:animEffect transition="in" filter="fade">
+                                      <p:cBhvr>
+                                        <p:cTn id="12" dur="1000"/>
+                                        <p:tgtEl>
+                                          <p:spTgt spid="5"/>
+                                        </p:tgtEl>
+                                      </p:cBhvr>
+                                    </p:animEffect>
+                                    <p:anim calcmode="lin" valueType="num">
+                                      <p:cBhvr>
+                                        <p:cTn id="13" dur="1000" fill="hold"/>
+                                        <p:tgtEl>
+                                          <p:spTgt spid="5"/>
+                                        </p:tgtEl>
+                                        <p:attrNameLst>
+                                          <p:attrName>ppt_x</p:attrName>
+                                        </p:attrNameLst>
+                                      </p:cBhvr>
+                                      <p:tavLst>
+                                        <p:tav tm="0">
+                                          <p:val>
+                                            <p:strVal val="#ppt_x"/>
+                                          </p:val>
+                                        </p:tav>
+                                        <p:tav tm="100000">
+                                          <p:val>
+                                            <p:strVal val="#ppt_x"/>
+                                          </p:val>
+                                        </p:tav>
+                                      </p:tavLst>
+                                    </p:anim>
+                                    <p:anim calcmode="lin" valueType="num">
+                                      <p:cBhvr>
+                                        <p:cTn id="14" dur="1000" fill="hold"/>
+                                        <p:tgtEl>
+                                          <p:spTgt spid="5"/>
+                                        </p:tgtEl>
+                                        <p:attrNameLst>
+                                          <p:attrName>ppt_y</p:attrName>
+                                        </p:attrNameLst>
+                                      </p:cBhvr>
+                                      <p:tavLst>
+                                        <p:tav tm="0">
+                                          <p:val>
+                                            <p:strVal val="#ppt_y-.1"/>
+                                          </p:val>
+                                        </p:tav>
+                                        <p:tav tm="100000">
+                                          <p:val>
+                                            <p:strVal val="#ppt_y"/>
+                                          </p:val>
+                                        </p:tav>
+                                      </p:tavLst>
+                                    </p:anim>
+                                  </p:childTnLst>
+                                </p:cTn>
+                              </p:par>
+                            </p:childTnLst>
+                          </p:cTn>
+                        </p:par>
+                      </p:childTnLst>
+                    </p:cTn>
+                  </p:par>
+                  <p:par>
+                    <p:cTn id="15" fill="hold">
+                      <p:stCondLst>
+                        <p:cond delay="indefinite"/>
+                      </p:stCondLst>
+                      <p:childTnLst>
+                        <p:par>
+                          <p:cTn id="16" fill="hold">
+                            <p:stCondLst>
+                              <p:cond delay="0"/>
+                            </p:stCondLst>
+                            <p:childTnLst>
+                              <p:par>
+                                <p:cTn id="17" presetID="10" presetClass="entr" presetSubtype="0" fill="hold" grpId="0" nodeType="clickEffect">
+                                  <p:stCondLst>
+                                    <p:cond delay="0"/>
+                                  </p:stCondLst>
+                                  <p:childTnLst>
+                                    <p:set>
+                                      <p:cBhvr>
+                                        <p:cTn id="18" dur="1" fill="hold">
+                                          <p:stCondLst>
+                                            <p:cond delay="0"/>
+                                          </p:stCondLst>
+                                        </p:cTn>
+                                        <p:tgtEl>
+                                          <p:spTgt spid="9"/>
+                                        </p:tgtEl>
+                                        <p:attrNameLst>
+                                          <p:attrName>style.visibility</p:attrName>
+                                        </p:attrNameLst>
+                                      </p:cBhvr>
+                                      <p:to>
+                                        <p:strVal val="visible"/>
+                                      </p:to>
+                                    </p:set>
+                                    <p:animEffect transition="in" filter="fade">
+                                      <p:cBhvr>
+                                        <p:cTn id="19" dur="500"/>
+                                        <p:tgtEl>
+                                          <p:spTgt spid="9"/>
+                                        </p:tgtEl>
+                                      </p:cBhvr>
+                                    </p:animEffect>
+                                  </p:childTnLst>
+                                </p:cTn>
+                              </p:par>
+                            </p:childTnLst>
+                          </p:cTn>
+                        </p:par>
+                      </p:childTnLst>
+                    </p:cTn>
+                  </p:par>
+                  <p:par>
+                    <p:cTn id="20" fill="hold">
+                      <p:stCondLst>
+                        <p:cond delay="indefinite"/>
+                      </p:stCondLst>
+                      <p:childTnLst>
+                        <p:par>
+                          <p:cTn id="21" fill="hold">
+                            <p:stCondLst>
+                              <p:cond delay="0"/>
+                            </p:stCondLst>
+                            <p:childTnLst>
+                              <p:par>
+                                <p:cTn id="22" presetID="10" presetClass="entr" presetSubtype="0" fill="hold" grpId="0" nodeType="clickEffect">
+                                  <p:stCondLst>
+                                    <p:cond delay="0"/>
+                                  </p:stCondLst>
+                                  <p:childTnLst>
+                                    <p:set>
+                                      <p:cBhvr>
+                                        <p:cTn id="23" dur="1" fill="hold">
+                                          <p:stCondLst>
+                                            <p:cond delay="0"/>
+                                          </p:stCondLst>
+                                        </p:cTn>
+                                        <p:tgtEl>
+                                          <p:spTgt spid="7"/>
+                                        </p:tgtEl>
+                                        <p:attrNameLst>
+                                          <p:attrName>style.visibility</p:attrName>
+                                        </p:attrNameLst>
+                                      </p:cBhvr>
+                                      <p:to>
+                                        <p:strVal val="visible"/>
+                                      </p:to>
+                                    </p:set>
+                                    <p:animEffect transition="in" filter="fade">
+                                      <p:cBhvr>
+                                        <p:cTn id="24" dur="500"/>
+                                        <p:tgtEl>
+                                          <p:spTgt spid="7"/>
+                                        </p:tgtEl>
+                                      </p:cBhvr>
+                                    </p:animEffect>
+                                  </p:childTnLst>
+                                </p:cTn>
+                              </p:par>
+                            </p:childTnLst>
+                          </p:cTn>
+                        </p:par>
+                      </p:childTnLst>
+                    </p:cTn>
+                  </p:par>
+                </p:childTnLst>
+              </p:cTn>
+              <p:prevCondLst>
+                <p:cond evt="onPrev" delay="0">
+                  <p:tgtEl>
+                    <p:sldTgt/>
+                  </p:tgtEl>
+                </p:cond>
+              </p:prevCondLst>
+              <p:nextCondLst>
+                <p:cond evt="onNext" delay="0">
+                  <p:tgtEl>
+                    <p:sldTgt/>
+                  </p:tgtEl>
+                </p:cond>
+              </p:nextCondLst>
+            </p:seq>
+          </p:childTnLst>
+        </p:cTn>
+      </p:par>
+    </p:tnLst>
+    <p:bldLst>
+      <p:bldP spid="5" grpId="0"/>
+      <p:bldP spid="9" grpId="0"/>
+      <p:bldP spid="7" grpId="0"/>
     </p:bldLst>
   </p:timing>
 </p:sld>
@@ -14075,7 +13242,7 @@
   <a:extraClrSchemeLst/>
   <a:extLst>
     <a:ext uri="{05A4C25C-085E-4340-85A3-A5531E510DB2}">
-      <thm15:themeFamily xmlns:thm15="http://schemas.microsoft.com/office/thememl/2012/main" xmlns="" name="Office Theme" id="{62F939B6-93AF-4DB8-9C6B-D6C7DFDC589F}" vid="{4A3C46E8-61CC-4603-A589-7422A47A8E4A}"/>
+      <thm15:themeFamily xmlns="" xmlns:thm15="http://schemas.microsoft.com/office/thememl/2012/main" name="Office Theme" id="{62F939B6-93AF-4DB8-9C6B-D6C7DFDC589F}" vid="{4A3C46E8-61CC-4603-A589-7422A47A8E4A}"/>
     </a:ext>
   </a:extLst>
 </a:theme>

</xml_diff>